<commit_message>
Remove duplicate notes in some slides.
Exchange a screenshot by a more realistic one.
</commit_message>
<xml_diff>
--- a/AndroidStudio.pptx
+++ b/AndroidStudio.pptx
@@ -380,7 +380,7 @@
                   <a:schemeClr val="tx2"/>
                 </a:solidFill>
               </a:rPr>
-              <a:t>29.09.2022</a:t>
+              <a:t>05.10.2022</a:t>
             </a:fld>
             <a:endParaRPr lang="de-DE">
               <a:solidFill>
@@ -458,7 +458,7 @@
                   <a:schemeClr val="tx2"/>
                 </a:solidFill>
               </a:rPr>
-              <a:t>‹Nr.›</a:t>
+              <a:t>‹#›</a:t>
             </a:fld>
             <a:endParaRPr lang="de-DE">
               <a:solidFill>
@@ -730,7 +730,7 @@
             <a:fld id="{B4113CCE-1A1A-46DB-884A-AE560F65C3AF}" type="datetimeFigureOut">
               <a:rPr lang="de-DE" smtClean="0"/>
               <a:pPr/>
-              <a:t>29.09.2022</a:t>
+              <a:t>05.10.2022</a:t>
             </a:fld>
             <a:endParaRPr lang="de-DE"/>
           </a:p>
@@ -897,7 +897,7 @@
             <a:fld id="{927DBD90-B360-417B-B4B3-F05A4AFC1996}" type="slidenum">
               <a:rPr lang="de-DE" smtClean="0"/>
               <a:pPr/>
-              <a:t>‹Nr.›</a:t>
+              <a:t>‹#›</a:t>
             </a:fld>
             <a:endParaRPr lang="de-DE"/>
           </a:p>
@@ -2410,15 +2410,7 @@
           <a:p>
             <a:r>
               <a:rPr lang="de-DE" dirty="0"/>
-              <a:t>Test ist eigentlich ein toller Name für schnelle Tests ohne weitere </a:t>
-            </a:r>
-            <a:r>
-              <a:rPr lang="de-DE" dirty="0" err="1"/>
-              <a:t>Bewandnis</a:t>
-            </a:r>
-            <a:r>
-              <a:rPr lang="de-DE" dirty="0"/>
-              <a:t>. Allerdings gibt es da Konflikte mit Tests für die Anwendung.</a:t>
+              <a:t>Test ist eigentlich ein toller Name für schnelle Tests ohne weitere Bewandtnis. Allerdings gibt es da Konflikte mit Tests für die Anwendung.</a:t>
             </a:r>
           </a:p>
         </p:txBody>
@@ -2509,18 +2501,7 @@
           <a:bodyPr/>
           <a:lstStyle/>
           <a:p>
-            <a:r>
-              <a:rPr lang="de-DE" dirty="0"/>
-              <a:t>Test ist eigentlich ein toller Name für schnelle Tests ohne weitere </a:t>
-            </a:r>
-            <a:r>
-              <a:rPr lang="de-DE" dirty="0" err="1"/>
-              <a:t>Bewandnis</a:t>
-            </a:r>
-            <a:r>
-              <a:rPr lang="de-DE" dirty="0"/>
-              <a:t>. Allerdings gibt es da Konflikte mit Tests für die Anwendung.</a:t>
-            </a:r>
+            <a:endParaRPr lang="de-DE" dirty="0"/>
           </a:p>
         </p:txBody>
       </p:sp>
@@ -2610,18 +2591,7 @@
           <a:bodyPr/>
           <a:lstStyle/>
           <a:p>
-            <a:r>
-              <a:rPr lang="de-DE" dirty="0"/>
-              <a:t>Test ist eigentlich ein toller Name für schnelle Tests ohne weitere </a:t>
-            </a:r>
-            <a:r>
-              <a:rPr lang="de-DE" dirty="0" err="1"/>
-              <a:t>Bewandnis</a:t>
-            </a:r>
-            <a:r>
-              <a:rPr lang="de-DE" dirty="0"/>
-              <a:t>. Allerdings gibt es da Konflikte mit Tests für die Anwendung.</a:t>
-            </a:r>
+            <a:endParaRPr lang="de-DE" dirty="0"/>
           </a:p>
         </p:txBody>
       </p:sp>
@@ -3146,11 +3116,11 @@
               <a:buChar char="-"/>
             </a:pPr>
             <a:r>
-              <a:rPr lang="de-DE" dirty="0" smtClean="0"/>
+              <a:rPr lang="de-DE" dirty="0"/>
               <a:t>App kann nicht hochgeladen werden weil der Speicher zu</a:t>
             </a:r>
             <a:r>
-              <a:rPr lang="de-DE" baseline="0" dirty="0" smtClean="0"/>
+              <a:rPr lang="de-DE" baseline="0" dirty="0"/>
               <a:t> klein ist</a:t>
             </a:r>
           </a:p>
@@ -3160,7 +3130,7 @@
               <a:buChar char="-"/>
             </a:pPr>
             <a:r>
-              <a:rPr lang="de-DE" baseline="0" dirty="0" smtClean="0"/>
+              <a:rPr lang="de-DE" baseline="0" dirty="0"/>
               <a:t>Wir müssen den Speicher vergrößern</a:t>
             </a:r>
             <a:endParaRPr lang="en-US" dirty="0"/>
@@ -3338,7 +3308,7 @@
               <a:buChar char="-"/>
             </a:pPr>
             <a:r>
-              <a:rPr lang="de-DE" baseline="0" dirty="0" smtClean="0"/>
+              <a:rPr lang="de-DE" baseline="0" dirty="0"/>
               <a:t>Den internen Speicher auf 2000MB (2GB) setzen -&gt; das sollte reichen</a:t>
             </a:r>
           </a:p>
@@ -3632,11 +3602,11 @@
               <a:buChar char="-"/>
             </a:pPr>
             <a:r>
-              <a:rPr lang="de-DE" dirty="0" smtClean="0"/>
+              <a:rPr lang="de-DE" dirty="0"/>
               <a:t>Sicherstellen</a:t>
             </a:r>
             <a:r>
-              <a:rPr lang="de-DE" baseline="0" dirty="0" smtClean="0"/>
+              <a:rPr lang="de-DE" baseline="0" dirty="0"/>
               <a:t>, dass das Gerät aus ist</a:t>
             </a:r>
           </a:p>
@@ -3646,7 +3616,7 @@
               <a:buChar char="-"/>
             </a:pPr>
             <a:r>
-              <a:rPr lang="de-DE" baseline="0" dirty="0" smtClean="0"/>
+              <a:rPr lang="de-DE" baseline="0" dirty="0"/>
               <a:t>Das Gerät neu starten</a:t>
             </a:r>
           </a:p>
@@ -3741,7 +3711,7 @@
               <a:buChar char="-"/>
             </a:pPr>
             <a:r>
-              <a:rPr lang="de-DE" baseline="0" dirty="0" smtClean="0"/>
+              <a:rPr lang="de-DE" baseline="0" dirty="0"/>
               <a:t>Wenn das Gerät hochgefahren ist, Gerät auswählen und App starten</a:t>
             </a:r>
           </a:p>
@@ -4771,7 +4741,7 @@
           <a:p>
             <a:fld id="{0617C99F-8972-4D55-9FC9-20A8973FEFCD}" type="datetime1">
               <a:rPr lang="de-DE" smtClean="0"/>
-              <a:t>29.09.2022</a:t>
+              <a:t>05.10.2022</a:t>
             </a:fld>
             <a:endParaRPr lang="de-DE"/>
           </a:p>
@@ -4816,7 +4786,7 @@
           <a:p>
             <a:fld id="{3A1F27E2-D58A-4028-9FF2-B12D897F257E}" type="slidenum">
               <a:rPr lang="de-DE" smtClean="0"/>
-              <a:t>‹Nr.›</a:t>
+              <a:t>‹#›</a:t>
             </a:fld>
             <a:endParaRPr lang="de-DE"/>
           </a:p>
@@ -4976,7 +4946,7 @@
           <a:p>
             <a:fld id="{1CE60AF2-85CA-4EDA-9C85-340F8B534780}" type="datetime1">
               <a:rPr lang="de-DE" smtClean="0"/>
-              <a:t>29.09.2022</a:t>
+              <a:t>05.10.2022</a:t>
             </a:fld>
             <a:endParaRPr lang="de-DE"/>
           </a:p>
@@ -5021,7 +4991,7 @@
           <a:p>
             <a:fld id="{3A1F27E2-D58A-4028-9FF2-B12D897F257E}" type="slidenum">
               <a:rPr lang="de-DE" smtClean="0"/>
-              <a:t>‹Nr.›</a:t>
+              <a:t>‹#›</a:t>
             </a:fld>
             <a:endParaRPr lang="de-DE"/>
           </a:p>
@@ -5130,7 +5100,7 @@
           <a:p>
             <a:fld id="{838A6544-C481-4408-8F7B-396A7E058B8C}" type="datetime1">
               <a:rPr lang="de-DE" smtClean="0"/>
-              <a:t>29.09.2022</a:t>
+              <a:t>05.10.2022</a:t>
             </a:fld>
             <a:endParaRPr lang="de-DE"/>
           </a:p>
@@ -5175,7 +5145,7 @@
           <a:p>
             <a:fld id="{3A1F27E2-D58A-4028-9FF2-B12D897F257E}" type="slidenum">
               <a:rPr lang="de-DE" smtClean="0"/>
-              <a:t>‹Nr.›</a:t>
+              <a:t>‹#›</a:t>
             </a:fld>
             <a:endParaRPr lang="de-DE"/>
           </a:p>
@@ -5367,7 +5337,7 @@
           <a:p>
             <a:fld id="{849F51E4-763F-47D5-9CC8-41F20D31A3F9}" type="datetime1">
               <a:rPr lang="de-DE" smtClean="0"/>
-              <a:t>29.09.2022</a:t>
+              <a:t>05.10.2022</a:t>
             </a:fld>
             <a:endParaRPr lang="de-DE"/>
           </a:p>
@@ -5412,7 +5382,7 @@
           <a:p>
             <a:fld id="{3A1F27E2-D58A-4028-9FF2-B12D897F257E}" type="slidenum">
               <a:rPr lang="de-DE" smtClean="0"/>
-              <a:t>‹Nr.›</a:t>
+              <a:t>‹#›</a:t>
             </a:fld>
             <a:endParaRPr lang="de-DE"/>
           </a:p>
@@ -5543,7 +5513,7 @@
           <a:p>
             <a:fld id="{DAFA5E08-56C4-4D00-93E8-8E8047A8DE89}" type="datetime1">
               <a:rPr lang="de-DE" smtClean="0"/>
-              <a:t>29.09.2022</a:t>
+              <a:t>05.10.2022</a:t>
             </a:fld>
             <a:endParaRPr lang="de-DE"/>
           </a:p>
@@ -5588,7 +5558,7 @@
           <a:p>
             <a:fld id="{3A1F27E2-D58A-4028-9FF2-B12D897F257E}" type="slidenum">
               <a:rPr lang="de-DE" smtClean="0"/>
-              <a:t>‹Nr.›</a:t>
+              <a:t>‹#›</a:t>
             </a:fld>
             <a:endParaRPr lang="de-DE"/>
           </a:p>
@@ -5719,7 +5689,7 @@
           <a:p>
             <a:fld id="{7CE3AD37-5ABD-4692-BEC2-A42E3889EE4D}" type="datetime1">
               <a:rPr lang="de-DE" smtClean="0"/>
-              <a:t>29.09.2022</a:t>
+              <a:t>05.10.2022</a:t>
             </a:fld>
             <a:endParaRPr lang="de-DE"/>
           </a:p>
@@ -5764,7 +5734,7 @@
           <a:p>
             <a:fld id="{3A1F27E2-D58A-4028-9FF2-B12D897F257E}" type="slidenum">
               <a:rPr lang="de-DE" smtClean="0"/>
-              <a:t>‹Nr.›</a:t>
+              <a:t>‹#›</a:t>
             </a:fld>
             <a:endParaRPr lang="de-DE"/>
           </a:p>
@@ -5869,7 +5839,7 @@
           <a:p>
             <a:fld id="{928CC653-232E-48C4-B8E8-A0241EBA0795}" type="datetime1">
               <a:rPr lang="de-DE" smtClean="0"/>
-              <a:t>29.09.2022</a:t>
+              <a:t>05.10.2022</a:t>
             </a:fld>
             <a:endParaRPr lang="de-DE"/>
           </a:p>
@@ -5914,7 +5884,7 @@
           <a:p>
             <a:fld id="{3A1F27E2-D58A-4028-9FF2-B12D897F257E}" type="slidenum">
               <a:rPr lang="de-DE" smtClean="0"/>
-              <a:t>‹Nr.›</a:t>
+              <a:t>‹#›</a:t>
             </a:fld>
             <a:endParaRPr lang="de-DE"/>
           </a:p>
@@ -5967,7 +5937,7 @@
           <a:p>
             <a:fld id="{E83E20E9-81C0-4ABC-AE04-EB499B127B15}" type="datetime1">
               <a:rPr lang="de-DE" smtClean="0"/>
-              <a:t>29.09.2022</a:t>
+              <a:t>05.10.2022</a:t>
             </a:fld>
             <a:endParaRPr lang="de-DE"/>
           </a:p>
@@ -6012,7 +5982,7 @@
           <a:p>
             <a:fld id="{3A1F27E2-D58A-4028-9FF2-B12D897F257E}" type="slidenum">
               <a:rPr lang="de-DE" smtClean="0"/>
-              <a:t>‹Nr.›</a:t>
+              <a:t>‹#›</a:t>
             </a:fld>
             <a:endParaRPr lang="de-DE"/>
           </a:p>
@@ -6091,7 +6061,7 @@
           <a:p>
             <a:fld id="{40D99F92-1030-4142-B53F-F0FAA5D39B24}" type="datetime1">
               <a:rPr lang="de-DE" smtClean="0"/>
-              <a:t>29.09.2022</a:t>
+              <a:t>05.10.2022</a:t>
             </a:fld>
             <a:endParaRPr lang="de-DE"/>
           </a:p>
@@ -6136,7 +6106,7 @@
           <a:p>
             <a:fld id="{3A1F27E2-D58A-4028-9FF2-B12D897F257E}" type="slidenum">
               <a:rPr lang="de-DE" smtClean="0"/>
-              <a:t>‹Nr.›</a:t>
+              <a:t>‹#›</a:t>
             </a:fld>
             <a:endParaRPr lang="de-DE"/>
           </a:p>
@@ -6275,7 +6245,7 @@
           <a:p>
             <a:fld id="{71988543-CE63-49C4-AF7F-C87F3B679192}" type="datetime1">
               <a:rPr lang="de-DE" smtClean="0"/>
-              <a:t>29.09.2022</a:t>
+              <a:t>05.10.2022</a:t>
             </a:fld>
             <a:endParaRPr lang="de-DE"/>
           </a:p>
@@ -6320,7 +6290,7 @@
           <a:p>
             <a:fld id="{3A1F27E2-D58A-4028-9FF2-B12D897F257E}" type="slidenum">
               <a:rPr lang="de-DE" smtClean="0"/>
-              <a:t>‹Nr.›</a:t>
+              <a:t>‹#›</a:t>
             </a:fld>
             <a:endParaRPr lang="de-DE"/>
           </a:p>
@@ -6480,7 +6450,7 @@
           <a:p>
             <a:fld id="{5D221FBA-B6C3-4E3C-B071-170A70C47015}" type="datetime1">
               <a:rPr lang="de-DE" smtClean="0"/>
-              <a:t>29.09.2022</a:t>
+              <a:t>05.10.2022</a:t>
             </a:fld>
             <a:endParaRPr lang="de-DE"/>
           </a:p>
@@ -6525,7 +6495,7 @@
           <a:p>
             <a:fld id="{3A1F27E2-D58A-4028-9FF2-B12D897F257E}" type="slidenum">
               <a:rPr lang="de-DE" smtClean="0"/>
-              <a:t>‹Nr.›</a:t>
+              <a:t>‹#›</a:t>
             </a:fld>
             <a:endParaRPr lang="de-DE"/>
           </a:p>
@@ -6838,7 +6808,7 @@
           <a:p>
             <a:fld id="{990527E8-55A3-4E9A-A49F-ADA7D9BD24A6}" type="datetime1">
               <a:rPr lang="de-DE" smtClean="0"/>
-              <a:t>29.09.2022</a:t>
+              <a:t>05.10.2022</a:t>
             </a:fld>
             <a:endParaRPr lang="de-DE" dirty="0"/>
           </a:p>
@@ -6925,7 +6895,7 @@
             <a:fld id="{3A1F27E2-D58A-4028-9FF2-B12D897F257E}" type="slidenum">
               <a:rPr lang="de-DE" smtClean="0"/>
               <a:pPr/>
-              <a:t>‹Nr.›</a:t>
+              <a:t>‹#›</a:t>
             </a:fld>
             <a:endParaRPr lang="de-DE"/>
           </a:p>
@@ -7479,7 +7449,7 @@
           <a:p>
             <a:fld id="{ADC6AC59-7092-41FF-BAE3-16B17FCDA478}" type="datetime1">
               <a:rPr lang="de-DE" smtClean="0"/>
-              <a:t>29.09.2022</a:t>
+              <a:t>05.10.2022</a:t>
             </a:fld>
             <a:endParaRPr lang="de-DE" dirty="0"/>
           </a:p>
@@ -7566,7 +7536,7 @@
             <a:fld id="{3A1F27E2-D58A-4028-9FF2-B12D897F257E}" type="slidenum">
               <a:rPr lang="de-DE" smtClean="0"/>
               <a:pPr/>
-              <a:t>‹Nr.›</a:t>
+              <a:t>‹#›</a:t>
             </a:fld>
             <a:endParaRPr lang="de-DE" dirty="0"/>
           </a:p>
@@ -7649,7 +7619,7 @@
           <p:cNvPr id="11" name="Grafik 10">
             <a:extLst>
               <a:ext uri="{FF2B5EF4-FFF2-40B4-BE49-F238E27FC236}">
-                <a16:creationId xmlns:a16="http://schemas.microsoft.com/office/drawing/2014/main" xmlns="" id="{C4559D41-751B-4D7C-9655-A71341095138}"/>
+                <a16:creationId xmlns:a16="http://schemas.microsoft.com/office/drawing/2014/main" id="{C4559D41-751B-4D7C-9655-A71341095138}"/>
               </a:ext>
             </a:extLst>
           </p:cNvPr>
@@ -7685,7 +7655,7 @@
           <p:cNvPr id="14" name="Straight Connector 6">
             <a:extLst>
               <a:ext uri="{FF2B5EF4-FFF2-40B4-BE49-F238E27FC236}">
-                <a16:creationId xmlns:a16="http://schemas.microsoft.com/office/drawing/2014/main" xmlns="" id="{C797F233-091D-4DE9-86F5-01F20A8E02B8}"/>
+                <a16:creationId xmlns:a16="http://schemas.microsoft.com/office/drawing/2014/main" id="{C797F233-091D-4DE9-86F5-01F20A8E02B8}"/>
               </a:ext>
             </a:extLst>
           </p:cNvPr>
@@ -8151,7 +8121,7 @@
           <a:p>
             <a:fld id="{98371805-B777-4F9B-8B57-8DFA4E0BDD1E}" type="datetime1">
               <a:rPr lang="de-DE" smtClean="0"/>
-              <a:t>29.09.2022</a:t>
+              <a:t>05.10.2022</a:t>
             </a:fld>
             <a:endParaRPr lang="de-DE"/>
           </a:p>
@@ -8212,13 +8182,6 @@
   <p:clrMapOvr>
     <a:masterClrMapping/>
   </p:clrMapOvr>
-  <p:timing>
-    <p:tnLst>
-      <p:par>
-        <p:cTn id="1" dur="indefinite" restart="never" nodeType="tmRoot"/>
-      </p:par>
-    </p:tnLst>
-  </p:timing>
 </p:sld>
 </file>
 
@@ -8244,7 +8207,7 @@
           <p:cNvPr id="2" name="Titel 1">
             <a:extLst>
               <a:ext uri="{FF2B5EF4-FFF2-40B4-BE49-F238E27FC236}">
-                <a16:creationId xmlns:a16="http://schemas.microsoft.com/office/drawing/2014/main" xmlns="" id="{98DA1DC6-2840-43C2-BADE-8F04EB7CC782}"/>
+                <a16:creationId xmlns:a16="http://schemas.microsoft.com/office/drawing/2014/main" id="{98DA1DC6-2840-43C2-BADE-8F04EB7CC782}"/>
               </a:ext>
             </a:extLst>
           </p:cNvPr>
@@ -8272,7 +8235,7 @@
           <p:cNvPr id="3" name="Inhaltsplatzhalter 2">
             <a:extLst>
               <a:ext uri="{FF2B5EF4-FFF2-40B4-BE49-F238E27FC236}">
-                <a16:creationId xmlns:a16="http://schemas.microsoft.com/office/drawing/2014/main" xmlns="" id="{DFF29FE4-BCC1-4A5E-A85A-C669153D7311}"/>
+                <a16:creationId xmlns:a16="http://schemas.microsoft.com/office/drawing/2014/main" id="{DFF29FE4-BCC1-4A5E-A85A-C669153D7311}"/>
               </a:ext>
             </a:extLst>
           </p:cNvPr>
@@ -8388,7 +8351,7 @@
           <p:cNvPr id="4" name="Datumsplatzhalter 3">
             <a:extLst>
               <a:ext uri="{FF2B5EF4-FFF2-40B4-BE49-F238E27FC236}">
-                <a16:creationId xmlns:a16="http://schemas.microsoft.com/office/drawing/2014/main" xmlns="" id="{595E5A5A-8A37-465E-954A-A950D7B72763}"/>
+                <a16:creationId xmlns:a16="http://schemas.microsoft.com/office/drawing/2014/main" id="{595E5A5A-8A37-465E-954A-A950D7B72763}"/>
               </a:ext>
             </a:extLst>
           </p:cNvPr>
@@ -8406,7 +8369,7 @@
           <a:p>
             <a:fld id="{DAFA5E08-56C4-4D00-93E8-8E8047A8DE89}" type="datetime1">
               <a:rPr lang="de-DE" smtClean="0"/>
-              <a:t>29.09.2022</a:t>
+              <a:t>05.10.2022</a:t>
             </a:fld>
             <a:endParaRPr lang="de-DE"/>
           </a:p>
@@ -8417,7 +8380,7 @@
           <p:cNvPr id="5" name="Fußzeilenplatzhalter 4">
             <a:extLst>
               <a:ext uri="{FF2B5EF4-FFF2-40B4-BE49-F238E27FC236}">
-                <a16:creationId xmlns:a16="http://schemas.microsoft.com/office/drawing/2014/main" xmlns="" id="{4F195F40-8F35-481F-B4C6-EC37F0A4A33C}"/>
+                <a16:creationId xmlns:a16="http://schemas.microsoft.com/office/drawing/2014/main" id="{4F195F40-8F35-481F-B4C6-EC37F0A4A33C}"/>
               </a:ext>
             </a:extLst>
           </p:cNvPr>
@@ -8445,7 +8408,7 @@
           <p:cNvPr id="6" name="Foliennummernplatzhalter 5">
             <a:extLst>
               <a:ext uri="{FF2B5EF4-FFF2-40B4-BE49-F238E27FC236}">
-                <a16:creationId xmlns:a16="http://schemas.microsoft.com/office/drawing/2014/main" xmlns="" id="{60362E32-2D99-4065-BB41-DF3E484CEB24}"/>
+                <a16:creationId xmlns:a16="http://schemas.microsoft.com/office/drawing/2014/main" id="{60362E32-2D99-4065-BB41-DF3E484CEB24}"/>
               </a:ext>
             </a:extLst>
           </p:cNvPr>
@@ -8474,7 +8437,7 @@
           <p:cNvPr id="8" name="Grafik 7">
             <a:extLst>
               <a:ext uri="{FF2B5EF4-FFF2-40B4-BE49-F238E27FC236}">
-                <a16:creationId xmlns:a16="http://schemas.microsoft.com/office/drawing/2014/main" xmlns="" id="{CAFD8B39-204A-4ECC-B94D-4CF5C8B19051}"/>
+                <a16:creationId xmlns:a16="http://schemas.microsoft.com/office/drawing/2014/main" id="{CAFD8B39-204A-4ECC-B94D-4CF5C8B19051}"/>
               </a:ext>
             </a:extLst>
           </p:cNvPr>
@@ -8510,7 +8473,7 @@
           <p:cNvPr id="9" name="Gerader Verbinder 8">
             <a:extLst>
               <a:ext uri="{FF2B5EF4-FFF2-40B4-BE49-F238E27FC236}">
-                <a16:creationId xmlns:a16="http://schemas.microsoft.com/office/drawing/2014/main" xmlns="" id="{AC9A9245-36C6-413B-8DEB-567A901F157B}"/>
+                <a16:creationId xmlns:a16="http://schemas.microsoft.com/office/drawing/2014/main" id="{AC9A9245-36C6-413B-8DEB-567A901F157B}"/>
               </a:ext>
             </a:extLst>
           </p:cNvPr>
@@ -8553,13 +8516,6 @@
   <p:clrMapOvr>
     <a:masterClrMapping/>
   </p:clrMapOvr>
-  <p:timing>
-    <p:tnLst>
-      <p:par>
-        <p:cTn id="1" dur="indefinite" restart="never" nodeType="tmRoot"/>
-      </p:par>
-    </p:tnLst>
-  </p:timing>
 </p:sld>
 </file>
 
@@ -8585,7 +8541,7 @@
           <p:cNvPr id="2" name="Titel 1">
             <a:extLst>
               <a:ext uri="{FF2B5EF4-FFF2-40B4-BE49-F238E27FC236}">
-                <a16:creationId xmlns:a16="http://schemas.microsoft.com/office/drawing/2014/main" xmlns="" id="{93A6331E-A8C4-486C-A64C-8B9C696F1F33}"/>
+                <a16:creationId xmlns:a16="http://schemas.microsoft.com/office/drawing/2014/main" id="{93A6331E-A8C4-486C-A64C-8B9C696F1F33}"/>
               </a:ext>
             </a:extLst>
           </p:cNvPr>
@@ -8613,7 +8569,7 @@
           <p:cNvPr id="3" name="Inhaltsplatzhalter 2">
             <a:extLst>
               <a:ext uri="{FF2B5EF4-FFF2-40B4-BE49-F238E27FC236}">
-                <a16:creationId xmlns:a16="http://schemas.microsoft.com/office/drawing/2014/main" xmlns="" id="{25831F29-3E28-41E5-A5D4-1FF3105A70F1}"/>
+                <a16:creationId xmlns:a16="http://schemas.microsoft.com/office/drawing/2014/main" id="{25831F29-3E28-41E5-A5D4-1FF3105A70F1}"/>
               </a:ext>
             </a:extLst>
           </p:cNvPr>
@@ -8720,7 +8676,7 @@
           <p:cNvPr id="4" name="Datumsplatzhalter 3">
             <a:extLst>
               <a:ext uri="{FF2B5EF4-FFF2-40B4-BE49-F238E27FC236}">
-                <a16:creationId xmlns:a16="http://schemas.microsoft.com/office/drawing/2014/main" xmlns="" id="{D9EC2A7A-2AD4-4758-BB7E-5E81354AC985}"/>
+                <a16:creationId xmlns:a16="http://schemas.microsoft.com/office/drawing/2014/main" id="{D9EC2A7A-2AD4-4758-BB7E-5E81354AC985}"/>
               </a:ext>
             </a:extLst>
           </p:cNvPr>
@@ -8738,7 +8694,7 @@
           <a:p>
             <a:fld id="{DAFA5E08-56C4-4D00-93E8-8E8047A8DE89}" type="datetime1">
               <a:rPr lang="de-DE" smtClean="0"/>
-              <a:t>29.09.2022</a:t>
+              <a:t>05.10.2022</a:t>
             </a:fld>
             <a:endParaRPr lang="de-DE"/>
           </a:p>
@@ -8749,7 +8705,7 @@
           <p:cNvPr id="5" name="Fußzeilenplatzhalter 4">
             <a:extLst>
               <a:ext uri="{FF2B5EF4-FFF2-40B4-BE49-F238E27FC236}">
-                <a16:creationId xmlns:a16="http://schemas.microsoft.com/office/drawing/2014/main" xmlns="" id="{55AA4FF6-2A08-4BC2-87D9-3C7B11095DB9}"/>
+                <a16:creationId xmlns:a16="http://schemas.microsoft.com/office/drawing/2014/main" id="{55AA4FF6-2A08-4BC2-87D9-3C7B11095DB9}"/>
               </a:ext>
             </a:extLst>
           </p:cNvPr>
@@ -8777,7 +8733,7 @@
           <p:cNvPr id="6" name="Foliennummernplatzhalter 5">
             <a:extLst>
               <a:ext uri="{FF2B5EF4-FFF2-40B4-BE49-F238E27FC236}">
-                <a16:creationId xmlns:a16="http://schemas.microsoft.com/office/drawing/2014/main" xmlns="" id="{E277469C-8922-4D6D-A38C-297797F4ED4D}"/>
+                <a16:creationId xmlns:a16="http://schemas.microsoft.com/office/drawing/2014/main" id="{E277469C-8922-4D6D-A38C-297797F4ED4D}"/>
               </a:ext>
             </a:extLst>
           </p:cNvPr>
@@ -8811,13 +8767,6 @@
   <p:clrMapOvr>
     <a:masterClrMapping/>
   </p:clrMapOvr>
-  <p:timing>
-    <p:tnLst>
-      <p:par>
-        <p:cTn id="1" dur="indefinite" restart="never" nodeType="tmRoot"/>
-      </p:par>
-    </p:tnLst>
-  </p:timing>
 </p:sld>
 </file>
 
@@ -8843,7 +8792,7 @@
           <p:cNvPr id="2" name="Titel 1">
             <a:extLst>
               <a:ext uri="{FF2B5EF4-FFF2-40B4-BE49-F238E27FC236}">
-                <a16:creationId xmlns:a16="http://schemas.microsoft.com/office/drawing/2014/main" xmlns="" id="{2AD4A0AE-E61B-471F-BF8D-5365EDCF6D86}"/>
+                <a16:creationId xmlns:a16="http://schemas.microsoft.com/office/drawing/2014/main" id="{2AD4A0AE-E61B-471F-BF8D-5365EDCF6D86}"/>
               </a:ext>
             </a:extLst>
           </p:cNvPr>
@@ -8876,7 +8825,7 @@
           <p:cNvPr id="3" name="Inhaltsplatzhalter 2">
             <a:extLst>
               <a:ext uri="{FF2B5EF4-FFF2-40B4-BE49-F238E27FC236}">
-                <a16:creationId xmlns:a16="http://schemas.microsoft.com/office/drawing/2014/main" xmlns="" id="{6C4027E6-6CFA-48B6-81B7-4C4C0B388C7B}"/>
+                <a16:creationId xmlns:a16="http://schemas.microsoft.com/office/drawing/2014/main" id="{6C4027E6-6CFA-48B6-81B7-4C4C0B388C7B}"/>
               </a:ext>
             </a:extLst>
           </p:cNvPr>
@@ -8907,7 +8856,7 @@
           <p:cNvPr id="4" name="Datumsplatzhalter 3">
             <a:extLst>
               <a:ext uri="{FF2B5EF4-FFF2-40B4-BE49-F238E27FC236}">
-                <a16:creationId xmlns:a16="http://schemas.microsoft.com/office/drawing/2014/main" xmlns="" id="{591CD9E4-C636-42B1-99C6-BF1405435B93}"/>
+                <a16:creationId xmlns:a16="http://schemas.microsoft.com/office/drawing/2014/main" id="{591CD9E4-C636-42B1-99C6-BF1405435B93}"/>
               </a:ext>
             </a:extLst>
           </p:cNvPr>
@@ -8925,7 +8874,7 @@
           <a:p>
             <a:fld id="{DAFA5E08-56C4-4D00-93E8-8E8047A8DE89}" type="datetime1">
               <a:rPr lang="de-DE" smtClean="0"/>
-              <a:t>29.09.2022</a:t>
+              <a:t>05.10.2022</a:t>
             </a:fld>
             <a:endParaRPr lang="de-DE"/>
           </a:p>
@@ -8936,7 +8885,7 @@
           <p:cNvPr id="5" name="Fußzeilenplatzhalter 4">
             <a:extLst>
               <a:ext uri="{FF2B5EF4-FFF2-40B4-BE49-F238E27FC236}">
-                <a16:creationId xmlns:a16="http://schemas.microsoft.com/office/drawing/2014/main" xmlns="" id="{FF5A3F88-F046-4DFD-A592-32A456C9D19E}"/>
+                <a16:creationId xmlns:a16="http://schemas.microsoft.com/office/drawing/2014/main" id="{FF5A3F88-F046-4DFD-A592-32A456C9D19E}"/>
               </a:ext>
             </a:extLst>
           </p:cNvPr>
@@ -8964,7 +8913,7 @@
           <p:cNvPr id="6" name="Foliennummernplatzhalter 5">
             <a:extLst>
               <a:ext uri="{FF2B5EF4-FFF2-40B4-BE49-F238E27FC236}">
-                <a16:creationId xmlns:a16="http://schemas.microsoft.com/office/drawing/2014/main" xmlns="" id="{337959C4-1262-4187-BB96-6DE1F5668633}"/>
+                <a16:creationId xmlns:a16="http://schemas.microsoft.com/office/drawing/2014/main" id="{337959C4-1262-4187-BB96-6DE1F5668633}"/>
               </a:ext>
             </a:extLst>
           </p:cNvPr>
@@ -8993,7 +8942,7 @@
           <p:cNvPr id="1026" name="Picture 2">
             <a:extLst>
               <a:ext uri="{FF2B5EF4-FFF2-40B4-BE49-F238E27FC236}">
-                <a16:creationId xmlns:a16="http://schemas.microsoft.com/office/drawing/2014/main" xmlns="" id="{9BC0F9EA-0507-46A4-A609-B12C87CCAFE5}"/>
+                <a16:creationId xmlns:a16="http://schemas.microsoft.com/office/drawing/2014/main" id="{9BC0F9EA-0507-46A4-A609-B12C87CCAFE5}"/>
               </a:ext>
             </a:extLst>
           </p:cNvPr>
@@ -9043,14 +8992,6 @@
   <p:clrMapOvr>
     <a:masterClrMapping/>
   </p:clrMapOvr>
-  <mc:AlternateContent xmlns:mc="http://schemas.openxmlformats.org/markup-compatibility/2006" xmlns:p14="http://schemas.microsoft.com/office/powerpoint/2010/main">
-    <mc:Choice Requires="p14">
-      <p:transition spd="slow" p14:dur="2000"/>
-    </mc:Choice>
-    <mc:Fallback xmlns="">
-      <p:transition spd="slow"/>
-    </mc:Fallback>
-  </mc:AlternateContent>
 </p:sld>
 </file>
 
@@ -9076,7 +9017,7 @@
           <p:cNvPr id="2" name="Titel 1">
             <a:extLst>
               <a:ext uri="{FF2B5EF4-FFF2-40B4-BE49-F238E27FC236}">
-                <a16:creationId xmlns:a16="http://schemas.microsoft.com/office/drawing/2014/main" xmlns="" id="{E97A0CCE-7604-495E-BD3D-6BBFAE588EA1}"/>
+                <a16:creationId xmlns:a16="http://schemas.microsoft.com/office/drawing/2014/main" id="{E97A0CCE-7604-495E-BD3D-6BBFAE588EA1}"/>
               </a:ext>
             </a:extLst>
           </p:cNvPr>
@@ -9112,7 +9053,7 @@
           <p:cNvPr id="3" name="Inhaltsplatzhalter 2">
             <a:extLst>
               <a:ext uri="{FF2B5EF4-FFF2-40B4-BE49-F238E27FC236}">
-                <a16:creationId xmlns:a16="http://schemas.microsoft.com/office/drawing/2014/main" xmlns="" id="{BCC85DE8-76B6-48E7-AD4E-1AD7D41B1A54}"/>
+                <a16:creationId xmlns:a16="http://schemas.microsoft.com/office/drawing/2014/main" id="{BCC85DE8-76B6-48E7-AD4E-1AD7D41B1A54}"/>
               </a:ext>
             </a:extLst>
           </p:cNvPr>
@@ -9160,7 +9101,7 @@
           <p:cNvPr id="4" name="Datumsplatzhalter 3">
             <a:extLst>
               <a:ext uri="{FF2B5EF4-FFF2-40B4-BE49-F238E27FC236}">
-                <a16:creationId xmlns:a16="http://schemas.microsoft.com/office/drawing/2014/main" xmlns="" id="{21BFED41-FDA6-45E1-968D-56ADBB1F3B6A}"/>
+                <a16:creationId xmlns:a16="http://schemas.microsoft.com/office/drawing/2014/main" id="{21BFED41-FDA6-45E1-968D-56ADBB1F3B6A}"/>
               </a:ext>
             </a:extLst>
           </p:cNvPr>
@@ -9178,7 +9119,7 @@
           <a:p>
             <a:fld id="{DAFA5E08-56C4-4D00-93E8-8E8047A8DE89}" type="datetime1">
               <a:rPr lang="de-DE" smtClean="0"/>
-              <a:t>29.09.2022</a:t>
+              <a:t>05.10.2022</a:t>
             </a:fld>
             <a:endParaRPr lang="de-DE"/>
           </a:p>
@@ -9189,7 +9130,7 @@
           <p:cNvPr id="5" name="Fußzeilenplatzhalter 4">
             <a:extLst>
               <a:ext uri="{FF2B5EF4-FFF2-40B4-BE49-F238E27FC236}">
-                <a16:creationId xmlns:a16="http://schemas.microsoft.com/office/drawing/2014/main" xmlns="" id="{77DAE993-7879-47E2-95E1-6BE3D59B4C09}"/>
+                <a16:creationId xmlns:a16="http://schemas.microsoft.com/office/drawing/2014/main" id="{77DAE993-7879-47E2-95E1-6BE3D59B4C09}"/>
               </a:ext>
             </a:extLst>
           </p:cNvPr>
@@ -9217,7 +9158,7 @@
           <p:cNvPr id="6" name="Foliennummernplatzhalter 5">
             <a:extLst>
               <a:ext uri="{FF2B5EF4-FFF2-40B4-BE49-F238E27FC236}">
-                <a16:creationId xmlns:a16="http://schemas.microsoft.com/office/drawing/2014/main" xmlns="" id="{C965A3D1-CC5F-4F5C-BC6D-CD7B976DBE8E}"/>
+                <a16:creationId xmlns:a16="http://schemas.microsoft.com/office/drawing/2014/main" id="{C965A3D1-CC5F-4F5C-BC6D-CD7B976DBE8E}"/>
               </a:ext>
             </a:extLst>
           </p:cNvPr>
@@ -9246,7 +9187,7 @@
           <p:cNvPr id="15" name="Gruppieren 14">
             <a:extLst>
               <a:ext uri="{FF2B5EF4-FFF2-40B4-BE49-F238E27FC236}">
-                <a16:creationId xmlns:a16="http://schemas.microsoft.com/office/drawing/2014/main" xmlns="" id="{B476B94E-D4A2-4F1F-A51F-701D74ACE5D9}"/>
+                <a16:creationId xmlns:a16="http://schemas.microsoft.com/office/drawing/2014/main" id="{B476B94E-D4A2-4F1F-A51F-701D74ACE5D9}"/>
               </a:ext>
             </a:extLst>
           </p:cNvPr>
@@ -9266,7 +9207,7 @@
             <p:cNvPr id="8" name="Grafik 7">
               <a:extLst>
                 <a:ext uri="{FF2B5EF4-FFF2-40B4-BE49-F238E27FC236}">
-                  <a16:creationId xmlns:a16="http://schemas.microsoft.com/office/drawing/2014/main" xmlns="" id="{8EAEB599-93CC-4D5F-B943-7DF00958055D}"/>
+                  <a16:creationId xmlns:a16="http://schemas.microsoft.com/office/drawing/2014/main" id="{8EAEB599-93CC-4D5F-B943-7DF00958055D}"/>
                 </a:ext>
               </a:extLst>
             </p:cNvPr>
@@ -9296,7 +9237,7 @@
             <p:cNvPr id="10" name="Grafik 9">
               <a:extLst>
                 <a:ext uri="{FF2B5EF4-FFF2-40B4-BE49-F238E27FC236}">
-                  <a16:creationId xmlns:a16="http://schemas.microsoft.com/office/drawing/2014/main" xmlns="" id="{C507A51E-B377-4C60-A101-0D25902317C5}"/>
+                  <a16:creationId xmlns:a16="http://schemas.microsoft.com/office/drawing/2014/main" id="{C507A51E-B377-4C60-A101-0D25902317C5}"/>
                 </a:ext>
               </a:extLst>
             </p:cNvPr>
@@ -9326,7 +9267,7 @@
             <p:cNvPr id="12" name="Grafik 11">
               <a:extLst>
                 <a:ext uri="{FF2B5EF4-FFF2-40B4-BE49-F238E27FC236}">
-                  <a16:creationId xmlns:a16="http://schemas.microsoft.com/office/drawing/2014/main" xmlns="" id="{5FB676AB-56E1-4BBF-80D2-2D0AB1F6A852}"/>
+                  <a16:creationId xmlns:a16="http://schemas.microsoft.com/office/drawing/2014/main" id="{5FB676AB-56E1-4BBF-80D2-2D0AB1F6A852}"/>
                 </a:ext>
               </a:extLst>
             </p:cNvPr>
@@ -9356,7 +9297,7 @@
             <p:cNvPr id="14" name="Grafik 13">
               <a:extLst>
                 <a:ext uri="{FF2B5EF4-FFF2-40B4-BE49-F238E27FC236}">
-                  <a16:creationId xmlns:a16="http://schemas.microsoft.com/office/drawing/2014/main" xmlns="" id="{C178C23A-8CBD-4443-986A-36FD7ED85C0F}"/>
+                  <a16:creationId xmlns:a16="http://schemas.microsoft.com/office/drawing/2014/main" id="{C178C23A-8CBD-4443-986A-36FD7ED85C0F}"/>
                 </a:ext>
               </a:extLst>
             </p:cNvPr>
@@ -9392,13 +9333,6 @@
   <p:clrMapOvr>
     <a:masterClrMapping/>
   </p:clrMapOvr>
-  <p:timing>
-    <p:tnLst>
-      <p:par>
-        <p:cTn id="1" dur="indefinite" restart="never" nodeType="tmRoot"/>
-      </p:par>
-    </p:tnLst>
-  </p:timing>
 </p:sld>
 </file>
 
@@ -9424,7 +9358,7 @@
           <p:cNvPr id="2" name="Titel 1">
             <a:extLst>
               <a:ext uri="{FF2B5EF4-FFF2-40B4-BE49-F238E27FC236}">
-                <a16:creationId xmlns:a16="http://schemas.microsoft.com/office/drawing/2014/main" xmlns="" id="{98DA1DC6-2840-43C2-BADE-8F04EB7CC782}"/>
+                <a16:creationId xmlns:a16="http://schemas.microsoft.com/office/drawing/2014/main" id="{98DA1DC6-2840-43C2-BADE-8F04EB7CC782}"/>
               </a:ext>
             </a:extLst>
           </p:cNvPr>
@@ -9452,7 +9386,7 @@
           <p:cNvPr id="3" name="Inhaltsplatzhalter 2">
             <a:extLst>
               <a:ext uri="{FF2B5EF4-FFF2-40B4-BE49-F238E27FC236}">
-                <a16:creationId xmlns:a16="http://schemas.microsoft.com/office/drawing/2014/main" xmlns="" id="{DFF29FE4-BCC1-4A5E-A85A-C669153D7311}"/>
+                <a16:creationId xmlns:a16="http://schemas.microsoft.com/office/drawing/2014/main" id="{DFF29FE4-BCC1-4A5E-A85A-C669153D7311}"/>
               </a:ext>
             </a:extLst>
           </p:cNvPr>
@@ -9501,7 +9435,7 @@
           <p:cNvPr id="4" name="Datumsplatzhalter 3">
             <a:extLst>
               <a:ext uri="{FF2B5EF4-FFF2-40B4-BE49-F238E27FC236}">
-                <a16:creationId xmlns:a16="http://schemas.microsoft.com/office/drawing/2014/main" xmlns="" id="{595E5A5A-8A37-465E-954A-A950D7B72763}"/>
+                <a16:creationId xmlns:a16="http://schemas.microsoft.com/office/drawing/2014/main" id="{595E5A5A-8A37-465E-954A-A950D7B72763}"/>
               </a:ext>
             </a:extLst>
           </p:cNvPr>
@@ -9519,7 +9453,7 @@
           <a:p>
             <a:fld id="{DAFA5E08-56C4-4D00-93E8-8E8047A8DE89}" type="datetime1">
               <a:rPr lang="de-DE" smtClean="0"/>
-              <a:t>29.09.2022</a:t>
+              <a:t>05.10.2022</a:t>
             </a:fld>
             <a:endParaRPr lang="de-DE"/>
           </a:p>
@@ -9530,7 +9464,7 @@
           <p:cNvPr id="5" name="Fußzeilenplatzhalter 4">
             <a:extLst>
               <a:ext uri="{FF2B5EF4-FFF2-40B4-BE49-F238E27FC236}">
-                <a16:creationId xmlns:a16="http://schemas.microsoft.com/office/drawing/2014/main" xmlns="" id="{4F195F40-8F35-481F-B4C6-EC37F0A4A33C}"/>
+                <a16:creationId xmlns:a16="http://schemas.microsoft.com/office/drawing/2014/main" id="{4F195F40-8F35-481F-B4C6-EC37F0A4A33C}"/>
               </a:ext>
             </a:extLst>
           </p:cNvPr>
@@ -9558,7 +9492,7 @@
           <p:cNvPr id="6" name="Foliennummernplatzhalter 5">
             <a:extLst>
               <a:ext uri="{FF2B5EF4-FFF2-40B4-BE49-F238E27FC236}">
-                <a16:creationId xmlns:a16="http://schemas.microsoft.com/office/drawing/2014/main" xmlns="" id="{60362E32-2D99-4065-BB41-DF3E484CEB24}"/>
+                <a16:creationId xmlns:a16="http://schemas.microsoft.com/office/drawing/2014/main" id="{60362E32-2D99-4065-BB41-DF3E484CEB24}"/>
               </a:ext>
             </a:extLst>
           </p:cNvPr>
@@ -9587,7 +9521,7 @@
           <p:cNvPr id="15" name="Gruppieren 14">
             <a:extLst>
               <a:ext uri="{FF2B5EF4-FFF2-40B4-BE49-F238E27FC236}">
-                <a16:creationId xmlns:a16="http://schemas.microsoft.com/office/drawing/2014/main" xmlns="" id="{B5687E92-1084-4A59-AF1F-381C1419B04B}"/>
+                <a16:creationId xmlns:a16="http://schemas.microsoft.com/office/drawing/2014/main" id="{B5687E92-1084-4A59-AF1F-381C1419B04B}"/>
               </a:ext>
             </a:extLst>
           </p:cNvPr>
@@ -9607,7 +9541,7 @@
             <p:cNvPr id="8" name="Grafik 7">
               <a:extLst>
                 <a:ext uri="{FF2B5EF4-FFF2-40B4-BE49-F238E27FC236}">
-                  <a16:creationId xmlns:a16="http://schemas.microsoft.com/office/drawing/2014/main" xmlns="" id="{216200D2-90FD-4B50-9098-4AA7DA04FEBC}"/>
+                  <a16:creationId xmlns:a16="http://schemas.microsoft.com/office/drawing/2014/main" id="{216200D2-90FD-4B50-9098-4AA7DA04FEBC}"/>
                 </a:ext>
               </a:extLst>
             </p:cNvPr>
@@ -9637,7 +9571,7 @@
             <p:cNvPr id="10" name="Grafik 9">
               <a:extLst>
                 <a:ext uri="{FF2B5EF4-FFF2-40B4-BE49-F238E27FC236}">
-                  <a16:creationId xmlns:a16="http://schemas.microsoft.com/office/drawing/2014/main" xmlns="" id="{D6902DD7-B93F-44B5-AAFD-3CD26E32F9C2}"/>
+                  <a16:creationId xmlns:a16="http://schemas.microsoft.com/office/drawing/2014/main" id="{D6902DD7-B93F-44B5-AAFD-3CD26E32F9C2}"/>
                 </a:ext>
               </a:extLst>
             </p:cNvPr>
@@ -9667,7 +9601,7 @@
             <p:cNvPr id="12" name="Grafik 11">
               <a:extLst>
                 <a:ext uri="{FF2B5EF4-FFF2-40B4-BE49-F238E27FC236}">
-                  <a16:creationId xmlns:a16="http://schemas.microsoft.com/office/drawing/2014/main" xmlns="" id="{6E4F34F6-CCB3-424E-96B2-9B346FADB004}"/>
+                  <a16:creationId xmlns:a16="http://schemas.microsoft.com/office/drawing/2014/main" id="{6E4F34F6-CCB3-424E-96B2-9B346FADB004}"/>
                 </a:ext>
               </a:extLst>
             </p:cNvPr>
@@ -9697,7 +9631,7 @@
             <p:cNvPr id="14" name="Grafik 13">
               <a:extLst>
                 <a:ext uri="{FF2B5EF4-FFF2-40B4-BE49-F238E27FC236}">
-                  <a16:creationId xmlns:a16="http://schemas.microsoft.com/office/drawing/2014/main" xmlns="" id="{6F82693E-6146-4536-8EA5-8A860C940A84}"/>
+                  <a16:creationId xmlns:a16="http://schemas.microsoft.com/office/drawing/2014/main" id="{6F82693E-6146-4536-8EA5-8A860C940A84}"/>
                 </a:ext>
               </a:extLst>
             </p:cNvPr>
@@ -9733,13 +9667,6 @@
   <p:clrMapOvr>
     <a:masterClrMapping/>
   </p:clrMapOvr>
-  <p:timing>
-    <p:tnLst>
-      <p:par>
-        <p:cTn id="1" dur="indefinite" restart="never" nodeType="tmRoot"/>
-      </p:par>
-    </p:tnLst>
-  </p:timing>
 </p:sld>
 </file>
 
@@ -9765,7 +9692,7 @@
           <p:cNvPr id="2" name="Titel 1">
             <a:extLst>
               <a:ext uri="{FF2B5EF4-FFF2-40B4-BE49-F238E27FC236}">
-                <a16:creationId xmlns:a16="http://schemas.microsoft.com/office/drawing/2014/main" xmlns="" id="{16ADB3E7-94B3-4ED3-A487-FD153446E9F0}"/>
+                <a16:creationId xmlns:a16="http://schemas.microsoft.com/office/drawing/2014/main" id="{16ADB3E7-94B3-4ED3-A487-FD153446E9F0}"/>
               </a:ext>
             </a:extLst>
           </p:cNvPr>
@@ -9793,7 +9720,7 @@
           <p:cNvPr id="3" name="Inhaltsplatzhalter 2">
             <a:extLst>
               <a:ext uri="{FF2B5EF4-FFF2-40B4-BE49-F238E27FC236}">
-                <a16:creationId xmlns:a16="http://schemas.microsoft.com/office/drawing/2014/main" xmlns="" id="{5DD76D7B-024D-4FFF-A509-6BF0CA8FED35}"/>
+                <a16:creationId xmlns:a16="http://schemas.microsoft.com/office/drawing/2014/main" id="{5DD76D7B-024D-4FFF-A509-6BF0CA8FED35}"/>
               </a:ext>
             </a:extLst>
           </p:cNvPr>
@@ -9821,7 +9748,7 @@
           <p:cNvPr id="4" name="Datumsplatzhalter 3">
             <a:extLst>
               <a:ext uri="{FF2B5EF4-FFF2-40B4-BE49-F238E27FC236}">
-                <a16:creationId xmlns:a16="http://schemas.microsoft.com/office/drawing/2014/main" xmlns="" id="{002941F6-2D27-433E-B664-5803BC7F9910}"/>
+                <a16:creationId xmlns:a16="http://schemas.microsoft.com/office/drawing/2014/main" id="{002941F6-2D27-433E-B664-5803BC7F9910}"/>
               </a:ext>
             </a:extLst>
           </p:cNvPr>
@@ -9839,7 +9766,7 @@
           <a:p>
             <a:fld id="{DAFA5E08-56C4-4D00-93E8-8E8047A8DE89}" type="datetime1">
               <a:rPr lang="de-DE" smtClean="0"/>
-              <a:t>29.09.2022</a:t>
+              <a:t>05.10.2022</a:t>
             </a:fld>
             <a:endParaRPr lang="de-DE"/>
           </a:p>
@@ -9850,7 +9777,7 @@
           <p:cNvPr id="5" name="Fußzeilenplatzhalter 4">
             <a:extLst>
               <a:ext uri="{FF2B5EF4-FFF2-40B4-BE49-F238E27FC236}">
-                <a16:creationId xmlns:a16="http://schemas.microsoft.com/office/drawing/2014/main" xmlns="" id="{731475E5-55C7-4800-A9D7-D8CB8F33E0B7}"/>
+                <a16:creationId xmlns:a16="http://schemas.microsoft.com/office/drawing/2014/main" id="{731475E5-55C7-4800-A9D7-D8CB8F33E0B7}"/>
               </a:ext>
             </a:extLst>
           </p:cNvPr>
@@ -9878,7 +9805,7 @@
           <p:cNvPr id="6" name="Foliennummernplatzhalter 5">
             <a:extLst>
               <a:ext uri="{FF2B5EF4-FFF2-40B4-BE49-F238E27FC236}">
-                <a16:creationId xmlns:a16="http://schemas.microsoft.com/office/drawing/2014/main" xmlns="" id="{6F7857CC-FA44-4105-9302-08B032DC721F}"/>
+                <a16:creationId xmlns:a16="http://schemas.microsoft.com/office/drawing/2014/main" id="{6F7857CC-FA44-4105-9302-08B032DC721F}"/>
               </a:ext>
             </a:extLst>
           </p:cNvPr>
@@ -9907,7 +9834,7 @@
           <p:cNvPr id="8" name="Grafik 7">
             <a:extLst>
               <a:ext uri="{FF2B5EF4-FFF2-40B4-BE49-F238E27FC236}">
-                <a16:creationId xmlns:a16="http://schemas.microsoft.com/office/drawing/2014/main" xmlns="" id="{4F7925CA-1F7A-44C8-AF59-2D647C9A032F}"/>
+                <a16:creationId xmlns:a16="http://schemas.microsoft.com/office/drawing/2014/main" id="{4F7925CA-1F7A-44C8-AF59-2D647C9A032F}"/>
               </a:ext>
             </a:extLst>
           </p:cNvPr>
@@ -9937,7 +9864,7 @@
           <p:cNvPr id="9" name="Rechteck 8">
             <a:extLst>
               <a:ext uri="{FF2B5EF4-FFF2-40B4-BE49-F238E27FC236}">
-                <a16:creationId xmlns:a16="http://schemas.microsoft.com/office/drawing/2014/main" xmlns="" id="{BFFD02EA-5BBD-47A8-A0E5-6BC08B796483}"/>
+                <a16:creationId xmlns:a16="http://schemas.microsoft.com/office/drawing/2014/main" id="{BFFD02EA-5BBD-47A8-A0E5-6BC08B796483}"/>
               </a:ext>
             </a:extLst>
           </p:cNvPr>
@@ -9994,13 +9921,6 @@
   <p:clrMapOvr>
     <a:masterClrMapping/>
   </p:clrMapOvr>
-  <p:timing>
-    <p:tnLst>
-      <p:par>
-        <p:cTn id="1" dur="indefinite" restart="never" nodeType="tmRoot"/>
-      </p:par>
-    </p:tnLst>
-  </p:timing>
 </p:sld>
 </file>
 
@@ -10026,7 +9946,7 @@
           <p:cNvPr id="2" name="Titel 1">
             <a:extLst>
               <a:ext uri="{FF2B5EF4-FFF2-40B4-BE49-F238E27FC236}">
-                <a16:creationId xmlns:a16="http://schemas.microsoft.com/office/drawing/2014/main" xmlns="" id="{16ADB3E7-94B3-4ED3-A487-FD153446E9F0}"/>
+                <a16:creationId xmlns:a16="http://schemas.microsoft.com/office/drawing/2014/main" id="{16ADB3E7-94B3-4ED3-A487-FD153446E9F0}"/>
               </a:ext>
             </a:extLst>
           </p:cNvPr>
@@ -10054,7 +9974,7 @@
           <p:cNvPr id="3" name="Inhaltsplatzhalter 2">
             <a:extLst>
               <a:ext uri="{FF2B5EF4-FFF2-40B4-BE49-F238E27FC236}">
-                <a16:creationId xmlns:a16="http://schemas.microsoft.com/office/drawing/2014/main" xmlns="" id="{5DD76D7B-024D-4FFF-A509-6BF0CA8FED35}"/>
+                <a16:creationId xmlns:a16="http://schemas.microsoft.com/office/drawing/2014/main" id="{5DD76D7B-024D-4FFF-A509-6BF0CA8FED35}"/>
               </a:ext>
             </a:extLst>
           </p:cNvPr>
@@ -10082,7 +10002,7 @@
           <p:cNvPr id="4" name="Datumsplatzhalter 3">
             <a:extLst>
               <a:ext uri="{FF2B5EF4-FFF2-40B4-BE49-F238E27FC236}">
-                <a16:creationId xmlns:a16="http://schemas.microsoft.com/office/drawing/2014/main" xmlns="" id="{002941F6-2D27-433E-B664-5803BC7F9910}"/>
+                <a16:creationId xmlns:a16="http://schemas.microsoft.com/office/drawing/2014/main" id="{002941F6-2D27-433E-B664-5803BC7F9910}"/>
               </a:ext>
             </a:extLst>
           </p:cNvPr>
@@ -10100,7 +10020,7 @@
           <a:p>
             <a:fld id="{DAFA5E08-56C4-4D00-93E8-8E8047A8DE89}" type="datetime1">
               <a:rPr lang="de-DE" smtClean="0"/>
-              <a:t>29.09.2022</a:t>
+              <a:t>05.10.2022</a:t>
             </a:fld>
             <a:endParaRPr lang="de-DE"/>
           </a:p>
@@ -10111,7 +10031,7 @@
           <p:cNvPr id="5" name="Fußzeilenplatzhalter 4">
             <a:extLst>
               <a:ext uri="{FF2B5EF4-FFF2-40B4-BE49-F238E27FC236}">
-                <a16:creationId xmlns:a16="http://schemas.microsoft.com/office/drawing/2014/main" xmlns="" id="{731475E5-55C7-4800-A9D7-D8CB8F33E0B7}"/>
+                <a16:creationId xmlns:a16="http://schemas.microsoft.com/office/drawing/2014/main" id="{731475E5-55C7-4800-A9D7-D8CB8F33E0B7}"/>
               </a:ext>
             </a:extLst>
           </p:cNvPr>
@@ -10139,7 +10059,7 @@
           <p:cNvPr id="6" name="Foliennummernplatzhalter 5">
             <a:extLst>
               <a:ext uri="{FF2B5EF4-FFF2-40B4-BE49-F238E27FC236}">
-                <a16:creationId xmlns:a16="http://schemas.microsoft.com/office/drawing/2014/main" xmlns="" id="{6F7857CC-FA44-4105-9302-08B032DC721F}"/>
+                <a16:creationId xmlns:a16="http://schemas.microsoft.com/office/drawing/2014/main" id="{6F7857CC-FA44-4105-9302-08B032DC721F}"/>
               </a:ext>
             </a:extLst>
           </p:cNvPr>
@@ -10192,7 +10112,7 @@
           <p:cNvPr id="10" name="Rechteck 9">
             <a:extLst>
               <a:ext uri="{FF2B5EF4-FFF2-40B4-BE49-F238E27FC236}">
-                <a16:creationId xmlns:a16="http://schemas.microsoft.com/office/drawing/2014/main" xmlns="" id="{018F6639-6E53-46A3-80EB-978EF3AD143F}"/>
+                <a16:creationId xmlns:a16="http://schemas.microsoft.com/office/drawing/2014/main" id="{018F6639-6E53-46A3-80EB-978EF3AD143F}"/>
               </a:ext>
             </a:extLst>
           </p:cNvPr>
@@ -10249,13 +10169,6 @@
   <p:clrMapOvr>
     <a:masterClrMapping/>
   </p:clrMapOvr>
-  <p:timing>
-    <p:tnLst>
-      <p:par>
-        <p:cTn id="1" dur="indefinite" restart="never" nodeType="tmRoot"/>
-      </p:par>
-    </p:tnLst>
-  </p:timing>
 </p:sld>
 </file>
 
@@ -10305,7 +10218,7 @@
           <p:cNvPr id="2" name="Titel 1">
             <a:extLst>
               <a:ext uri="{FF2B5EF4-FFF2-40B4-BE49-F238E27FC236}">
-                <a16:creationId xmlns:a16="http://schemas.microsoft.com/office/drawing/2014/main" xmlns="" id="{79150114-E9DD-442F-A61E-F1D745879F88}"/>
+                <a16:creationId xmlns:a16="http://schemas.microsoft.com/office/drawing/2014/main" id="{79150114-E9DD-442F-A61E-F1D745879F88}"/>
               </a:ext>
             </a:extLst>
           </p:cNvPr>
@@ -10333,7 +10246,7 @@
           <p:cNvPr id="3" name="Inhaltsplatzhalter 2">
             <a:extLst>
               <a:ext uri="{FF2B5EF4-FFF2-40B4-BE49-F238E27FC236}">
-                <a16:creationId xmlns:a16="http://schemas.microsoft.com/office/drawing/2014/main" xmlns="" id="{7080547F-B3A2-469B-9BC4-661C38739F69}"/>
+                <a16:creationId xmlns:a16="http://schemas.microsoft.com/office/drawing/2014/main" id="{7080547F-B3A2-469B-9BC4-661C38739F69}"/>
               </a:ext>
             </a:extLst>
           </p:cNvPr>
@@ -10361,7 +10274,7 @@
           <p:cNvPr id="4" name="Datumsplatzhalter 3">
             <a:extLst>
               <a:ext uri="{FF2B5EF4-FFF2-40B4-BE49-F238E27FC236}">
-                <a16:creationId xmlns:a16="http://schemas.microsoft.com/office/drawing/2014/main" xmlns="" id="{5DCC446B-C35F-45FA-9D08-6331931EF4A1}"/>
+                <a16:creationId xmlns:a16="http://schemas.microsoft.com/office/drawing/2014/main" id="{5DCC446B-C35F-45FA-9D08-6331931EF4A1}"/>
               </a:ext>
             </a:extLst>
           </p:cNvPr>
@@ -10379,7 +10292,7 @@
           <a:p>
             <a:fld id="{DAFA5E08-56C4-4D00-93E8-8E8047A8DE89}" type="datetime1">
               <a:rPr lang="de-DE" smtClean="0"/>
-              <a:t>29.09.2022</a:t>
+              <a:t>05.10.2022</a:t>
             </a:fld>
             <a:endParaRPr lang="de-DE"/>
           </a:p>
@@ -10390,7 +10303,7 @@
           <p:cNvPr id="5" name="Fußzeilenplatzhalter 4">
             <a:extLst>
               <a:ext uri="{FF2B5EF4-FFF2-40B4-BE49-F238E27FC236}">
-                <a16:creationId xmlns:a16="http://schemas.microsoft.com/office/drawing/2014/main" xmlns="" id="{543325A1-B617-48B2-9C83-2F6158DA302E}"/>
+                <a16:creationId xmlns:a16="http://schemas.microsoft.com/office/drawing/2014/main" id="{543325A1-B617-48B2-9C83-2F6158DA302E}"/>
               </a:ext>
             </a:extLst>
           </p:cNvPr>
@@ -10418,7 +10331,7 @@
           <p:cNvPr id="6" name="Foliennummernplatzhalter 5">
             <a:extLst>
               <a:ext uri="{FF2B5EF4-FFF2-40B4-BE49-F238E27FC236}">
-                <a16:creationId xmlns:a16="http://schemas.microsoft.com/office/drawing/2014/main" xmlns="" id="{F505E8DE-AE66-4A85-B04B-3ECCFEA67047}"/>
+                <a16:creationId xmlns:a16="http://schemas.microsoft.com/office/drawing/2014/main" id="{F505E8DE-AE66-4A85-B04B-3ECCFEA67047}"/>
               </a:ext>
             </a:extLst>
           </p:cNvPr>
@@ -10447,7 +10360,7 @@
           <p:cNvPr id="9" name="Rechteck 8">
             <a:extLst>
               <a:ext uri="{FF2B5EF4-FFF2-40B4-BE49-F238E27FC236}">
-                <a16:creationId xmlns:a16="http://schemas.microsoft.com/office/drawing/2014/main" xmlns="" id="{3C33EB5A-B4EC-4FE4-93B2-2C679B4C25B9}"/>
+                <a16:creationId xmlns:a16="http://schemas.microsoft.com/office/drawing/2014/main" id="{3C33EB5A-B4EC-4FE4-93B2-2C679B4C25B9}"/>
               </a:ext>
             </a:extLst>
           </p:cNvPr>
@@ -10553,7 +10466,7 @@
           <p:cNvPr id="2" name="Titel 1">
             <a:extLst>
               <a:ext uri="{FF2B5EF4-FFF2-40B4-BE49-F238E27FC236}">
-                <a16:creationId xmlns:a16="http://schemas.microsoft.com/office/drawing/2014/main" xmlns="" id="{79150114-E9DD-442F-A61E-F1D745879F88}"/>
+                <a16:creationId xmlns:a16="http://schemas.microsoft.com/office/drawing/2014/main" id="{79150114-E9DD-442F-A61E-F1D745879F88}"/>
               </a:ext>
             </a:extLst>
           </p:cNvPr>
@@ -10581,7 +10494,7 @@
           <p:cNvPr id="3" name="Inhaltsplatzhalter 2">
             <a:extLst>
               <a:ext uri="{FF2B5EF4-FFF2-40B4-BE49-F238E27FC236}">
-                <a16:creationId xmlns:a16="http://schemas.microsoft.com/office/drawing/2014/main" xmlns="" id="{7080547F-B3A2-469B-9BC4-661C38739F69}"/>
+                <a16:creationId xmlns:a16="http://schemas.microsoft.com/office/drawing/2014/main" id="{7080547F-B3A2-469B-9BC4-661C38739F69}"/>
               </a:ext>
             </a:extLst>
           </p:cNvPr>
@@ -10613,7 +10526,7 @@
           <p:cNvPr id="4" name="Datumsplatzhalter 3">
             <a:extLst>
               <a:ext uri="{FF2B5EF4-FFF2-40B4-BE49-F238E27FC236}">
-                <a16:creationId xmlns:a16="http://schemas.microsoft.com/office/drawing/2014/main" xmlns="" id="{5DCC446B-C35F-45FA-9D08-6331931EF4A1}"/>
+                <a16:creationId xmlns:a16="http://schemas.microsoft.com/office/drawing/2014/main" id="{5DCC446B-C35F-45FA-9D08-6331931EF4A1}"/>
               </a:ext>
             </a:extLst>
           </p:cNvPr>
@@ -10631,7 +10544,7 @@
           <a:p>
             <a:fld id="{DAFA5E08-56C4-4D00-93E8-8E8047A8DE89}" type="datetime1">
               <a:rPr lang="de-DE" smtClean="0"/>
-              <a:t>29.09.2022</a:t>
+              <a:t>05.10.2022</a:t>
             </a:fld>
             <a:endParaRPr lang="de-DE"/>
           </a:p>
@@ -10642,7 +10555,7 @@
           <p:cNvPr id="5" name="Fußzeilenplatzhalter 4">
             <a:extLst>
               <a:ext uri="{FF2B5EF4-FFF2-40B4-BE49-F238E27FC236}">
-                <a16:creationId xmlns:a16="http://schemas.microsoft.com/office/drawing/2014/main" xmlns="" id="{543325A1-B617-48B2-9C83-2F6158DA302E}"/>
+                <a16:creationId xmlns:a16="http://schemas.microsoft.com/office/drawing/2014/main" id="{543325A1-B617-48B2-9C83-2F6158DA302E}"/>
               </a:ext>
             </a:extLst>
           </p:cNvPr>
@@ -10670,7 +10583,7 @@
           <p:cNvPr id="6" name="Foliennummernplatzhalter 5">
             <a:extLst>
               <a:ext uri="{FF2B5EF4-FFF2-40B4-BE49-F238E27FC236}">
-                <a16:creationId xmlns:a16="http://schemas.microsoft.com/office/drawing/2014/main" xmlns="" id="{F505E8DE-AE66-4A85-B04B-3ECCFEA67047}"/>
+                <a16:creationId xmlns:a16="http://schemas.microsoft.com/office/drawing/2014/main" id="{F505E8DE-AE66-4A85-B04B-3ECCFEA67047}"/>
               </a:ext>
             </a:extLst>
           </p:cNvPr>
@@ -10753,7 +10666,7 @@
           <p:cNvPr id="2" name="Titel 1">
             <a:extLst>
               <a:ext uri="{FF2B5EF4-FFF2-40B4-BE49-F238E27FC236}">
-                <a16:creationId xmlns:a16="http://schemas.microsoft.com/office/drawing/2014/main" xmlns="" id="{79150114-E9DD-442F-A61E-F1D745879F88}"/>
+                <a16:creationId xmlns:a16="http://schemas.microsoft.com/office/drawing/2014/main" id="{79150114-E9DD-442F-A61E-F1D745879F88}"/>
               </a:ext>
             </a:extLst>
           </p:cNvPr>
@@ -10781,7 +10694,7 @@
           <p:cNvPr id="3" name="Inhaltsplatzhalter 2">
             <a:extLst>
               <a:ext uri="{FF2B5EF4-FFF2-40B4-BE49-F238E27FC236}">
-                <a16:creationId xmlns:a16="http://schemas.microsoft.com/office/drawing/2014/main" xmlns="" id="{7080547F-B3A2-469B-9BC4-661C38739F69}"/>
+                <a16:creationId xmlns:a16="http://schemas.microsoft.com/office/drawing/2014/main" id="{7080547F-B3A2-469B-9BC4-661C38739F69}"/>
               </a:ext>
             </a:extLst>
           </p:cNvPr>
@@ -10798,10 +10711,9 @@
           <a:lstStyle/>
           <a:p>
             <a:r>
-              <a:rPr lang="de-DE" dirty="0" smtClean="0"/>
+              <a:rPr lang="de-DE" dirty="0"/>
               <a:t>Lizenzen akzeptieren</a:t>
             </a:r>
-            <a:endParaRPr lang="de-DE" dirty="0"/>
           </a:p>
         </p:txBody>
       </p:sp>
@@ -10810,7 +10722,7 @@
           <p:cNvPr id="4" name="Datumsplatzhalter 3">
             <a:extLst>
               <a:ext uri="{FF2B5EF4-FFF2-40B4-BE49-F238E27FC236}">
-                <a16:creationId xmlns:a16="http://schemas.microsoft.com/office/drawing/2014/main" xmlns="" id="{5DCC446B-C35F-45FA-9D08-6331931EF4A1}"/>
+                <a16:creationId xmlns:a16="http://schemas.microsoft.com/office/drawing/2014/main" id="{5DCC446B-C35F-45FA-9D08-6331931EF4A1}"/>
               </a:ext>
             </a:extLst>
           </p:cNvPr>
@@ -10828,7 +10740,7 @@
           <a:p>
             <a:fld id="{DAFA5E08-56C4-4D00-93E8-8E8047A8DE89}" type="datetime1">
               <a:rPr lang="de-DE" smtClean="0"/>
-              <a:t>29.09.2022</a:t>
+              <a:t>05.10.2022</a:t>
             </a:fld>
             <a:endParaRPr lang="de-DE"/>
           </a:p>
@@ -10839,7 +10751,7 @@
           <p:cNvPr id="5" name="Fußzeilenplatzhalter 4">
             <a:extLst>
               <a:ext uri="{FF2B5EF4-FFF2-40B4-BE49-F238E27FC236}">
-                <a16:creationId xmlns:a16="http://schemas.microsoft.com/office/drawing/2014/main" xmlns="" id="{543325A1-B617-48B2-9C83-2F6158DA302E}"/>
+                <a16:creationId xmlns:a16="http://schemas.microsoft.com/office/drawing/2014/main" id="{543325A1-B617-48B2-9C83-2F6158DA302E}"/>
               </a:ext>
             </a:extLst>
           </p:cNvPr>
@@ -10867,7 +10779,7 @@
           <p:cNvPr id="6" name="Foliennummernplatzhalter 5">
             <a:extLst>
               <a:ext uri="{FF2B5EF4-FFF2-40B4-BE49-F238E27FC236}">
-                <a16:creationId xmlns:a16="http://schemas.microsoft.com/office/drawing/2014/main" xmlns="" id="{F505E8DE-AE66-4A85-B04B-3ECCFEA67047}"/>
+                <a16:creationId xmlns:a16="http://schemas.microsoft.com/office/drawing/2014/main" id="{F505E8DE-AE66-4A85-B04B-3ECCFEA67047}"/>
               </a:ext>
             </a:extLst>
           </p:cNvPr>
@@ -10896,7 +10808,7 @@
           <p:cNvPr id="9" name="Rechteck 8">
             <a:extLst>
               <a:ext uri="{FF2B5EF4-FFF2-40B4-BE49-F238E27FC236}">
-                <a16:creationId xmlns:a16="http://schemas.microsoft.com/office/drawing/2014/main" xmlns="" id="{3C33EB5A-B4EC-4FE4-93B2-2C679B4C25B9}"/>
+                <a16:creationId xmlns:a16="http://schemas.microsoft.com/office/drawing/2014/main" id="{3C33EB5A-B4EC-4FE4-93B2-2C679B4C25B9}"/>
               </a:ext>
             </a:extLst>
           </p:cNvPr>
@@ -11081,7 +10993,7 @@
           <a:p>
             <a:fld id="{6228E3B4-E3B1-4C82-9E48-25368E581931}" type="datetime1">
               <a:rPr lang="de-DE" smtClean="0"/>
-              <a:t>29.09.2022</a:t>
+              <a:t>05.10.2022</a:t>
             </a:fld>
             <a:endParaRPr lang="de-DE"/>
           </a:p>
@@ -11142,13 +11054,6 @@
   <p:clrMapOvr>
     <a:masterClrMapping/>
   </p:clrMapOvr>
-  <p:timing>
-    <p:tnLst>
-      <p:par>
-        <p:cTn id="1" dur="indefinite" restart="never" nodeType="tmRoot"/>
-      </p:par>
-    </p:tnLst>
-  </p:timing>
 </p:sld>
 </file>
 
@@ -11174,7 +11079,7 @@
           <p:cNvPr id="2" name="Titel 1">
             <a:extLst>
               <a:ext uri="{FF2B5EF4-FFF2-40B4-BE49-F238E27FC236}">
-                <a16:creationId xmlns:a16="http://schemas.microsoft.com/office/drawing/2014/main" xmlns="" id="{C982FEC1-5F3B-4EFA-8BAE-638A7105ACF8}"/>
+                <a16:creationId xmlns:a16="http://schemas.microsoft.com/office/drawing/2014/main" id="{C982FEC1-5F3B-4EFA-8BAE-638A7105ACF8}"/>
               </a:ext>
             </a:extLst>
           </p:cNvPr>
@@ -11202,7 +11107,7 @@
           <p:cNvPr id="3" name="Inhaltsplatzhalter 2">
             <a:extLst>
               <a:ext uri="{FF2B5EF4-FFF2-40B4-BE49-F238E27FC236}">
-                <a16:creationId xmlns:a16="http://schemas.microsoft.com/office/drawing/2014/main" xmlns="" id="{A3346B7D-DD71-42F0-92D3-3384A15DDA2C}"/>
+                <a16:creationId xmlns:a16="http://schemas.microsoft.com/office/drawing/2014/main" id="{A3346B7D-DD71-42F0-92D3-3384A15DDA2C}"/>
               </a:ext>
             </a:extLst>
           </p:cNvPr>
@@ -11245,7 +11150,7 @@
           <p:cNvPr id="4" name="Datumsplatzhalter 3">
             <a:extLst>
               <a:ext uri="{FF2B5EF4-FFF2-40B4-BE49-F238E27FC236}">
-                <a16:creationId xmlns:a16="http://schemas.microsoft.com/office/drawing/2014/main" xmlns="" id="{38D25B03-E426-4953-9A06-19BAD747F663}"/>
+                <a16:creationId xmlns:a16="http://schemas.microsoft.com/office/drawing/2014/main" id="{38D25B03-E426-4953-9A06-19BAD747F663}"/>
               </a:ext>
             </a:extLst>
           </p:cNvPr>
@@ -11263,7 +11168,7 @@
           <a:p>
             <a:fld id="{DAFA5E08-56C4-4D00-93E8-8E8047A8DE89}" type="datetime1">
               <a:rPr lang="de-DE" smtClean="0"/>
-              <a:t>29.09.2022</a:t>
+              <a:t>05.10.2022</a:t>
             </a:fld>
             <a:endParaRPr lang="de-DE"/>
           </a:p>
@@ -11274,7 +11179,7 @@
           <p:cNvPr id="5" name="Fußzeilenplatzhalter 4">
             <a:extLst>
               <a:ext uri="{FF2B5EF4-FFF2-40B4-BE49-F238E27FC236}">
-                <a16:creationId xmlns:a16="http://schemas.microsoft.com/office/drawing/2014/main" xmlns="" id="{0B6FB483-1DB2-47F9-9399-CC7161D56AE3}"/>
+                <a16:creationId xmlns:a16="http://schemas.microsoft.com/office/drawing/2014/main" id="{0B6FB483-1DB2-47F9-9399-CC7161D56AE3}"/>
               </a:ext>
             </a:extLst>
           </p:cNvPr>
@@ -11302,7 +11207,7 @@
           <p:cNvPr id="6" name="Foliennummernplatzhalter 5">
             <a:extLst>
               <a:ext uri="{FF2B5EF4-FFF2-40B4-BE49-F238E27FC236}">
-                <a16:creationId xmlns:a16="http://schemas.microsoft.com/office/drawing/2014/main" xmlns="" id="{409B12C0-7E5B-4296-BB6D-30403E0AAB32}"/>
+                <a16:creationId xmlns:a16="http://schemas.microsoft.com/office/drawing/2014/main" id="{409B12C0-7E5B-4296-BB6D-30403E0AAB32}"/>
               </a:ext>
             </a:extLst>
           </p:cNvPr>
@@ -11331,7 +11236,7 @@
           <p:cNvPr id="8" name="Grafik 7">
             <a:extLst>
               <a:ext uri="{FF2B5EF4-FFF2-40B4-BE49-F238E27FC236}">
-                <a16:creationId xmlns:a16="http://schemas.microsoft.com/office/drawing/2014/main" xmlns="" id="{8D0C7E75-77F5-4DC7-B209-85CFFD046FB5}"/>
+                <a16:creationId xmlns:a16="http://schemas.microsoft.com/office/drawing/2014/main" id="{8D0C7E75-77F5-4DC7-B209-85CFFD046FB5}"/>
               </a:ext>
             </a:extLst>
           </p:cNvPr>
@@ -11361,7 +11266,7 @@
           <p:cNvPr id="9" name="Rechteck 8">
             <a:extLst>
               <a:ext uri="{FF2B5EF4-FFF2-40B4-BE49-F238E27FC236}">
-                <a16:creationId xmlns:a16="http://schemas.microsoft.com/office/drawing/2014/main" xmlns="" id="{C58AB962-47DE-47A1-AAB9-6341F3CC01FE}"/>
+                <a16:creationId xmlns:a16="http://schemas.microsoft.com/office/drawing/2014/main" id="{C58AB962-47DE-47A1-AAB9-6341F3CC01FE}"/>
               </a:ext>
             </a:extLst>
           </p:cNvPr>
@@ -11443,7 +11348,7 @@
           <p:cNvPr id="2" name="Titel 1">
             <a:extLst>
               <a:ext uri="{FF2B5EF4-FFF2-40B4-BE49-F238E27FC236}">
-                <a16:creationId xmlns:a16="http://schemas.microsoft.com/office/drawing/2014/main" xmlns="" id="{A56A3C71-0828-4A7E-9681-AA40B4DE0D4A}"/>
+                <a16:creationId xmlns:a16="http://schemas.microsoft.com/office/drawing/2014/main" id="{A56A3C71-0828-4A7E-9681-AA40B4DE0D4A}"/>
               </a:ext>
             </a:extLst>
           </p:cNvPr>
@@ -11471,7 +11376,7 @@
           <p:cNvPr id="3" name="Inhaltsplatzhalter 2">
             <a:extLst>
               <a:ext uri="{FF2B5EF4-FFF2-40B4-BE49-F238E27FC236}">
-                <a16:creationId xmlns:a16="http://schemas.microsoft.com/office/drawing/2014/main" xmlns="" id="{80846B57-57A1-47DF-BEC3-3173BA4DA1B9}"/>
+                <a16:creationId xmlns:a16="http://schemas.microsoft.com/office/drawing/2014/main" id="{80846B57-57A1-47DF-BEC3-3173BA4DA1B9}"/>
               </a:ext>
             </a:extLst>
           </p:cNvPr>
@@ -11519,7 +11424,7 @@
           <p:cNvPr id="4" name="Datumsplatzhalter 3">
             <a:extLst>
               <a:ext uri="{FF2B5EF4-FFF2-40B4-BE49-F238E27FC236}">
-                <a16:creationId xmlns:a16="http://schemas.microsoft.com/office/drawing/2014/main" xmlns="" id="{9340631C-2B07-4CB2-98CE-46376800EBCA}"/>
+                <a16:creationId xmlns:a16="http://schemas.microsoft.com/office/drawing/2014/main" id="{9340631C-2B07-4CB2-98CE-46376800EBCA}"/>
               </a:ext>
             </a:extLst>
           </p:cNvPr>
@@ -11537,7 +11442,7 @@
           <a:p>
             <a:fld id="{DAFA5E08-56C4-4D00-93E8-8E8047A8DE89}" type="datetime1">
               <a:rPr lang="de-DE" smtClean="0"/>
-              <a:t>29.09.2022</a:t>
+              <a:t>05.10.2022</a:t>
             </a:fld>
             <a:endParaRPr lang="de-DE"/>
           </a:p>
@@ -11548,7 +11453,7 @@
           <p:cNvPr id="5" name="Fußzeilenplatzhalter 4">
             <a:extLst>
               <a:ext uri="{FF2B5EF4-FFF2-40B4-BE49-F238E27FC236}">
-                <a16:creationId xmlns:a16="http://schemas.microsoft.com/office/drawing/2014/main" xmlns="" id="{6DF0D719-C859-45FA-95C0-6B1301316FB5}"/>
+                <a16:creationId xmlns:a16="http://schemas.microsoft.com/office/drawing/2014/main" id="{6DF0D719-C859-45FA-95C0-6B1301316FB5}"/>
               </a:ext>
             </a:extLst>
           </p:cNvPr>
@@ -11576,7 +11481,7 @@
           <p:cNvPr id="6" name="Foliennummernplatzhalter 5">
             <a:extLst>
               <a:ext uri="{FF2B5EF4-FFF2-40B4-BE49-F238E27FC236}">
-                <a16:creationId xmlns:a16="http://schemas.microsoft.com/office/drawing/2014/main" xmlns="" id="{AFD47342-FAA9-407A-96CA-81E8AF6D3E28}"/>
+                <a16:creationId xmlns:a16="http://schemas.microsoft.com/office/drawing/2014/main" id="{AFD47342-FAA9-407A-96CA-81E8AF6D3E28}"/>
               </a:ext>
             </a:extLst>
           </p:cNvPr>
@@ -11605,7 +11510,7 @@
           <p:cNvPr id="8" name="Grafik 7">
             <a:extLst>
               <a:ext uri="{FF2B5EF4-FFF2-40B4-BE49-F238E27FC236}">
-                <a16:creationId xmlns:a16="http://schemas.microsoft.com/office/drawing/2014/main" xmlns="" id="{7A29DAF5-1648-4DFC-A35B-C4AB6DC03041}"/>
+                <a16:creationId xmlns:a16="http://schemas.microsoft.com/office/drawing/2014/main" id="{7A29DAF5-1648-4DFC-A35B-C4AB6DC03041}"/>
               </a:ext>
             </a:extLst>
           </p:cNvPr>
@@ -11635,7 +11540,7 @@
           <p:cNvPr id="9" name="Rechteck 8">
             <a:extLst>
               <a:ext uri="{FF2B5EF4-FFF2-40B4-BE49-F238E27FC236}">
-                <a16:creationId xmlns:a16="http://schemas.microsoft.com/office/drawing/2014/main" xmlns="" id="{3EDBF443-9BB4-446D-BAA5-42EF2A49600C}"/>
+                <a16:creationId xmlns:a16="http://schemas.microsoft.com/office/drawing/2014/main" id="{3EDBF443-9BB4-446D-BAA5-42EF2A49600C}"/>
               </a:ext>
             </a:extLst>
           </p:cNvPr>
@@ -11692,13 +11597,6 @@
   <p:clrMapOvr>
     <a:masterClrMapping/>
   </p:clrMapOvr>
-  <p:timing>
-    <p:tnLst>
-      <p:par>
-        <p:cTn id="1" dur="indefinite" restart="never" nodeType="tmRoot"/>
-      </p:par>
-    </p:tnLst>
-  </p:timing>
 </p:sld>
 </file>
 
@@ -11747,7 +11645,7 @@
           <p:cNvPr id="2" name="Titel 1">
             <a:extLst>
               <a:ext uri="{FF2B5EF4-FFF2-40B4-BE49-F238E27FC236}">
-                <a16:creationId xmlns:a16="http://schemas.microsoft.com/office/drawing/2014/main" xmlns="" id="{874F4253-59F8-4043-B739-6361EFD91581}"/>
+                <a16:creationId xmlns:a16="http://schemas.microsoft.com/office/drawing/2014/main" id="{874F4253-59F8-4043-B739-6361EFD91581}"/>
               </a:ext>
             </a:extLst>
           </p:cNvPr>
@@ -11775,7 +11673,7 @@
           <p:cNvPr id="3" name="Inhaltsplatzhalter 2">
             <a:extLst>
               <a:ext uri="{FF2B5EF4-FFF2-40B4-BE49-F238E27FC236}">
-                <a16:creationId xmlns:a16="http://schemas.microsoft.com/office/drawing/2014/main" xmlns="" id="{06B8EDB9-223A-4FAC-B9B0-9B4BB87210EF}"/>
+                <a16:creationId xmlns:a16="http://schemas.microsoft.com/office/drawing/2014/main" id="{06B8EDB9-223A-4FAC-B9B0-9B4BB87210EF}"/>
               </a:ext>
             </a:extLst>
           </p:cNvPr>
@@ -11811,7 +11709,7 @@
           <p:cNvPr id="4" name="Datumsplatzhalter 3">
             <a:extLst>
               <a:ext uri="{FF2B5EF4-FFF2-40B4-BE49-F238E27FC236}">
-                <a16:creationId xmlns:a16="http://schemas.microsoft.com/office/drawing/2014/main" xmlns="" id="{961CF908-1ECC-4D52-A78D-B751386BA5F2}"/>
+                <a16:creationId xmlns:a16="http://schemas.microsoft.com/office/drawing/2014/main" id="{961CF908-1ECC-4D52-A78D-B751386BA5F2}"/>
               </a:ext>
             </a:extLst>
           </p:cNvPr>
@@ -11829,7 +11727,7 @@
           <a:p>
             <a:fld id="{DAFA5E08-56C4-4D00-93E8-8E8047A8DE89}" type="datetime1">
               <a:rPr lang="de-DE" smtClean="0"/>
-              <a:t>29.09.2022</a:t>
+              <a:t>05.10.2022</a:t>
             </a:fld>
             <a:endParaRPr lang="de-DE"/>
           </a:p>
@@ -11840,7 +11738,7 @@
           <p:cNvPr id="5" name="Fußzeilenplatzhalter 4">
             <a:extLst>
               <a:ext uri="{FF2B5EF4-FFF2-40B4-BE49-F238E27FC236}">
-                <a16:creationId xmlns:a16="http://schemas.microsoft.com/office/drawing/2014/main" xmlns="" id="{BE378895-F615-4AB7-B16B-E17E68B24B2F}"/>
+                <a16:creationId xmlns:a16="http://schemas.microsoft.com/office/drawing/2014/main" id="{BE378895-F615-4AB7-B16B-E17E68B24B2F}"/>
               </a:ext>
             </a:extLst>
           </p:cNvPr>
@@ -11868,7 +11766,7 @@
           <p:cNvPr id="6" name="Foliennummernplatzhalter 5">
             <a:extLst>
               <a:ext uri="{FF2B5EF4-FFF2-40B4-BE49-F238E27FC236}">
-                <a16:creationId xmlns:a16="http://schemas.microsoft.com/office/drawing/2014/main" xmlns="" id="{1DACD878-0D04-4BD0-B50D-A7FCA227E301}"/>
+                <a16:creationId xmlns:a16="http://schemas.microsoft.com/office/drawing/2014/main" id="{1DACD878-0D04-4BD0-B50D-A7FCA227E301}"/>
               </a:ext>
             </a:extLst>
           </p:cNvPr>
@@ -11897,7 +11795,7 @@
           <p:cNvPr id="9" name="Rechteck 8">
             <a:extLst>
               <a:ext uri="{FF2B5EF4-FFF2-40B4-BE49-F238E27FC236}">
-                <a16:creationId xmlns:a16="http://schemas.microsoft.com/office/drawing/2014/main" xmlns="" id="{126B7DE4-3ECE-4A57-829E-2FE7111B344D}"/>
+                <a16:creationId xmlns:a16="http://schemas.microsoft.com/office/drawing/2014/main" id="{126B7DE4-3ECE-4A57-829E-2FE7111B344D}"/>
               </a:ext>
             </a:extLst>
           </p:cNvPr>
@@ -12003,7 +11901,7 @@
           <p:cNvPr id="2" name="Titel 1">
             <a:extLst>
               <a:ext uri="{FF2B5EF4-FFF2-40B4-BE49-F238E27FC236}">
-                <a16:creationId xmlns:a16="http://schemas.microsoft.com/office/drawing/2014/main" xmlns="" id="{874F4253-59F8-4043-B739-6361EFD91581}"/>
+                <a16:creationId xmlns:a16="http://schemas.microsoft.com/office/drawing/2014/main" id="{874F4253-59F8-4043-B739-6361EFD91581}"/>
               </a:ext>
             </a:extLst>
           </p:cNvPr>
@@ -12031,7 +11929,7 @@
           <p:cNvPr id="3" name="Inhaltsplatzhalter 2">
             <a:extLst>
               <a:ext uri="{FF2B5EF4-FFF2-40B4-BE49-F238E27FC236}">
-                <a16:creationId xmlns:a16="http://schemas.microsoft.com/office/drawing/2014/main" xmlns="" id="{06B8EDB9-223A-4FAC-B9B0-9B4BB87210EF}"/>
+                <a16:creationId xmlns:a16="http://schemas.microsoft.com/office/drawing/2014/main" id="{06B8EDB9-223A-4FAC-B9B0-9B4BB87210EF}"/>
               </a:ext>
             </a:extLst>
           </p:cNvPr>
@@ -12086,7 +11984,7 @@
           <p:cNvPr id="4" name="Datumsplatzhalter 3">
             <a:extLst>
               <a:ext uri="{FF2B5EF4-FFF2-40B4-BE49-F238E27FC236}">
-                <a16:creationId xmlns:a16="http://schemas.microsoft.com/office/drawing/2014/main" xmlns="" id="{961CF908-1ECC-4D52-A78D-B751386BA5F2}"/>
+                <a16:creationId xmlns:a16="http://schemas.microsoft.com/office/drawing/2014/main" id="{961CF908-1ECC-4D52-A78D-B751386BA5F2}"/>
               </a:ext>
             </a:extLst>
           </p:cNvPr>
@@ -12104,7 +12002,7 @@
           <a:p>
             <a:fld id="{DAFA5E08-56C4-4D00-93E8-8E8047A8DE89}" type="datetime1">
               <a:rPr lang="de-DE" smtClean="0"/>
-              <a:t>29.09.2022</a:t>
+              <a:t>05.10.2022</a:t>
             </a:fld>
             <a:endParaRPr lang="de-DE"/>
           </a:p>
@@ -12115,7 +12013,7 @@
           <p:cNvPr id="5" name="Fußzeilenplatzhalter 4">
             <a:extLst>
               <a:ext uri="{FF2B5EF4-FFF2-40B4-BE49-F238E27FC236}">
-                <a16:creationId xmlns:a16="http://schemas.microsoft.com/office/drawing/2014/main" xmlns="" id="{BE378895-F615-4AB7-B16B-E17E68B24B2F}"/>
+                <a16:creationId xmlns:a16="http://schemas.microsoft.com/office/drawing/2014/main" id="{BE378895-F615-4AB7-B16B-E17E68B24B2F}"/>
               </a:ext>
             </a:extLst>
           </p:cNvPr>
@@ -12143,7 +12041,7 @@
           <p:cNvPr id="6" name="Foliennummernplatzhalter 5">
             <a:extLst>
               <a:ext uri="{FF2B5EF4-FFF2-40B4-BE49-F238E27FC236}">
-                <a16:creationId xmlns:a16="http://schemas.microsoft.com/office/drawing/2014/main" xmlns="" id="{1DACD878-0D04-4BD0-B50D-A7FCA227E301}"/>
+                <a16:creationId xmlns:a16="http://schemas.microsoft.com/office/drawing/2014/main" id="{1DACD878-0D04-4BD0-B50D-A7FCA227E301}"/>
               </a:ext>
             </a:extLst>
           </p:cNvPr>
@@ -12172,7 +12070,7 @@
           <p:cNvPr id="11" name="Rechteck 10">
             <a:extLst>
               <a:ext uri="{FF2B5EF4-FFF2-40B4-BE49-F238E27FC236}">
-                <a16:creationId xmlns:a16="http://schemas.microsoft.com/office/drawing/2014/main" xmlns="" id="{BE9536E8-391A-40E4-AFCD-8EB4B3804C04}"/>
+                <a16:creationId xmlns:a16="http://schemas.microsoft.com/office/drawing/2014/main" id="{BE9536E8-391A-40E4-AFCD-8EB4B3804C04}"/>
               </a:ext>
             </a:extLst>
           </p:cNvPr>
@@ -12224,7 +12122,7 @@
           <p:cNvPr id="12" name="Rechteck 11">
             <a:extLst>
               <a:ext uri="{FF2B5EF4-FFF2-40B4-BE49-F238E27FC236}">
-                <a16:creationId xmlns:a16="http://schemas.microsoft.com/office/drawing/2014/main" xmlns="" id="{D541F42D-629E-4BC0-935F-A2CC4A27B805}"/>
+                <a16:creationId xmlns:a16="http://schemas.microsoft.com/office/drawing/2014/main" id="{D541F42D-629E-4BC0-935F-A2CC4A27B805}"/>
               </a:ext>
             </a:extLst>
           </p:cNvPr>
@@ -12330,7 +12228,7 @@
           <p:cNvPr id="2" name="Titel 1">
             <a:extLst>
               <a:ext uri="{FF2B5EF4-FFF2-40B4-BE49-F238E27FC236}">
-                <a16:creationId xmlns:a16="http://schemas.microsoft.com/office/drawing/2014/main" xmlns="" id="{874F4253-59F8-4043-B739-6361EFD91581}"/>
+                <a16:creationId xmlns:a16="http://schemas.microsoft.com/office/drawing/2014/main" id="{874F4253-59F8-4043-B739-6361EFD91581}"/>
               </a:ext>
             </a:extLst>
           </p:cNvPr>
@@ -12358,7 +12256,7 @@
           <p:cNvPr id="3" name="Inhaltsplatzhalter 2">
             <a:extLst>
               <a:ext uri="{FF2B5EF4-FFF2-40B4-BE49-F238E27FC236}">
-                <a16:creationId xmlns:a16="http://schemas.microsoft.com/office/drawing/2014/main" xmlns="" id="{06B8EDB9-223A-4FAC-B9B0-9B4BB87210EF}"/>
+                <a16:creationId xmlns:a16="http://schemas.microsoft.com/office/drawing/2014/main" id="{06B8EDB9-223A-4FAC-B9B0-9B4BB87210EF}"/>
               </a:ext>
             </a:extLst>
           </p:cNvPr>
@@ -12411,7 +12309,7 @@
           <p:cNvPr id="4" name="Datumsplatzhalter 3">
             <a:extLst>
               <a:ext uri="{FF2B5EF4-FFF2-40B4-BE49-F238E27FC236}">
-                <a16:creationId xmlns:a16="http://schemas.microsoft.com/office/drawing/2014/main" xmlns="" id="{961CF908-1ECC-4D52-A78D-B751386BA5F2}"/>
+                <a16:creationId xmlns:a16="http://schemas.microsoft.com/office/drawing/2014/main" id="{961CF908-1ECC-4D52-A78D-B751386BA5F2}"/>
               </a:ext>
             </a:extLst>
           </p:cNvPr>
@@ -12429,7 +12327,7 @@
           <a:p>
             <a:fld id="{DAFA5E08-56C4-4D00-93E8-8E8047A8DE89}" type="datetime1">
               <a:rPr lang="de-DE" smtClean="0"/>
-              <a:t>29.09.2022</a:t>
+              <a:t>05.10.2022</a:t>
             </a:fld>
             <a:endParaRPr lang="de-DE"/>
           </a:p>
@@ -12440,7 +12338,7 @@
           <p:cNvPr id="5" name="Fußzeilenplatzhalter 4">
             <a:extLst>
               <a:ext uri="{FF2B5EF4-FFF2-40B4-BE49-F238E27FC236}">
-                <a16:creationId xmlns:a16="http://schemas.microsoft.com/office/drawing/2014/main" xmlns="" id="{BE378895-F615-4AB7-B16B-E17E68B24B2F}"/>
+                <a16:creationId xmlns:a16="http://schemas.microsoft.com/office/drawing/2014/main" id="{BE378895-F615-4AB7-B16B-E17E68B24B2F}"/>
               </a:ext>
             </a:extLst>
           </p:cNvPr>
@@ -12468,7 +12366,7 @@
           <p:cNvPr id="6" name="Foliennummernplatzhalter 5">
             <a:extLst>
               <a:ext uri="{FF2B5EF4-FFF2-40B4-BE49-F238E27FC236}">
-                <a16:creationId xmlns:a16="http://schemas.microsoft.com/office/drawing/2014/main" xmlns="" id="{1DACD878-0D04-4BD0-B50D-A7FCA227E301}"/>
+                <a16:creationId xmlns:a16="http://schemas.microsoft.com/office/drawing/2014/main" id="{1DACD878-0D04-4BD0-B50D-A7FCA227E301}"/>
               </a:ext>
             </a:extLst>
           </p:cNvPr>
@@ -12497,7 +12395,7 @@
           <p:cNvPr id="11" name="Rechteck 10">
             <a:extLst>
               <a:ext uri="{FF2B5EF4-FFF2-40B4-BE49-F238E27FC236}">
-                <a16:creationId xmlns:a16="http://schemas.microsoft.com/office/drawing/2014/main" xmlns="" id="{BD33DBCD-A274-4639-A215-86ADF392A577}"/>
+                <a16:creationId xmlns:a16="http://schemas.microsoft.com/office/drawing/2014/main" id="{BD33DBCD-A274-4639-A215-86ADF392A577}"/>
               </a:ext>
             </a:extLst>
           </p:cNvPr>
@@ -12579,7 +12477,7 @@
           <p:cNvPr id="2" name="Titel 1">
             <a:extLst>
               <a:ext uri="{FF2B5EF4-FFF2-40B4-BE49-F238E27FC236}">
-                <a16:creationId xmlns:a16="http://schemas.microsoft.com/office/drawing/2014/main" xmlns="" id="{E73047BB-B6AB-49A4-8EC7-726B4E29EA8D}"/>
+                <a16:creationId xmlns:a16="http://schemas.microsoft.com/office/drawing/2014/main" id="{E73047BB-B6AB-49A4-8EC7-726B4E29EA8D}"/>
               </a:ext>
             </a:extLst>
           </p:cNvPr>
@@ -12607,7 +12505,7 @@
           <p:cNvPr id="3" name="Inhaltsplatzhalter 2">
             <a:extLst>
               <a:ext uri="{FF2B5EF4-FFF2-40B4-BE49-F238E27FC236}">
-                <a16:creationId xmlns:a16="http://schemas.microsoft.com/office/drawing/2014/main" xmlns="" id="{B1770FD1-98BE-44A4-9206-C0E9ACDCB515}"/>
+                <a16:creationId xmlns:a16="http://schemas.microsoft.com/office/drawing/2014/main" id="{B1770FD1-98BE-44A4-9206-C0E9ACDCB515}"/>
               </a:ext>
             </a:extLst>
           </p:cNvPr>
@@ -12646,7 +12544,7 @@
           <p:cNvPr id="4" name="Datumsplatzhalter 3">
             <a:extLst>
               <a:ext uri="{FF2B5EF4-FFF2-40B4-BE49-F238E27FC236}">
-                <a16:creationId xmlns:a16="http://schemas.microsoft.com/office/drawing/2014/main" xmlns="" id="{5F130967-188A-4163-93B1-96B8F6FE102A}"/>
+                <a16:creationId xmlns:a16="http://schemas.microsoft.com/office/drawing/2014/main" id="{5F130967-188A-4163-93B1-96B8F6FE102A}"/>
               </a:ext>
             </a:extLst>
           </p:cNvPr>
@@ -12664,7 +12562,7 @@
           <a:p>
             <a:fld id="{DAFA5E08-56C4-4D00-93E8-8E8047A8DE89}" type="datetime1">
               <a:rPr lang="de-DE" smtClean="0"/>
-              <a:t>29.09.2022</a:t>
+              <a:t>05.10.2022</a:t>
             </a:fld>
             <a:endParaRPr lang="de-DE"/>
           </a:p>
@@ -12675,7 +12573,7 @@
           <p:cNvPr id="5" name="Fußzeilenplatzhalter 4">
             <a:extLst>
               <a:ext uri="{FF2B5EF4-FFF2-40B4-BE49-F238E27FC236}">
-                <a16:creationId xmlns:a16="http://schemas.microsoft.com/office/drawing/2014/main" xmlns="" id="{B22F22E4-EF8B-4205-91FD-9CD66B43AA21}"/>
+                <a16:creationId xmlns:a16="http://schemas.microsoft.com/office/drawing/2014/main" id="{B22F22E4-EF8B-4205-91FD-9CD66B43AA21}"/>
               </a:ext>
             </a:extLst>
           </p:cNvPr>
@@ -12703,7 +12601,7 @@
           <p:cNvPr id="6" name="Foliennummernplatzhalter 5">
             <a:extLst>
               <a:ext uri="{FF2B5EF4-FFF2-40B4-BE49-F238E27FC236}">
-                <a16:creationId xmlns:a16="http://schemas.microsoft.com/office/drawing/2014/main" xmlns="" id="{E9432AF3-08A7-4973-A935-9B0879C6C3FF}"/>
+                <a16:creationId xmlns:a16="http://schemas.microsoft.com/office/drawing/2014/main" id="{E9432AF3-08A7-4973-A935-9B0879C6C3FF}"/>
               </a:ext>
             </a:extLst>
           </p:cNvPr>
@@ -12732,7 +12630,7 @@
           <p:cNvPr id="7" name="Grafik 6">
             <a:extLst>
               <a:ext uri="{FF2B5EF4-FFF2-40B4-BE49-F238E27FC236}">
-                <a16:creationId xmlns:a16="http://schemas.microsoft.com/office/drawing/2014/main" xmlns="" id="{636A5F43-7B3F-478A-A54C-1F337BC18639}"/>
+                <a16:creationId xmlns:a16="http://schemas.microsoft.com/office/drawing/2014/main" id="{636A5F43-7B3F-478A-A54C-1F337BC18639}"/>
               </a:ext>
             </a:extLst>
           </p:cNvPr>
@@ -12762,7 +12660,7 @@
           <p:cNvPr id="8" name="Rechteck 7">
             <a:extLst>
               <a:ext uri="{FF2B5EF4-FFF2-40B4-BE49-F238E27FC236}">
-                <a16:creationId xmlns:a16="http://schemas.microsoft.com/office/drawing/2014/main" xmlns="" id="{A33F5FD5-3818-4D26-9BEA-661B3BAA54B5}"/>
+                <a16:creationId xmlns:a16="http://schemas.microsoft.com/office/drawing/2014/main" id="{A33F5FD5-3818-4D26-9BEA-661B3BAA54B5}"/>
               </a:ext>
             </a:extLst>
           </p:cNvPr>
@@ -12814,7 +12712,7 @@
           <p:cNvPr id="10" name="Grafik 9">
             <a:extLst>
               <a:ext uri="{FF2B5EF4-FFF2-40B4-BE49-F238E27FC236}">
-                <a16:creationId xmlns:a16="http://schemas.microsoft.com/office/drawing/2014/main" xmlns="" id="{27D5F9B8-FAA5-4A88-A507-9C3B8B825AB9}"/>
+                <a16:creationId xmlns:a16="http://schemas.microsoft.com/office/drawing/2014/main" id="{27D5F9B8-FAA5-4A88-A507-9C3B8B825AB9}"/>
               </a:ext>
             </a:extLst>
           </p:cNvPr>
@@ -12844,7 +12742,7 @@
           <p:cNvPr id="11" name="Rechteck 10">
             <a:extLst>
               <a:ext uri="{FF2B5EF4-FFF2-40B4-BE49-F238E27FC236}">
-                <a16:creationId xmlns:a16="http://schemas.microsoft.com/office/drawing/2014/main" xmlns="" id="{ED6B3E5A-3738-4E52-8772-5C6D8085BE64}"/>
+                <a16:creationId xmlns:a16="http://schemas.microsoft.com/office/drawing/2014/main" id="{ED6B3E5A-3738-4E52-8772-5C6D8085BE64}"/>
               </a:ext>
             </a:extLst>
           </p:cNvPr>
@@ -12926,7 +12824,7 @@
           <p:cNvPr id="2" name="Titel 1">
             <a:extLst>
               <a:ext uri="{FF2B5EF4-FFF2-40B4-BE49-F238E27FC236}">
-                <a16:creationId xmlns:a16="http://schemas.microsoft.com/office/drawing/2014/main" xmlns="" id="{1289D0B9-8C0B-40AF-BE80-84BC089CBB0E}"/>
+                <a16:creationId xmlns:a16="http://schemas.microsoft.com/office/drawing/2014/main" id="{1289D0B9-8C0B-40AF-BE80-84BC089CBB0E}"/>
               </a:ext>
             </a:extLst>
           </p:cNvPr>
@@ -12954,7 +12852,7 @@
           <p:cNvPr id="3" name="Inhaltsplatzhalter 2">
             <a:extLst>
               <a:ext uri="{FF2B5EF4-FFF2-40B4-BE49-F238E27FC236}">
-                <a16:creationId xmlns:a16="http://schemas.microsoft.com/office/drawing/2014/main" xmlns="" id="{FA9CCC63-8AC3-4DA9-BF98-7DD2717EC41D}"/>
+                <a16:creationId xmlns:a16="http://schemas.microsoft.com/office/drawing/2014/main" id="{FA9CCC63-8AC3-4DA9-BF98-7DD2717EC41D}"/>
               </a:ext>
             </a:extLst>
           </p:cNvPr>
@@ -12990,7 +12888,7 @@
           <p:cNvPr id="4" name="Datumsplatzhalter 3">
             <a:extLst>
               <a:ext uri="{FF2B5EF4-FFF2-40B4-BE49-F238E27FC236}">
-                <a16:creationId xmlns:a16="http://schemas.microsoft.com/office/drawing/2014/main" xmlns="" id="{04C8AF02-7303-4C54-91B6-7AC3A42B9F73}"/>
+                <a16:creationId xmlns:a16="http://schemas.microsoft.com/office/drawing/2014/main" id="{04C8AF02-7303-4C54-91B6-7AC3A42B9F73}"/>
               </a:ext>
             </a:extLst>
           </p:cNvPr>
@@ -13008,7 +12906,7 @@
           <a:p>
             <a:fld id="{DAFA5E08-56C4-4D00-93E8-8E8047A8DE89}" type="datetime1">
               <a:rPr lang="de-DE" smtClean="0"/>
-              <a:t>29.09.2022</a:t>
+              <a:t>05.10.2022</a:t>
             </a:fld>
             <a:endParaRPr lang="de-DE"/>
           </a:p>
@@ -13019,7 +12917,7 @@
           <p:cNvPr id="5" name="Fußzeilenplatzhalter 4">
             <a:extLst>
               <a:ext uri="{FF2B5EF4-FFF2-40B4-BE49-F238E27FC236}">
-                <a16:creationId xmlns:a16="http://schemas.microsoft.com/office/drawing/2014/main" xmlns="" id="{889C349C-3C3C-40A6-BAAC-A9FF0CCD7BFA}"/>
+                <a16:creationId xmlns:a16="http://schemas.microsoft.com/office/drawing/2014/main" id="{889C349C-3C3C-40A6-BAAC-A9FF0CCD7BFA}"/>
               </a:ext>
             </a:extLst>
           </p:cNvPr>
@@ -13047,7 +12945,7 @@
           <p:cNvPr id="6" name="Foliennummernplatzhalter 5">
             <a:extLst>
               <a:ext uri="{FF2B5EF4-FFF2-40B4-BE49-F238E27FC236}">
-                <a16:creationId xmlns:a16="http://schemas.microsoft.com/office/drawing/2014/main" xmlns="" id="{76D11C4B-FB07-431B-9C5F-5836AAD726F9}"/>
+                <a16:creationId xmlns:a16="http://schemas.microsoft.com/office/drawing/2014/main" id="{76D11C4B-FB07-431B-9C5F-5836AAD726F9}"/>
               </a:ext>
             </a:extLst>
           </p:cNvPr>
@@ -13076,7 +12974,7 @@
           <p:cNvPr id="8" name="Grafik 7">
             <a:extLst>
               <a:ext uri="{FF2B5EF4-FFF2-40B4-BE49-F238E27FC236}">
-                <a16:creationId xmlns:a16="http://schemas.microsoft.com/office/drawing/2014/main" xmlns="" id="{FFDF6C4B-A2AD-4275-9E90-BF4A57CBAB49}"/>
+                <a16:creationId xmlns:a16="http://schemas.microsoft.com/office/drawing/2014/main" id="{FFDF6C4B-A2AD-4275-9E90-BF4A57CBAB49}"/>
               </a:ext>
             </a:extLst>
           </p:cNvPr>
@@ -13105,7 +13003,7 @@
           <p:cNvPr id="11" name="Rechteck 10">
             <a:extLst>
               <a:ext uri="{FF2B5EF4-FFF2-40B4-BE49-F238E27FC236}">
-                <a16:creationId xmlns:a16="http://schemas.microsoft.com/office/drawing/2014/main" xmlns="" id="{47DEC905-1039-4AF5-BB52-DAA9E447C110}"/>
+                <a16:creationId xmlns:a16="http://schemas.microsoft.com/office/drawing/2014/main" id="{47DEC905-1039-4AF5-BB52-DAA9E447C110}"/>
               </a:ext>
             </a:extLst>
           </p:cNvPr>
@@ -13157,7 +13055,7 @@
           <p:cNvPr id="9" name="Rechteck 8">
             <a:extLst>
               <a:ext uri="{FF2B5EF4-FFF2-40B4-BE49-F238E27FC236}">
-                <a16:creationId xmlns:a16="http://schemas.microsoft.com/office/drawing/2014/main" xmlns="" id="{575CEE2C-08AF-40AC-BD9F-7ACF186E6BD3}"/>
+                <a16:creationId xmlns:a16="http://schemas.microsoft.com/office/drawing/2014/main" id="{575CEE2C-08AF-40AC-BD9F-7ACF186E6BD3}"/>
               </a:ext>
             </a:extLst>
           </p:cNvPr>
@@ -13239,7 +13137,7 @@
           <p:cNvPr id="10" name="Grafik 9">
             <a:extLst>
               <a:ext uri="{FF2B5EF4-FFF2-40B4-BE49-F238E27FC236}">
-                <a16:creationId xmlns:a16="http://schemas.microsoft.com/office/drawing/2014/main" xmlns="" id="{2D30EC07-1B70-4F00-8467-2ADBCF6EDD71}"/>
+                <a16:creationId xmlns:a16="http://schemas.microsoft.com/office/drawing/2014/main" id="{2D30EC07-1B70-4F00-8467-2ADBCF6EDD71}"/>
               </a:ext>
             </a:extLst>
           </p:cNvPr>
@@ -13268,7 +13166,7 @@
           <p:cNvPr id="2" name="Titel 1">
             <a:extLst>
               <a:ext uri="{FF2B5EF4-FFF2-40B4-BE49-F238E27FC236}">
-                <a16:creationId xmlns:a16="http://schemas.microsoft.com/office/drawing/2014/main" xmlns="" id="{BC25B335-ED05-4C72-AD39-0CCD75012E4D}"/>
+                <a16:creationId xmlns:a16="http://schemas.microsoft.com/office/drawing/2014/main" id="{BC25B335-ED05-4C72-AD39-0CCD75012E4D}"/>
               </a:ext>
             </a:extLst>
           </p:cNvPr>
@@ -13296,7 +13194,7 @@
           <p:cNvPr id="3" name="Inhaltsplatzhalter 2">
             <a:extLst>
               <a:ext uri="{FF2B5EF4-FFF2-40B4-BE49-F238E27FC236}">
-                <a16:creationId xmlns:a16="http://schemas.microsoft.com/office/drawing/2014/main" xmlns="" id="{48DCE85E-7E7C-46D8-BE9C-3805E18A54D9}"/>
+                <a16:creationId xmlns:a16="http://schemas.microsoft.com/office/drawing/2014/main" id="{48DCE85E-7E7C-46D8-BE9C-3805E18A54D9}"/>
               </a:ext>
             </a:extLst>
           </p:cNvPr>
@@ -13386,7 +13284,7 @@
           <p:cNvPr id="4" name="Datumsplatzhalter 3">
             <a:extLst>
               <a:ext uri="{FF2B5EF4-FFF2-40B4-BE49-F238E27FC236}">
-                <a16:creationId xmlns:a16="http://schemas.microsoft.com/office/drawing/2014/main" xmlns="" id="{65E1D4CB-2C49-4372-86F8-A97C7AF985E9}"/>
+                <a16:creationId xmlns:a16="http://schemas.microsoft.com/office/drawing/2014/main" id="{65E1D4CB-2C49-4372-86F8-A97C7AF985E9}"/>
               </a:ext>
             </a:extLst>
           </p:cNvPr>
@@ -13404,7 +13302,7 @@
           <a:p>
             <a:fld id="{DAFA5E08-56C4-4D00-93E8-8E8047A8DE89}" type="datetime1">
               <a:rPr lang="de-DE" smtClean="0"/>
-              <a:t>29.09.2022</a:t>
+              <a:t>05.10.2022</a:t>
             </a:fld>
             <a:endParaRPr lang="de-DE"/>
           </a:p>
@@ -13415,7 +13313,7 @@
           <p:cNvPr id="5" name="Fußzeilenplatzhalter 4">
             <a:extLst>
               <a:ext uri="{FF2B5EF4-FFF2-40B4-BE49-F238E27FC236}">
-                <a16:creationId xmlns:a16="http://schemas.microsoft.com/office/drawing/2014/main" xmlns="" id="{EE0A8B45-5963-4A31-B280-B7B8B3FE92D2}"/>
+                <a16:creationId xmlns:a16="http://schemas.microsoft.com/office/drawing/2014/main" id="{EE0A8B45-5963-4A31-B280-B7B8B3FE92D2}"/>
               </a:ext>
             </a:extLst>
           </p:cNvPr>
@@ -13443,7 +13341,7 @@
           <p:cNvPr id="6" name="Foliennummernplatzhalter 5">
             <a:extLst>
               <a:ext uri="{FF2B5EF4-FFF2-40B4-BE49-F238E27FC236}">
-                <a16:creationId xmlns:a16="http://schemas.microsoft.com/office/drawing/2014/main" xmlns="" id="{B8AFD331-0C92-4F82-A792-431E790E83CF}"/>
+                <a16:creationId xmlns:a16="http://schemas.microsoft.com/office/drawing/2014/main" id="{B8AFD331-0C92-4F82-A792-431E790E83CF}"/>
               </a:ext>
             </a:extLst>
           </p:cNvPr>
@@ -13502,7 +13400,7 @@
           <p:cNvPr id="2" name="Titel 1">
             <a:extLst>
               <a:ext uri="{FF2B5EF4-FFF2-40B4-BE49-F238E27FC236}">
-                <a16:creationId xmlns:a16="http://schemas.microsoft.com/office/drawing/2014/main" xmlns="" id="{AB053D24-1FE3-4B7B-9895-51FF20732C5E}"/>
+                <a16:creationId xmlns:a16="http://schemas.microsoft.com/office/drawing/2014/main" id="{AB053D24-1FE3-4B7B-9895-51FF20732C5E}"/>
               </a:ext>
             </a:extLst>
           </p:cNvPr>
@@ -13530,7 +13428,7 @@
           <p:cNvPr id="3" name="Inhaltsplatzhalter 2">
             <a:extLst>
               <a:ext uri="{FF2B5EF4-FFF2-40B4-BE49-F238E27FC236}">
-                <a16:creationId xmlns:a16="http://schemas.microsoft.com/office/drawing/2014/main" xmlns="" id="{0665880A-9774-4EB2-BD50-1C9D79165DC5}"/>
+                <a16:creationId xmlns:a16="http://schemas.microsoft.com/office/drawing/2014/main" id="{0665880A-9774-4EB2-BD50-1C9D79165DC5}"/>
               </a:ext>
             </a:extLst>
           </p:cNvPr>
@@ -13668,7 +13566,7 @@
           <p:cNvPr id="4" name="Datumsplatzhalter 3">
             <a:extLst>
               <a:ext uri="{FF2B5EF4-FFF2-40B4-BE49-F238E27FC236}">
-                <a16:creationId xmlns:a16="http://schemas.microsoft.com/office/drawing/2014/main" xmlns="" id="{E32919A9-C024-4813-ABBB-A4B3E8AD89EF}"/>
+                <a16:creationId xmlns:a16="http://schemas.microsoft.com/office/drawing/2014/main" id="{E32919A9-C024-4813-ABBB-A4B3E8AD89EF}"/>
               </a:ext>
             </a:extLst>
           </p:cNvPr>
@@ -13686,7 +13584,7 @@
           <a:p>
             <a:fld id="{DAFA5E08-56C4-4D00-93E8-8E8047A8DE89}" type="datetime1">
               <a:rPr lang="de-DE" smtClean="0"/>
-              <a:t>29.09.2022</a:t>
+              <a:t>05.10.2022</a:t>
             </a:fld>
             <a:endParaRPr lang="de-DE"/>
           </a:p>
@@ -13697,7 +13595,7 @@
           <p:cNvPr id="5" name="Fußzeilenplatzhalter 4">
             <a:extLst>
               <a:ext uri="{FF2B5EF4-FFF2-40B4-BE49-F238E27FC236}">
-                <a16:creationId xmlns:a16="http://schemas.microsoft.com/office/drawing/2014/main" xmlns="" id="{DC1DB8D0-6F9C-41BE-A5DE-8D38C99718CF}"/>
+                <a16:creationId xmlns:a16="http://schemas.microsoft.com/office/drawing/2014/main" id="{DC1DB8D0-6F9C-41BE-A5DE-8D38C99718CF}"/>
               </a:ext>
             </a:extLst>
           </p:cNvPr>
@@ -13725,7 +13623,7 @@
           <p:cNvPr id="6" name="Foliennummernplatzhalter 5">
             <a:extLst>
               <a:ext uri="{FF2B5EF4-FFF2-40B4-BE49-F238E27FC236}">
-                <a16:creationId xmlns:a16="http://schemas.microsoft.com/office/drawing/2014/main" xmlns="" id="{312C7BFB-0C4C-49E2-80AB-A5AA14638F6E}"/>
+                <a16:creationId xmlns:a16="http://schemas.microsoft.com/office/drawing/2014/main" id="{312C7BFB-0C4C-49E2-80AB-A5AA14638F6E}"/>
               </a:ext>
             </a:extLst>
           </p:cNvPr>
@@ -13808,7 +13706,7 @@
           <p:cNvPr id="2" name="Titel 1">
             <a:extLst>
               <a:ext uri="{FF2B5EF4-FFF2-40B4-BE49-F238E27FC236}">
-                <a16:creationId xmlns:a16="http://schemas.microsoft.com/office/drawing/2014/main" xmlns="" id="{154C777A-D993-469E-A975-02B0A927E92A}"/>
+                <a16:creationId xmlns:a16="http://schemas.microsoft.com/office/drawing/2014/main" id="{154C777A-D993-469E-A975-02B0A927E92A}"/>
               </a:ext>
             </a:extLst>
           </p:cNvPr>
@@ -13836,7 +13734,7 @@
           <p:cNvPr id="3" name="Inhaltsplatzhalter 2">
             <a:extLst>
               <a:ext uri="{FF2B5EF4-FFF2-40B4-BE49-F238E27FC236}">
-                <a16:creationId xmlns:a16="http://schemas.microsoft.com/office/drawing/2014/main" xmlns="" id="{7FD99158-B77C-4DA0-B078-CEB2FFB9560D}"/>
+                <a16:creationId xmlns:a16="http://schemas.microsoft.com/office/drawing/2014/main" id="{7FD99158-B77C-4DA0-B078-CEB2FFB9560D}"/>
               </a:ext>
             </a:extLst>
           </p:cNvPr>
@@ -13923,7 +13821,7 @@
           <p:cNvPr id="4" name="Datumsplatzhalter 3">
             <a:extLst>
               <a:ext uri="{FF2B5EF4-FFF2-40B4-BE49-F238E27FC236}">
-                <a16:creationId xmlns:a16="http://schemas.microsoft.com/office/drawing/2014/main" xmlns="" id="{19BA4A8D-192B-4580-827A-D4284005ABF7}"/>
+                <a16:creationId xmlns:a16="http://schemas.microsoft.com/office/drawing/2014/main" id="{19BA4A8D-192B-4580-827A-D4284005ABF7}"/>
               </a:ext>
             </a:extLst>
           </p:cNvPr>
@@ -13941,7 +13839,7 @@
           <a:p>
             <a:fld id="{DAFA5E08-56C4-4D00-93E8-8E8047A8DE89}" type="datetime1">
               <a:rPr lang="de-DE" smtClean="0"/>
-              <a:t>29.09.2022</a:t>
+              <a:t>05.10.2022</a:t>
             </a:fld>
             <a:endParaRPr lang="de-DE"/>
           </a:p>
@@ -13952,7 +13850,7 @@
           <p:cNvPr id="5" name="Fußzeilenplatzhalter 4">
             <a:extLst>
               <a:ext uri="{FF2B5EF4-FFF2-40B4-BE49-F238E27FC236}">
-                <a16:creationId xmlns:a16="http://schemas.microsoft.com/office/drawing/2014/main" xmlns="" id="{E6F1BA1B-FA83-4A35-8512-0E327679A872}"/>
+                <a16:creationId xmlns:a16="http://schemas.microsoft.com/office/drawing/2014/main" id="{E6F1BA1B-FA83-4A35-8512-0E327679A872}"/>
               </a:ext>
             </a:extLst>
           </p:cNvPr>
@@ -13980,7 +13878,7 @@
           <p:cNvPr id="6" name="Foliennummernplatzhalter 5">
             <a:extLst>
               <a:ext uri="{FF2B5EF4-FFF2-40B4-BE49-F238E27FC236}">
-                <a16:creationId xmlns:a16="http://schemas.microsoft.com/office/drawing/2014/main" xmlns="" id="{C85C17E5-ADA4-4EAF-A4F8-B42C730C6AF0}"/>
+                <a16:creationId xmlns:a16="http://schemas.microsoft.com/office/drawing/2014/main" id="{C85C17E5-ADA4-4EAF-A4F8-B42C730C6AF0}"/>
               </a:ext>
             </a:extLst>
           </p:cNvPr>
@@ -14009,7 +13907,7 @@
           <p:cNvPr id="10" name="Grafik 9">
             <a:extLst>
               <a:ext uri="{FF2B5EF4-FFF2-40B4-BE49-F238E27FC236}">
-                <a16:creationId xmlns:a16="http://schemas.microsoft.com/office/drawing/2014/main" xmlns="" id="{69B203E7-ECBE-4E1E-87B3-87C731336487}"/>
+                <a16:creationId xmlns:a16="http://schemas.microsoft.com/office/drawing/2014/main" id="{69B203E7-ECBE-4E1E-87B3-87C731336487}"/>
               </a:ext>
             </a:extLst>
           </p:cNvPr>
@@ -14039,7 +13937,7 @@
           <p:cNvPr id="12" name="Grafik 11">
             <a:extLst>
               <a:ext uri="{FF2B5EF4-FFF2-40B4-BE49-F238E27FC236}">
-                <a16:creationId xmlns:a16="http://schemas.microsoft.com/office/drawing/2014/main" xmlns="" id="{A1588B27-F807-4FCC-A4C2-703770C771D2}"/>
+                <a16:creationId xmlns:a16="http://schemas.microsoft.com/office/drawing/2014/main" id="{A1588B27-F807-4FCC-A4C2-703770C771D2}"/>
               </a:ext>
             </a:extLst>
           </p:cNvPr>
@@ -14080,14 +13978,6 @@
   <p:clrMapOvr>
     <a:masterClrMapping/>
   </p:clrMapOvr>
-  <mc:AlternateContent xmlns:mc="http://schemas.openxmlformats.org/markup-compatibility/2006" xmlns:p14="http://schemas.microsoft.com/office/powerpoint/2010/main">
-    <mc:Choice Requires="p14">
-      <p:transition spd="slow" p14:dur="2000"/>
-    </mc:Choice>
-    <mc:Fallback xmlns="">
-      <p:transition spd="slow"/>
-    </mc:Fallback>
-  </mc:AlternateContent>
 </p:sld>
 </file>
 
@@ -14147,7 +14037,7 @@
           <a:p>
             <a:fld id="{29F03F87-5FC1-454A-B924-57348B963929}" type="datetime1">
               <a:rPr lang="de-DE" smtClean="0"/>
-              <a:t>29.09.2022</a:t>
+              <a:t>05.10.2022</a:t>
             </a:fld>
             <a:endParaRPr lang="de-DE"/>
           </a:p>
@@ -14208,13 +14098,6 @@
   <p:clrMapOvr>
     <a:masterClrMapping/>
   </p:clrMapOvr>
-  <p:timing>
-    <p:tnLst>
-      <p:par>
-        <p:cTn id="1" dur="indefinite" restart="never" nodeType="tmRoot"/>
-      </p:par>
-    </p:tnLst>
-  </p:timing>
 </p:sld>
 </file>
 
@@ -14264,7 +14147,7 @@
           <p:cNvPr id="2" name="Titel 1">
             <a:extLst>
               <a:ext uri="{FF2B5EF4-FFF2-40B4-BE49-F238E27FC236}">
-                <a16:creationId xmlns:a16="http://schemas.microsoft.com/office/drawing/2014/main" xmlns="" id="{154C777A-D993-469E-A975-02B0A927E92A}"/>
+                <a16:creationId xmlns:a16="http://schemas.microsoft.com/office/drawing/2014/main" id="{154C777A-D993-469E-A975-02B0A927E92A}"/>
               </a:ext>
             </a:extLst>
           </p:cNvPr>
@@ -14292,7 +14175,7 @@
           <p:cNvPr id="3" name="Inhaltsplatzhalter 2">
             <a:extLst>
               <a:ext uri="{FF2B5EF4-FFF2-40B4-BE49-F238E27FC236}">
-                <a16:creationId xmlns:a16="http://schemas.microsoft.com/office/drawing/2014/main" xmlns="" id="{7FD99158-B77C-4DA0-B078-CEB2FFB9560D}"/>
+                <a16:creationId xmlns:a16="http://schemas.microsoft.com/office/drawing/2014/main" id="{7FD99158-B77C-4DA0-B078-CEB2FFB9560D}"/>
               </a:ext>
             </a:extLst>
           </p:cNvPr>
@@ -14391,7 +14274,7 @@
           <p:cNvPr id="4" name="Datumsplatzhalter 3">
             <a:extLst>
               <a:ext uri="{FF2B5EF4-FFF2-40B4-BE49-F238E27FC236}">
-                <a16:creationId xmlns:a16="http://schemas.microsoft.com/office/drawing/2014/main" xmlns="" id="{19BA4A8D-192B-4580-827A-D4284005ABF7}"/>
+                <a16:creationId xmlns:a16="http://schemas.microsoft.com/office/drawing/2014/main" id="{19BA4A8D-192B-4580-827A-D4284005ABF7}"/>
               </a:ext>
             </a:extLst>
           </p:cNvPr>
@@ -14409,7 +14292,7 @@
           <a:p>
             <a:fld id="{DAFA5E08-56C4-4D00-93E8-8E8047A8DE89}" type="datetime1">
               <a:rPr lang="de-DE" smtClean="0"/>
-              <a:t>29.09.2022</a:t>
+              <a:t>05.10.2022</a:t>
             </a:fld>
             <a:endParaRPr lang="de-DE"/>
           </a:p>
@@ -14420,7 +14303,7 @@
           <p:cNvPr id="5" name="Fußzeilenplatzhalter 4">
             <a:extLst>
               <a:ext uri="{FF2B5EF4-FFF2-40B4-BE49-F238E27FC236}">
-                <a16:creationId xmlns:a16="http://schemas.microsoft.com/office/drawing/2014/main" xmlns="" id="{E6F1BA1B-FA83-4A35-8512-0E327679A872}"/>
+                <a16:creationId xmlns:a16="http://schemas.microsoft.com/office/drawing/2014/main" id="{E6F1BA1B-FA83-4A35-8512-0E327679A872}"/>
               </a:ext>
             </a:extLst>
           </p:cNvPr>
@@ -14448,7 +14331,7 @@
           <p:cNvPr id="6" name="Foliennummernplatzhalter 5">
             <a:extLst>
               <a:ext uri="{FF2B5EF4-FFF2-40B4-BE49-F238E27FC236}">
-                <a16:creationId xmlns:a16="http://schemas.microsoft.com/office/drawing/2014/main" xmlns="" id="{C85C17E5-ADA4-4EAF-A4F8-B42C730C6AF0}"/>
+                <a16:creationId xmlns:a16="http://schemas.microsoft.com/office/drawing/2014/main" id="{C85C17E5-ADA4-4EAF-A4F8-B42C730C6AF0}"/>
               </a:ext>
             </a:extLst>
           </p:cNvPr>
@@ -14477,7 +14360,7 @@
           <p:cNvPr id="11" name="Grafik 10">
             <a:extLst>
               <a:ext uri="{FF2B5EF4-FFF2-40B4-BE49-F238E27FC236}">
-                <a16:creationId xmlns:a16="http://schemas.microsoft.com/office/drawing/2014/main" xmlns="" id="{A5F50C68-E92F-4D6E-A707-71EBD7DA5472}"/>
+                <a16:creationId xmlns:a16="http://schemas.microsoft.com/office/drawing/2014/main" id="{A5F50C68-E92F-4D6E-A707-71EBD7DA5472}"/>
               </a:ext>
             </a:extLst>
           </p:cNvPr>
@@ -14543,7 +14426,7 @@
           <p:cNvPr id="2" name="Titel 1">
             <a:extLst>
               <a:ext uri="{FF2B5EF4-FFF2-40B4-BE49-F238E27FC236}">
-                <a16:creationId xmlns:a16="http://schemas.microsoft.com/office/drawing/2014/main" xmlns="" id="{874F4253-59F8-4043-B739-6361EFD91581}"/>
+                <a16:creationId xmlns:a16="http://schemas.microsoft.com/office/drawing/2014/main" id="{874F4253-59F8-4043-B739-6361EFD91581}"/>
               </a:ext>
             </a:extLst>
           </p:cNvPr>
@@ -14571,7 +14454,7 @@
           <p:cNvPr id="3" name="Inhaltsplatzhalter 2">
             <a:extLst>
               <a:ext uri="{FF2B5EF4-FFF2-40B4-BE49-F238E27FC236}">
-                <a16:creationId xmlns:a16="http://schemas.microsoft.com/office/drawing/2014/main" xmlns="" id="{06B8EDB9-223A-4FAC-B9B0-9B4BB87210EF}"/>
+                <a16:creationId xmlns:a16="http://schemas.microsoft.com/office/drawing/2014/main" id="{06B8EDB9-223A-4FAC-B9B0-9B4BB87210EF}"/>
               </a:ext>
             </a:extLst>
           </p:cNvPr>
@@ -14680,7 +14563,7 @@
           <p:cNvPr id="4" name="Datumsplatzhalter 3">
             <a:extLst>
               <a:ext uri="{FF2B5EF4-FFF2-40B4-BE49-F238E27FC236}">
-                <a16:creationId xmlns:a16="http://schemas.microsoft.com/office/drawing/2014/main" xmlns="" id="{961CF908-1ECC-4D52-A78D-B751386BA5F2}"/>
+                <a16:creationId xmlns:a16="http://schemas.microsoft.com/office/drawing/2014/main" id="{961CF908-1ECC-4D52-A78D-B751386BA5F2}"/>
               </a:ext>
             </a:extLst>
           </p:cNvPr>
@@ -14698,7 +14581,7 @@
           <a:p>
             <a:fld id="{DAFA5E08-56C4-4D00-93E8-8E8047A8DE89}" type="datetime1">
               <a:rPr lang="de-DE" smtClean="0"/>
-              <a:t>29.09.2022</a:t>
+              <a:t>05.10.2022</a:t>
             </a:fld>
             <a:endParaRPr lang="de-DE"/>
           </a:p>
@@ -14709,7 +14592,7 @@
           <p:cNvPr id="5" name="Fußzeilenplatzhalter 4">
             <a:extLst>
               <a:ext uri="{FF2B5EF4-FFF2-40B4-BE49-F238E27FC236}">
-                <a16:creationId xmlns:a16="http://schemas.microsoft.com/office/drawing/2014/main" xmlns="" id="{BE378895-F615-4AB7-B16B-E17E68B24B2F}"/>
+                <a16:creationId xmlns:a16="http://schemas.microsoft.com/office/drawing/2014/main" id="{BE378895-F615-4AB7-B16B-E17E68B24B2F}"/>
               </a:ext>
             </a:extLst>
           </p:cNvPr>
@@ -14737,7 +14620,7 @@
           <p:cNvPr id="6" name="Foliennummernplatzhalter 5">
             <a:extLst>
               <a:ext uri="{FF2B5EF4-FFF2-40B4-BE49-F238E27FC236}">
-                <a16:creationId xmlns:a16="http://schemas.microsoft.com/office/drawing/2014/main" xmlns="" id="{1DACD878-0D04-4BD0-B50D-A7FCA227E301}"/>
+                <a16:creationId xmlns:a16="http://schemas.microsoft.com/office/drawing/2014/main" id="{1DACD878-0D04-4BD0-B50D-A7FCA227E301}"/>
               </a:ext>
             </a:extLst>
           </p:cNvPr>
@@ -14766,7 +14649,7 @@
           <p:cNvPr id="12" name="Grafik 11">
             <a:extLst>
               <a:ext uri="{FF2B5EF4-FFF2-40B4-BE49-F238E27FC236}">
-                <a16:creationId xmlns:a16="http://schemas.microsoft.com/office/drawing/2014/main" xmlns="" id="{A283EDAA-5093-4801-AD0B-37E1E793F51C}"/>
+                <a16:creationId xmlns:a16="http://schemas.microsoft.com/office/drawing/2014/main" id="{A283EDAA-5093-4801-AD0B-37E1E793F51C}"/>
               </a:ext>
             </a:extLst>
           </p:cNvPr>
@@ -14801,14 +14684,6 @@
   <p:clrMapOvr>
     <a:masterClrMapping/>
   </p:clrMapOvr>
-  <mc:AlternateContent xmlns:mc="http://schemas.openxmlformats.org/markup-compatibility/2006" xmlns:p14="http://schemas.microsoft.com/office/powerpoint/2010/main">
-    <mc:Choice Requires="p14">
-      <p:transition spd="slow" p14:dur="2000"/>
-    </mc:Choice>
-    <mc:Fallback xmlns="">
-      <p:transition spd="slow"/>
-    </mc:Fallback>
-  </mc:AlternateContent>
 </p:sld>
 </file>
 
@@ -14834,7 +14709,7 @@
           <p:cNvPr id="2" name="Titel 1">
             <a:extLst>
               <a:ext uri="{FF2B5EF4-FFF2-40B4-BE49-F238E27FC236}">
-                <a16:creationId xmlns:a16="http://schemas.microsoft.com/office/drawing/2014/main" xmlns="" id="{899C87DA-A1E1-4A0D-8697-B904CC32E2D0}"/>
+                <a16:creationId xmlns:a16="http://schemas.microsoft.com/office/drawing/2014/main" id="{899C87DA-A1E1-4A0D-8697-B904CC32E2D0}"/>
               </a:ext>
             </a:extLst>
           </p:cNvPr>
@@ -14862,7 +14737,7 @@
           <p:cNvPr id="3" name="Inhaltsplatzhalter 2">
             <a:extLst>
               <a:ext uri="{FF2B5EF4-FFF2-40B4-BE49-F238E27FC236}">
-                <a16:creationId xmlns:a16="http://schemas.microsoft.com/office/drawing/2014/main" xmlns="" id="{177D9904-1D40-4D37-9547-F95BA5437490}"/>
+                <a16:creationId xmlns:a16="http://schemas.microsoft.com/office/drawing/2014/main" id="{177D9904-1D40-4D37-9547-F95BA5437490}"/>
               </a:ext>
             </a:extLst>
           </p:cNvPr>
@@ -14890,7 +14765,7 @@
           <p:cNvPr id="4" name="Datumsplatzhalter 3">
             <a:extLst>
               <a:ext uri="{FF2B5EF4-FFF2-40B4-BE49-F238E27FC236}">
-                <a16:creationId xmlns:a16="http://schemas.microsoft.com/office/drawing/2014/main" xmlns="" id="{4761F2EA-E414-455E-9989-A9DEDD7D61A9}"/>
+                <a16:creationId xmlns:a16="http://schemas.microsoft.com/office/drawing/2014/main" id="{4761F2EA-E414-455E-9989-A9DEDD7D61A9}"/>
               </a:ext>
             </a:extLst>
           </p:cNvPr>
@@ -14908,7 +14783,7 @@
           <a:p>
             <a:fld id="{DAFA5E08-56C4-4D00-93E8-8E8047A8DE89}" type="datetime1">
               <a:rPr lang="de-DE" smtClean="0"/>
-              <a:t>29.09.2022</a:t>
+              <a:t>05.10.2022</a:t>
             </a:fld>
             <a:endParaRPr lang="de-DE"/>
           </a:p>
@@ -14919,7 +14794,7 @@
           <p:cNvPr id="5" name="Fußzeilenplatzhalter 4">
             <a:extLst>
               <a:ext uri="{FF2B5EF4-FFF2-40B4-BE49-F238E27FC236}">
-                <a16:creationId xmlns:a16="http://schemas.microsoft.com/office/drawing/2014/main" xmlns="" id="{C9F552B5-2D0D-4029-A75C-37DCD890FEA6}"/>
+                <a16:creationId xmlns:a16="http://schemas.microsoft.com/office/drawing/2014/main" id="{C9F552B5-2D0D-4029-A75C-37DCD890FEA6}"/>
               </a:ext>
             </a:extLst>
           </p:cNvPr>
@@ -14947,7 +14822,7 @@
           <p:cNvPr id="6" name="Foliennummernplatzhalter 5">
             <a:extLst>
               <a:ext uri="{FF2B5EF4-FFF2-40B4-BE49-F238E27FC236}">
-                <a16:creationId xmlns:a16="http://schemas.microsoft.com/office/drawing/2014/main" xmlns="" id="{40420AB0-E90D-40E9-AA57-D249EE156849}"/>
+                <a16:creationId xmlns:a16="http://schemas.microsoft.com/office/drawing/2014/main" id="{40420AB0-E90D-40E9-AA57-D249EE156849}"/>
               </a:ext>
             </a:extLst>
           </p:cNvPr>
@@ -14973,28 +14848,81 @@
       </p:sp>
       <p:pic>
         <p:nvPicPr>
-          <p:cNvPr id="7" name="Grafik 6"/>
+          <p:cNvPr id="9" name="Picture 8">
+            <a:extLst>
+              <a:ext uri="{FF2B5EF4-FFF2-40B4-BE49-F238E27FC236}">
+                <a16:creationId xmlns:a16="http://schemas.microsoft.com/office/drawing/2014/main" id="{8DCE405D-EF01-F07F-8E66-1269195C0787}"/>
+              </a:ext>
+            </a:extLst>
+          </p:cNvPr>
           <p:cNvPicPr>
             <a:picLocks noChangeAspect="1"/>
           </p:cNvPicPr>
           <p:nvPr/>
         </p:nvPicPr>
         <p:blipFill>
-          <a:blip r:embed="rId2"/>
+          <a:blip r:embed="rId2">
+            <a:extLst>
+              <a:ext uri="{28A0092B-C50C-407E-A947-70E740481C1C}">
+                <a14:useLocalDpi xmlns:a14="http://schemas.microsoft.com/office/drawing/2010/main" val="0"/>
+              </a:ext>
+            </a:extLst>
+          </a:blip>
           <a:stretch>
             <a:fillRect/>
           </a:stretch>
         </p:blipFill>
         <p:spPr>
           <a:xfrm>
-            <a:off x="1371955" y="2540067"/>
-            <a:ext cx="8671378" cy="3033369"/>
+            <a:off x="1371954" y="2540066"/>
+            <a:ext cx="7991915" cy="3033369"/>
           </a:xfrm>
           <a:prstGeom prst="rect">
             <a:avLst/>
           </a:prstGeom>
         </p:spPr>
       </p:pic>
+      <p:sp>
+        <p:nvSpPr>
+          <p:cNvPr id="10" name="TextBox 9">
+            <a:extLst>
+              <a:ext uri="{FF2B5EF4-FFF2-40B4-BE49-F238E27FC236}">
+                <a16:creationId xmlns:a16="http://schemas.microsoft.com/office/drawing/2014/main" id="{A5C661BE-3FB6-82DB-792B-382C8B921FE0}"/>
+              </a:ext>
+            </a:extLst>
+          </p:cNvPr>
+          <p:cNvSpPr txBox="1"/>
+          <p:nvPr/>
+        </p:nvSpPr>
+        <p:spPr>
+          <a:xfrm>
+            <a:off x="9658810" y="3604623"/>
+            <a:ext cx="1944315" cy="646331"/>
+          </a:xfrm>
+          <a:prstGeom prst="rect">
+            <a:avLst/>
+          </a:prstGeom>
+          <a:noFill/>
+        </p:spPr>
+        <p:txBody>
+          <a:bodyPr wrap="none" rtlCol="0">
+            <a:spAutoFit/>
+          </a:bodyPr>
+          <a:lstStyle/>
+          <a:p>
+            <a:r>
+              <a:rPr lang="de-DE" dirty="0"/>
+              <a:t>Visual Studio</a:t>
+            </a:r>
+          </a:p>
+          <a:p>
+            <a:r>
+              <a:rPr lang="de-DE" dirty="0"/>
+              <a:t>brauchen wir nicht</a:t>
+            </a:r>
+          </a:p>
+        </p:txBody>
+      </p:sp>
     </p:spTree>
     <p:extLst>
       <p:ext uri="{BB962C8B-B14F-4D97-AF65-F5344CB8AC3E}">
@@ -15054,7 +14982,7 @@
           <p:cNvPr id="2" name="Titel 1">
             <a:extLst>
               <a:ext uri="{FF2B5EF4-FFF2-40B4-BE49-F238E27FC236}">
-                <a16:creationId xmlns:a16="http://schemas.microsoft.com/office/drawing/2014/main" xmlns="" id="{AFCEF019-CE9E-40CF-A159-7AE918388E53}"/>
+                <a16:creationId xmlns:a16="http://schemas.microsoft.com/office/drawing/2014/main" id="{AFCEF019-CE9E-40CF-A159-7AE918388E53}"/>
               </a:ext>
             </a:extLst>
           </p:cNvPr>
@@ -15082,7 +15010,7 @@
           <p:cNvPr id="3" name="Inhaltsplatzhalter 2">
             <a:extLst>
               <a:ext uri="{FF2B5EF4-FFF2-40B4-BE49-F238E27FC236}">
-                <a16:creationId xmlns:a16="http://schemas.microsoft.com/office/drawing/2014/main" xmlns="" id="{9A27E359-10C0-44A9-86DC-B267E93683F5}"/>
+                <a16:creationId xmlns:a16="http://schemas.microsoft.com/office/drawing/2014/main" id="{9A27E359-10C0-44A9-86DC-B267E93683F5}"/>
               </a:ext>
             </a:extLst>
           </p:cNvPr>
@@ -15115,7 +15043,7 @@
           <p:cNvPr id="4" name="Datumsplatzhalter 3">
             <a:extLst>
               <a:ext uri="{FF2B5EF4-FFF2-40B4-BE49-F238E27FC236}">
-                <a16:creationId xmlns:a16="http://schemas.microsoft.com/office/drawing/2014/main" xmlns="" id="{956BD410-1B64-470D-908B-449E595EC2D8}"/>
+                <a16:creationId xmlns:a16="http://schemas.microsoft.com/office/drawing/2014/main" id="{956BD410-1B64-470D-908B-449E595EC2D8}"/>
               </a:ext>
             </a:extLst>
           </p:cNvPr>
@@ -15133,7 +15061,7 @@
           <a:p>
             <a:fld id="{DAFA5E08-56C4-4D00-93E8-8E8047A8DE89}" type="datetime1">
               <a:rPr lang="de-DE" smtClean="0"/>
-              <a:t>29.09.2022</a:t>
+              <a:t>05.10.2022</a:t>
             </a:fld>
             <a:endParaRPr lang="de-DE"/>
           </a:p>
@@ -15144,7 +15072,7 @@
           <p:cNvPr id="5" name="Fußzeilenplatzhalter 4">
             <a:extLst>
               <a:ext uri="{FF2B5EF4-FFF2-40B4-BE49-F238E27FC236}">
-                <a16:creationId xmlns:a16="http://schemas.microsoft.com/office/drawing/2014/main" xmlns="" id="{4D50C99E-EC17-42F9-937E-A8764B7AC7CC}"/>
+                <a16:creationId xmlns:a16="http://schemas.microsoft.com/office/drawing/2014/main" id="{4D50C99E-EC17-42F9-937E-A8764B7AC7CC}"/>
               </a:ext>
             </a:extLst>
           </p:cNvPr>
@@ -15172,7 +15100,7 @@
           <p:cNvPr id="6" name="Foliennummernplatzhalter 5">
             <a:extLst>
               <a:ext uri="{FF2B5EF4-FFF2-40B4-BE49-F238E27FC236}">
-                <a16:creationId xmlns:a16="http://schemas.microsoft.com/office/drawing/2014/main" xmlns="" id="{1F71DAAE-C308-4314-ADB8-31E89CC245E5}"/>
+                <a16:creationId xmlns:a16="http://schemas.microsoft.com/office/drawing/2014/main" id="{1F71DAAE-C308-4314-ADB8-31E89CC245E5}"/>
               </a:ext>
             </a:extLst>
           </p:cNvPr>
@@ -15201,7 +15129,7 @@
           <p:cNvPr id="12" name="Rechteck 11">
             <a:extLst>
               <a:ext uri="{FF2B5EF4-FFF2-40B4-BE49-F238E27FC236}">
-                <a16:creationId xmlns:a16="http://schemas.microsoft.com/office/drawing/2014/main" xmlns="" id="{32A98E5E-0348-40EF-AA83-C4B7128C7948}"/>
+                <a16:creationId xmlns:a16="http://schemas.microsoft.com/office/drawing/2014/main" id="{32A98E5E-0348-40EF-AA83-C4B7128C7948}"/>
               </a:ext>
             </a:extLst>
           </p:cNvPr>
@@ -15307,7 +15235,7 @@
           <p:cNvPr id="2" name="Titel 1">
             <a:extLst>
               <a:ext uri="{FF2B5EF4-FFF2-40B4-BE49-F238E27FC236}">
-                <a16:creationId xmlns:a16="http://schemas.microsoft.com/office/drawing/2014/main" xmlns="" id="{0A49550C-5EB1-4A77-A3CD-3ECF3C11B25D}"/>
+                <a16:creationId xmlns:a16="http://schemas.microsoft.com/office/drawing/2014/main" id="{0A49550C-5EB1-4A77-A3CD-3ECF3C11B25D}"/>
               </a:ext>
             </a:extLst>
           </p:cNvPr>
@@ -15335,7 +15263,7 @@
           <p:cNvPr id="3" name="Inhaltsplatzhalter 2">
             <a:extLst>
               <a:ext uri="{FF2B5EF4-FFF2-40B4-BE49-F238E27FC236}">
-                <a16:creationId xmlns:a16="http://schemas.microsoft.com/office/drawing/2014/main" xmlns="" id="{0E42A3E6-A13F-4FA0-92E4-DA55FFF6D19D}"/>
+                <a16:creationId xmlns:a16="http://schemas.microsoft.com/office/drawing/2014/main" id="{0E42A3E6-A13F-4FA0-92E4-DA55FFF6D19D}"/>
               </a:ext>
             </a:extLst>
           </p:cNvPr>
@@ -15372,7 +15300,7 @@
           <p:cNvPr id="4" name="Datumsplatzhalter 3">
             <a:extLst>
               <a:ext uri="{FF2B5EF4-FFF2-40B4-BE49-F238E27FC236}">
-                <a16:creationId xmlns:a16="http://schemas.microsoft.com/office/drawing/2014/main" xmlns="" id="{FE47D2B2-B7B2-4990-B994-205A3D84883D}"/>
+                <a16:creationId xmlns:a16="http://schemas.microsoft.com/office/drawing/2014/main" id="{FE47D2B2-B7B2-4990-B994-205A3D84883D}"/>
               </a:ext>
             </a:extLst>
           </p:cNvPr>
@@ -15390,7 +15318,7 @@
           <a:p>
             <a:fld id="{DAFA5E08-56C4-4D00-93E8-8E8047A8DE89}" type="datetime1">
               <a:rPr lang="de-DE" smtClean="0"/>
-              <a:t>29.09.2022</a:t>
+              <a:t>05.10.2022</a:t>
             </a:fld>
             <a:endParaRPr lang="de-DE"/>
           </a:p>
@@ -15401,7 +15329,7 @@
           <p:cNvPr id="5" name="Fußzeilenplatzhalter 4">
             <a:extLst>
               <a:ext uri="{FF2B5EF4-FFF2-40B4-BE49-F238E27FC236}">
-                <a16:creationId xmlns:a16="http://schemas.microsoft.com/office/drawing/2014/main" xmlns="" id="{20262332-6229-454E-B11F-3E162E581BA0}"/>
+                <a16:creationId xmlns:a16="http://schemas.microsoft.com/office/drawing/2014/main" id="{20262332-6229-454E-B11F-3E162E581BA0}"/>
               </a:ext>
             </a:extLst>
           </p:cNvPr>
@@ -15429,7 +15357,7 @@
           <p:cNvPr id="6" name="Foliennummernplatzhalter 5">
             <a:extLst>
               <a:ext uri="{FF2B5EF4-FFF2-40B4-BE49-F238E27FC236}">
-                <a16:creationId xmlns:a16="http://schemas.microsoft.com/office/drawing/2014/main" xmlns="" id="{D152F93E-6A32-4413-ACB0-3B9460675DD9}"/>
+                <a16:creationId xmlns:a16="http://schemas.microsoft.com/office/drawing/2014/main" id="{D152F93E-6A32-4413-ACB0-3B9460675DD9}"/>
               </a:ext>
             </a:extLst>
           </p:cNvPr>
@@ -15458,7 +15386,7 @@
           <p:cNvPr id="12" name="Rechteck 11">
             <a:extLst>
               <a:ext uri="{FF2B5EF4-FFF2-40B4-BE49-F238E27FC236}">
-                <a16:creationId xmlns:a16="http://schemas.microsoft.com/office/drawing/2014/main" xmlns="" id="{05F195C1-A00F-4FF4-880D-24F37478CF8F}"/>
+                <a16:creationId xmlns:a16="http://schemas.microsoft.com/office/drawing/2014/main" id="{05F195C1-A00F-4FF4-880D-24F37478CF8F}"/>
               </a:ext>
             </a:extLst>
           </p:cNvPr>
@@ -15564,7 +15492,7 @@
           <p:cNvPr id="2" name="Titel 1">
             <a:extLst>
               <a:ext uri="{FF2B5EF4-FFF2-40B4-BE49-F238E27FC236}">
-                <a16:creationId xmlns:a16="http://schemas.microsoft.com/office/drawing/2014/main" xmlns="" id="{08211B96-32A9-4DBA-AAFA-F99A8E5AA2B3}"/>
+                <a16:creationId xmlns:a16="http://schemas.microsoft.com/office/drawing/2014/main" id="{08211B96-32A9-4DBA-AAFA-F99A8E5AA2B3}"/>
               </a:ext>
             </a:extLst>
           </p:cNvPr>
@@ -15592,7 +15520,7 @@
           <p:cNvPr id="3" name="Inhaltsplatzhalter 2">
             <a:extLst>
               <a:ext uri="{FF2B5EF4-FFF2-40B4-BE49-F238E27FC236}">
-                <a16:creationId xmlns:a16="http://schemas.microsoft.com/office/drawing/2014/main" xmlns="" id="{C4D470EF-E8F1-45DD-8B9D-EFA8046B70D3}"/>
+                <a16:creationId xmlns:a16="http://schemas.microsoft.com/office/drawing/2014/main" id="{C4D470EF-E8F1-45DD-8B9D-EFA8046B70D3}"/>
               </a:ext>
             </a:extLst>
           </p:cNvPr>
@@ -15674,7 +15602,7 @@
           <p:cNvPr id="4" name="Datumsplatzhalter 3">
             <a:extLst>
               <a:ext uri="{FF2B5EF4-FFF2-40B4-BE49-F238E27FC236}">
-                <a16:creationId xmlns:a16="http://schemas.microsoft.com/office/drawing/2014/main" xmlns="" id="{D94E54DC-3B63-439A-AC28-1BA021B1A2CF}"/>
+                <a16:creationId xmlns:a16="http://schemas.microsoft.com/office/drawing/2014/main" id="{D94E54DC-3B63-439A-AC28-1BA021B1A2CF}"/>
               </a:ext>
             </a:extLst>
           </p:cNvPr>
@@ -15692,7 +15620,7 @@
           <a:p>
             <a:fld id="{DAFA5E08-56C4-4D00-93E8-8E8047A8DE89}" type="datetime1">
               <a:rPr lang="de-DE" smtClean="0"/>
-              <a:t>29.09.2022</a:t>
+              <a:t>05.10.2022</a:t>
             </a:fld>
             <a:endParaRPr lang="de-DE"/>
           </a:p>
@@ -15703,7 +15631,7 @@
           <p:cNvPr id="5" name="Fußzeilenplatzhalter 4">
             <a:extLst>
               <a:ext uri="{FF2B5EF4-FFF2-40B4-BE49-F238E27FC236}">
-                <a16:creationId xmlns:a16="http://schemas.microsoft.com/office/drawing/2014/main" xmlns="" id="{BE201530-B89C-4B05-91B4-F7ED12211F80}"/>
+                <a16:creationId xmlns:a16="http://schemas.microsoft.com/office/drawing/2014/main" id="{BE201530-B89C-4B05-91B4-F7ED12211F80}"/>
               </a:ext>
             </a:extLst>
           </p:cNvPr>
@@ -15731,7 +15659,7 @@
           <p:cNvPr id="6" name="Foliennummernplatzhalter 5">
             <a:extLst>
               <a:ext uri="{FF2B5EF4-FFF2-40B4-BE49-F238E27FC236}">
-                <a16:creationId xmlns:a16="http://schemas.microsoft.com/office/drawing/2014/main" xmlns="" id="{3D219C50-A7B1-4733-91CF-BC65626DF1F8}"/>
+                <a16:creationId xmlns:a16="http://schemas.microsoft.com/office/drawing/2014/main" id="{3D219C50-A7B1-4733-91CF-BC65626DF1F8}"/>
               </a:ext>
             </a:extLst>
           </p:cNvPr>
@@ -15760,7 +15688,7 @@
           <p:cNvPr id="9" name="Rechteck 8">
             <a:extLst>
               <a:ext uri="{FF2B5EF4-FFF2-40B4-BE49-F238E27FC236}">
-                <a16:creationId xmlns:a16="http://schemas.microsoft.com/office/drawing/2014/main" xmlns="" id="{BD60D9F6-3309-4B0C-9F0B-20D4EAC30575}"/>
+                <a16:creationId xmlns:a16="http://schemas.microsoft.com/office/drawing/2014/main" id="{BD60D9F6-3309-4B0C-9F0B-20D4EAC30575}"/>
               </a:ext>
             </a:extLst>
           </p:cNvPr>
@@ -15812,7 +15740,7 @@
           <p:cNvPr id="10" name="Rechteck 9">
             <a:extLst>
               <a:ext uri="{FF2B5EF4-FFF2-40B4-BE49-F238E27FC236}">
-                <a16:creationId xmlns:a16="http://schemas.microsoft.com/office/drawing/2014/main" xmlns="" id="{A98BE879-4D75-4B24-922A-0A8B24DE0322}"/>
+                <a16:creationId xmlns:a16="http://schemas.microsoft.com/office/drawing/2014/main" id="{A98BE879-4D75-4B24-922A-0A8B24DE0322}"/>
               </a:ext>
             </a:extLst>
           </p:cNvPr>
@@ -15864,7 +15792,7 @@
           <p:cNvPr id="11" name="Rechteck 10">
             <a:extLst>
               <a:ext uri="{FF2B5EF4-FFF2-40B4-BE49-F238E27FC236}">
-                <a16:creationId xmlns:a16="http://schemas.microsoft.com/office/drawing/2014/main" xmlns="" id="{41E54B5A-68AE-427C-9AD4-7E7369A80FF0}"/>
+                <a16:creationId xmlns:a16="http://schemas.microsoft.com/office/drawing/2014/main" id="{41E54B5A-68AE-427C-9AD4-7E7369A80FF0}"/>
               </a:ext>
             </a:extLst>
           </p:cNvPr>
@@ -15946,7 +15874,7 @@
           <p:cNvPr id="2" name="Titel 1">
             <a:extLst>
               <a:ext uri="{FF2B5EF4-FFF2-40B4-BE49-F238E27FC236}">
-                <a16:creationId xmlns:a16="http://schemas.microsoft.com/office/drawing/2014/main" xmlns="" id="{08211B96-32A9-4DBA-AAFA-F99A8E5AA2B3}"/>
+                <a16:creationId xmlns:a16="http://schemas.microsoft.com/office/drawing/2014/main" id="{08211B96-32A9-4DBA-AAFA-F99A8E5AA2B3}"/>
               </a:ext>
             </a:extLst>
           </p:cNvPr>
@@ -15974,7 +15902,7 @@
           <p:cNvPr id="3" name="Inhaltsplatzhalter 2">
             <a:extLst>
               <a:ext uri="{FF2B5EF4-FFF2-40B4-BE49-F238E27FC236}">
-                <a16:creationId xmlns:a16="http://schemas.microsoft.com/office/drawing/2014/main" xmlns="" id="{C4D470EF-E8F1-45DD-8B9D-EFA8046B70D3}"/>
+                <a16:creationId xmlns:a16="http://schemas.microsoft.com/office/drawing/2014/main" id="{C4D470EF-E8F1-45DD-8B9D-EFA8046B70D3}"/>
               </a:ext>
             </a:extLst>
           </p:cNvPr>
@@ -16028,7 +15956,7 @@
           <p:cNvPr id="4" name="Datumsplatzhalter 3">
             <a:extLst>
               <a:ext uri="{FF2B5EF4-FFF2-40B4-BE49-F238E27FC236}">
-                <a16:creationId xmlns:a16="http://schemas.microsoft.com/office/drawing/2014/main" xmlns="" id="{D94E54DC-3B63-439A-AC28-1BA021B1A2CF}"/>
+                <a16:creationId xmlns:a16="http://schemas.microsoft.com/office/drawing/2014/main" id="{D94E54DC-3B63-439A-AC28-1BA021B1A2CF}"/>
               </a:ext>
             </a:extLst>
           </p:cNvPr>
@@ -16046,7 +15974,7 @@
           <a:p>
             <a:fld id="{DAFA5E08-56C4-4D00-93E8-8E8047A8DE89}" type="datetime1">
               <a:rPr lang="de-DE" smtClean="0"/>
-              <a:t>29.09.2022</a:t>
+              <a:t>05.10.2022</a:t>
             </a:fld>
             <a:endParaRPr lang="de-DE"/>
           </a:p>
@@ -16057,7 +15985,7 @@
           <p:cNvPr id="5" name="Fußzeilenplatzhalter 4">
             <a:extLst>
               <a:ext uri="{FF2B5EF4-FFF2-40B4-BE49-F238E27FC236}">
-                <a16:creationId xmlns:a16="http://schemas.microsoft.com/office/drawing/2014/main" xmlns="" id="{BE201530-B89C-4B05-91B4-F7ED12211F80}"/>
+                <a16:creationId xmlns:a16="http://schemas.microsoft.com/office/drawing/2014/main" id="{BE201530-B89C-4B05-91B4-F7ED12211F80}"/>
               </a:ext>
             </a:extLst>
           </p:cNvPr>
@@ -16085,7 +16013,7 @@
           <p:cNvPr id="6" name="Foliennummernplatzhalter 5">
             <a:extLst>
               <a:ext uri="{FF2B5EF4-FFF2-40B4-BE49-F238E27FC236}">
-                <a16:creationId xmlns:a16="http://schemas.microsoft.com/office/drawing/2014/main" xmlns="" id="{3D219C50-A7B1-4733-91CF-BC65626DF1F8}"/>
+                <a16:creationId xmlns:a16="http://schemas.microsoft.com/office/drawing/2014/main" id="{3D219C50-A7B1-4733-91CF-BC65626DF1F8}"/>
               </a:ext>
             </a:extLst>
           </p:cNvPr>
@@ -16114,7 +16042,7 @@
           <p:cNvPr id="12" name="Grafik 11">
             <a:extLst>
               <a:ext uri="{FF2B5EF4-FFF2-40B4-BE49-F238E27FC236}">
-                <a16:creationId xmlns:a16="http://schemas.microsoft.com/office/drawing/2014/main" xmlns="" id="{93E75452-6C67-4A6B-A537-A50008381568}"/>
+                <a16:creationId xmlns:a16="http://schemas.microsoft.com/office/drawing/2014/main" id="{93E75452-6C67-4A6B-A537-A50008381568}"/>
               </a:ext>
             </a:extLst>
           </p:cNvPr>
@@ -16144,7 +16072,7 @@
           <p:cNvPr id="9" name="Rechteck 8">
             <a:extLst>
               <a:ext uri="{FF2B5EF4-FFF2-40B4-BE49-F238E27FC236}">
-                <a16:creationId xmlns:a16="http://schemas.microsoft.com/office/drawing/2014/main" xmlns="" id="{BD60D9F6-3309-4B0C-9F0B-20D4EAC30575}"/>
+                <a16:creationId xmlns:a16="http://schemas.microsoft.com/office/drawing/2014/main" id="{BD60D9F6-3309-4B0C-9F0B-20D4EAC30575}"/>
               </a:ext>
             </a:extLst>
           </p:cNvPr>
@@ -16196,7 +16124,7 @@
           <p:cNvPr id="14" name="Grafik 13">
             <a:extLst>
               <a:ext uri="{FF2B5EF4-FFF2-40B4-BE49-F238E27FC236}">
-                <a16:creationId xmlns:a16="http://schemas.microsoft.com/office/drawing/2014/main" xmlns="" id="{324AA184-F91C-4C18-B156-A50D2CC21BEB}"/>
+                <a16:creationId xmlns:a16="http://schemas.microsoft.com/office/drawing/2014/main" id="{324AA184-F91C-4C18-B156-A50D2CC21BEB}"/>
               </a:ext>
             </a:extLst>
           </p:cNvPr>
@@ -16231,14 +16159,6 @@
   <p:clrMapOvr>
     <a:masterClrMapping/>
   </p:clrMapOvr>
-  <mc:AlternateContent xmlns:mc="http://schemas.openxmlformats.org/markup-compatibility/2006" xmlns:p14="http://schemas.microsoft.com/office/powerpoint/2010/main">
-    <mc:Choice Requires="p14">
-      <p:transition spd="slow" p14:dur="2000"/>
-    </mc:Choice>
-    <mc:Fallback xmlns="">
-      <p:transition spd="slow"/>
-    </mc:Fallback>
-  </mc:AlternateContent>
 </p:sld>
 </file>
 
@@ -16264,7 +16184,7 @@
           <p:cNvPr id="2" name="Titel 1">
             <a:extLst>
               <a:ext uri="{FF2B5EF4-FFF2-40B4-BE49-F238E27FC236}">
-                <a16:creationId xmlns:a16="http://schemas.microsoft.com/office/drawing/2014/main" xmlns="" id="{08211B96-32A9-4DBA-AAFA-F99A8E5AA2B3}"/>
+                <a16:creationId xmlns:a16="http://schemas.microsoft.com/office/drawing/2014/main" id="{08211B96-32A9-4DBA-AAFA-F99A8E5AA2B3}"/>
               </a:ext>
             </a:extLst>
           </p:cNvPr>
@@ -16292,7 +16212,7 @@
           <p:cNvPr id="3" name="Inhaltsplatzhalter 2">
             <a:extLst>
               <a:ext uri="{FF2B5EF4-FFF2-40B4-BE49-F238E27FC236}">
-                <a16:creationId xmlns:a16="http://schemas.microsoft.com/office/drawing/2014/main" xmlns="" id="{C4D470EF-E8F1-45DD-8B9D-EFA8046B70D3}"/>
+                <a16:creationId xmlns:a16="http://schemas.microsoft.com/office/drawing/2014/main" id="{C4D470EF-E8F1-45DD-8B9D-EFA8046B70D3}"/>
               </a:ext>
             </a:extLst>
           </p:cNvPr>
@@ -16314,14 +16234,13 @@
           <a:lstStyle/>
           <a:p>
             <a:r>
-              <a:rPr lang="de-DE" dirty="0" smtClean="0"/>
+              <a:rPr lang="de-DE" dirty="0"/>
               <a:t>Code Style</a:t>
             </a:r>
+          </a:p>
+          <a:p>
             <a:endParaRPr lang="de-DE" dirty="0"/>
           </a:p>
-          <a:p>
-            <a:endParaRPr lang="de-DE" dirty="0"/>
-          </a:p>
         </p:txBody>
       </p:sp>
       <p:sp>
@@ -16329,7 +16248,7 @@
           <p:cNvPr id="4" name="Datumsplatzhalter 3">
             <a:extLst>
               <a:ext uri="{FF2B5EF4-FFF2-40B4-BE49-F238E27FC236}">
-                <a16:creationId xmlns:a16="http://schemas.microsoft.com/office/drawing/2014/main" xmlns="" id="{D94E54DC-3B63-439A-AC28-1BA021B1A2CF}"/>
+                <a16:creationId xmlns:a16="http://schemas.microsoft.com/office/drawing/2014/main" id="{D94E54DC-3B63-439A-AC28-1BA021B1A2CF}"/>
               </a:ext>
             </a:extLst>
           </p:cNvPr>
@@ -16347,7 +16266,7 @@
           <a:p>
             <a:fld id="{DAFA5E08-56C4-4D00-93E8-8E8047A8DE89}" type="datetime1">
               <a:rPr lang="de-DE" smtClean="0"/>
-              <a:t>29.09.2022</a:t>
+              <a:t>05.10.2022</a:t>
             </a:fld>
             <a:endParaRPr lang="de-DE"/>
           </a:p>
@@ -16358,7 +16277,7 @@
           <p:cNvPr id="5" name="Fußzeilenplatzhalter 4">
             <a:extLst>
               <a:ext uri="{FF2B5EF4-FFF2-40B4-BE49-F238E27FC236}">
-                <a16:creationId xmlns:a16="http://schemas.microsoft.com/office/drawing/2014/main" xmlns="" id="{BE201530-B89C-4B05-91B4-F7ED12211F80}"/>
+                <a16:creationId xmlns:a16="http://schemas.microsoft.com/office/drawing/2014/main" id="{BE201530-B89C-4B05-91B4-F7ED12211F80}"/>
               </a:ext>
             </a:extLst>
           </p:cNvPr>
@@ -16386,7 +16305,7 @@
           <p:cNvPr id="6" name="Foliennummernplatzhalter 5">
             <a:extLst>
               <a:ext uri="{FF2B5EF4-FFF2-40B4-BE49-F238E27FC236}">
-                <a16:creationId xmlns:a16="http://schemas.microsoft.com/office/drawing/2014/main" xmlns="" id="{3D219C50-A7B1-4733-91CF-BC65626DF1F8}"/>
+                <a16:creationId xmlns:a16="http://schemas.microsoft.com/office/drawing/2014/main" id="{3D219C50-A7B1-4733-91CF-BC65626DF1F8}"/>
               </a:ext>
             </a:extLst>
           </p:cNvPr>
@@ -16438,7 +16357,7 @@
           <p:cNvPr id="11" name="Rechteck 10">
             <a:extLst>
               <a:ext uri="{FF2B5EF4-FFF2-40B4-BE49-F238E27FC236}">
-                <a16:creationId xmlns:a16="http://schemas.microsoft.com/office/drawing/2014/main" xmlns="" id="{BD60D9F6-3309-4B0C-9F0B-20D4EAC30575}"/>
+                <a16:creationId xmlns:a16="http://schemas.microsoft.com/office/drawing/2014/main" id="{BD60D9F6-3309-4B0C-9F0B-20D4EAC30575}"/>
               </a:ext>
             </a:extLst>
           </p:cNvPr>
@@ -16520,7 +16439,7 @@
           <p:cNvPr id="2" name="Titel 1">
             <a:extLst>
               <a:ext uri="{FF2B5EF4-FFF2-40B4-BE49-F238E27FC236}">
-                <a16:creationId xmlns:a16="http://schemas.microsoft.com/office/drawing/2014/main" xmlns="" id="{A00C8FA2-3D0F-4462-B489-9D479E59C16D}"/>
+                <a16:creationId xmlns:a16="http://schemas.microsoft.com/office/drawing/2014/main" id="{A00C8FA2-3D0F-4462-B489-9D479E59C16D}"/>
               </a:ext>
             </a:extLst>
           </p:cNvPr>
@@ -16548,7 +16467,7 @@
           <p:cNvPr id="3" name="Inhaltsplatzhalter 2">
             <a:extLst>
               <a:ext uri="{FF2B5EF4-FFF2-40B4-BE49-F238E27FC236}">
-                <a16:creationId xmlns:a16="http://schemas.microsoft.com/office/drawing/2014/main" xmlns="" id="{EF420444-B9D9-449D-9F83-EDAC6443C9E0}"/>
+                <a16:creationId xmlns:a16="http://schemas.microsoft.com/office/drawing/2014/main" id="{EF420444-B9D9-449D-9F83-EDAC6443C9E0}"/>
               </a:ext>
             </a:extLst>
           </p:cNvPr>
@@ -16576,7 +16495,7 @@
           <p:cNvPr id="4" name="Datumsplatzhalter 3">
             <a:extLst>
               <a:ext uri="{FF2B5EF4-FFF2-40B4-BE49-F238E27FC236}">
-                <a16:creationId xmlns:a16="http://schemas.microsoft.com/office/drawing/2014/main" xmlns="" id="{B9F44BAF-14C3-4189-B74D-915E8CF56F5B}"/>
+                <a16:creationId xmlns:a16="http://schemas.microsoft.com/office/drawing/2014/main" id="{B9F44BAF-14C3-4189-B74D-915E8CF56F5B}"/>
               </a:ext>
             </a:extLst>
           </p:cNvPr>
@@ -16594,7 +16513,7 @@
           <a:p>
             <a:fld id="{DAFA5E08-56C4-4D00-93E8-8E8047A8DE89}" type="datetime1">
               <a:rPr lang="de-DE" smtClean="0"/>
-              <a:t>29.09.2022</a:t>
+              <a:t>05.10.2022</a:t>
             </a:fld>
             <a:endParaRPr lang="de-DE"/>
           </a:p>
@@ -16605,7 +16524,7 @@
           <p:cNvPr id="5" name="Fußzeilenplatzhalter 4">
             <a:extLst>
               <a:ext uri="{FF2B5EF4-FFF2-40B4-BE49-F238E27FC236}">
-                <a16:creationId xmlns:a16="http://schemas.microsoft.com/office/drawing/2014/main" xmlns="" id="{2C6060AF-582E-4CB3-BA70-301162BF6574}"/>
+                <a16:creationId xmlns:a16="http://schemas.microsoft.com/office/drawing/2014/main" id="{2C6060AF-582E-4CB3-BA70-301162BF6574}"/>
               </a:ext>
             </a:extLst>
           </p:cNvPr>
@@ -16633,7 +16552,7 @@
           <p:cNvPr id="6" name="Foliennummernplatzhalter 5">
             <a:extLst>
               <a:ext uri="{FF2B5EF4-FFF2-40B4-BE49-F238E27FC236}">
-                <a16:creationId xmlns:a16="http://schemas.microsoft.com/office/drawing/2014/main" xmlns="" id="{BB168572-FF3C-485B-934A-3CBFA358045B}"/>
+                <a16:creationId xmlns:a16="http://schemas.microsoft.com/office/drawing/2014/main" id="{BB168572-FF3C-485B-934A-3CBFA358045B}"/>
               </a:ext>
             </a:extLst>
           </p:cNvPr>
@@ -16662,7 +16581,7 @@
           <p:cNvPr id="8" name="Grafik 7">
             <a:extLst>
               <a:ext uri="{FF2B5EF4-FFF2-40B4-BE49-F238E27FC236}">
-                <a16:creationId xmlns:a16="http://schemas.microsoft.com/office/drawing/2014/main" xmlns="" id="{970E2186-F6EB-4ABD-B6EC-5618BDBA933F}"/>
+                <a16:creationId xmlns:a16="http://schemas.microsoft.com/office/drawing/2014/main" id="{970E2186-F6EB-4ABD-B6EC-5618BDBA933F}"/>
               </a:ext>
             </a:extLst>
           </p:cNvPr>
@@ -16692,7 +16611,7 @@
           <p:cNvPr id="10" name="Grafik 9">
             <a:extLst>
               <a:ext uri="{FF2B5EF4-FFF2-40B4-BE49-F238E27FC236}">
-                <a16:creationId xmlns:a16="http://schemas.microsoft.com/office/drawing/2014/main" xmlns="" id="{269A59FE-E3B1-4A6F-A9B0-4FBA07CF8CD1}"/>
+                <a16:creationId xmlns:a16="http://schemas.microsoft.com/office/drawing/2014/main" id="{269A59FE-E3B1-4A6F-A9B0-4FBA07CF8CD1}"/>
               </a:ext>
             </a:extLst>
           </p:cNvPr>
@@ -16722,7 +16641,7 @@
           <p:cNvPr id="11" name="Rechteck 10">
             <a:extLst>
               <a:ext uri="{FF2B5EF4-FFF2-40B4-BE49-F238E27FC236}">
-                <a16:creationId xmlns:a16="http://schemas.microsoft.com/office/drawing/2014/main" xmlns="" id="{F645A135-C4B9-4B3A-B5F1-9E232362AB84}"/>
+                <a16:creationId xmlns:a16="http://schemas.microsoft.com/office/drawing/2014/main" id="{F645A135-C4B9-4B3A-B5F1-9E232362AB84}"/>
               </a:ext>
             </a:extLst>
           </p:cNvPr>
@@ -16774,7 +16693,7 @@
           <p:cNvPr id="12" name="Rechteck 11">
             <a:extLst>
               <a:ext uri="{FF2B5EF4-FFF2-40B4-BE49-F238E27FC236}">
-                <a16:creationId xmlns:a16="http://schemas.microsoft.com/office/drawing/2014/main" xmlns="" id="{85560B81-A6BE-4DC9-B69C-4241C54B1911}"/>
+                <a16:creationId xmlns:a16="http://schemas.microsoft.com/office/drawing/2014/main" id="{85560B81-A6BE-4DC9-B69C-4241C54B1911}"/>
               </a:ext>
             </a:extLst>
           </p:cNvPr>
@@ -16856,7 +16775,7 @@
           <p:cNvPr id="2" name="Titel 1">
             <a:extLst>
               <a:ext uri="{FF2B5EF4-FFF2-40B4-BE49-F238E27FC236}">
-                <a16:creationId xmlns:a16="http://schemas.microsoft.com/office/drawing/2014/main" xmlns="" id="{FF42BAE0-45C1-44C2-A239-33EA0901AA61}"/>
+                <a16:creationId xmlns:a16="http://schemas.microsoft.com/office/drawing/2014/main" id="{FF42BAE0-45C1-44C2-A239-33EA0901AA61}"/>
               </a:ext>
             </a:extLst>
           </p:cNvPr>
@@ -16884,7 +16803,7 @@
           <p:cNvPr id="3" name="Inhaltsplatzhalter 2">
             <a:extLst>
               <a:ext uri="{FF2B5EF4-FFF2-40B4-BE49-F238E27FC236}">
-                <a16:creationId xmlns:a16="http://schemas.microsoft.com/office/drawing/2014/main" xmlns="" id="{494D6467-A2E3-442F-A44E-F6D399AA5FF8}"/>
+                <a16:creationId xmlns:a16="http://schemas.microsoft.com/office/drawing/2014/main" id="{494D6467-A2E3-442F-A44E-F6D399AA5FF8}"/>
               </a:ext>
             </a:extLst>
           </p:cNvPr>
@@ -16912,7 +16831,7 @@
           <p:cNvPr id="4" name="Datumsplatzhalter 3">
             <a:extLst>
               <a:ext uri="{FF2B5EF4-FFF2-40B4-BE49-F238E27FC236}">
-                <a16:creationId xmlns:a16="http://schemas.microsoft.com/office/drawing/2014/main" xmlns="" id="{30FAF8C3-2F4B-4EF7-8353-40DFA0E6A115}"/>
+                <a16:creationId xmlns:a16="http://schemas.microsoft.com/office/drawing/2014/main" id="{30FAF8C3-2F4B-4EF7-8353-40DFA0E6A115}"/>
               </a:ext>
             </a:extLst>
           </p:cNvPr>
@@ -16930,7 +16849,7 @@
           <a:p>
             <a:fld id="{DAFA5E08-56C4-4D00-93E8-8E8047A8DE89}" type="datetime1">
               <a:rPr lang="de-DE" smtClean="0"/>
-              <a:t>29.09.2022</a:t>
+              <a:t>05.10.2022</a:t>
             </a:fld>
             <a:endParaRPr lang="de-DE"/>
           </a:p>
@@ -16941,7 +16860,7 @@
           <p:cNvPr id="5" name="Fußzeilenplatzhalter 4">
             <a:extLst>
               <a:ext uri="{FF2B5EF4-FFF2-40B4-BE49-F238E27FC236}">
-                <a16:creationId xmlns:a16="http://schemas.microsoft.com/office/drawing/2014/main" xmlns="" id="{4540F2C8-4CB7-44C4-97EB-AB137F741496}"/>
+                <a16:creationId xmlns:a16="http://schemas.microsoft.com/office/drawing/2014/main" id="{4540F2C8-4CB7-44C4-97EB-AB137F741496}"/>
               </a:ext>
             </a:extLst>
           </p:cNvPr>
@@ -16969,7 +16888,7 @@
           <p:cNvPr id="6" name="Foliennummernplatzhalter 5">
             <a:extLst>
               <a:ext uri="{FF2B5EF4-FFF2-40B4-BE49-F238E27FC236}">
-                <a16:creationId xmlns:a16="http://schemas.microsoft.com/office/drawing/2014/main" xmlns="" id="{E32B2891-69AA-4D94-8CE7-8F34AF5F8119}"/>
+                <a16:creationId xmlns:a16="http://schemas.microsoft.com/office/drawing/2014/main" id="{E32B2891-69AA-4D94-8CE7-8F34AF5F8119}"/>
               </a:ext>
             </a:extLst>
           </p:cNvPr>
@@ -16998,7 +16917,7 @@
           <p:cNvPr id="8" name="Grafik 7">
             <a:extLst>
               <a:ext uri="{FF2B5EF4-FFF2-40B4-BE49-F238E27FC236}">
-                <a16:creationId xmlns:a16="http://schemas.microsoft.com/office/drawing/2014/main" xmlns="" id="{C9CE4F96-5708-48BE-AA3C-1663A45333F6}"/>
+                <a16:creationId xmlns:a16="http://schemas.microsoft.com/office/drawing/2014/main" id="{C9CE4F96-5708-48BE-AA3C-1663A45333F6}"/>
               </a:ext>
             </a:extLst>
           </p:cNvPr>
@@ -17028,7 +16947,7 @@
           <p:cNvPr id="10" name="Grafik 9">
             <a:extLst>
               <a:ext uri="{FF2B5EF4-FFF2-40B4-BE49-F238E27FC236}">
-                <a16:creationId xmlns:a16="http://schemas.microsoft.com/office/drawing/2014/main" xmlns="" id="{C30A7C00-821A-4FC0-BE2E-DFAC85E7D283}"/>
+                <a16:creationId xmlns:a16="http://schemas.microsoft.com/office/drawing/2014/main" id="{C30A7C00-821A-4FC0-BE2E-DFAC85E7D283}"/>
               </a:ext>
             </a:extLst>
           </p:cNvPr>
@@ -17058,7 +16977,7 @@
           <p:cNvPr id="11" name="Rechteck 10">
             <a:extLst>
               <a:ext uri="{FF2B5EF4-FFF2-40B4-BE49-F238E27FC236}">
-                <a16:creationId xmlns:a16="http://schemas.microsoft.com/office/drawing/2014/main" xmlns="" id="{03762DDA-8FBA-49EA-BBE9-2AA78349EB16}"/>
+                <a16:creationId xmlns:a16="http://schemas.microsoft.com/office/drawing/2014/main" id="{03762DDA-8FBA-49EA-BBE9-2AA78349EB16}"/>
               </a:ext>
             </a:extLst>
           </p:cNvPr>
@@ -17110,7 +17029,7 @@
           <p:cNvPr id="12" name="Rechteck 11">
             <a:extLst>
               <a:ext uri="{FF2B5EF4-FFF2-40B4-BE49-F238E27FC236}">
-                <a16:creationId xmlns:a16="http://schemas.microsoft.com/office/drawing/2014/main" xmlns="" id="{42780FD6-E617-47E2-B961-3642793E1C8D}"/>
+                <a16:creationId xmlns:a16="http://schemas.microsoft.com/office/drawing/2014/main" id="{42780FD6-E617-47E2-B961-3642793E1C8D}"/>
               </a:ext>
             </a:extLst>
           </p:cNvPr>
@@ -17167,14 +17086,6 @@
   <p:clrMapOvr>
     <a:masterClrMapping/>
   </p:clrMapOvr>
-  <mc:AlternateContent xmlns:mc="http://schemas.openxmlformats.org/markup-compatibility/2006" xmlns:p14="http://schemas.microsoft.com/office/powerpoint/2010/main">
-    <mc:Choice Requires="p14">
-      <p:transition spd="slow" p14:dur="2000"/>
-    </mc:Choice>
-    <mc:Fallback xmlns="">
-      <p:transition spd="slow"/>
-    </mc:Fallback>
-  </mc:AlternateContent>
 </p:sld>
 </file>
 
@@ -17310,7 +17221,7 @@
           <a:p>
             <a:fld id="{D3F43C91-2841-4495-8685-AEB6BC46864F}" type="datetime1">
               <a:rPr lang="de-DE" smtClean="0"/>
-              <a:t>29.09.2022</a:t>
+              <a:t>05.10.2022</a:t>
             </a:fld>
             <a:endParaRPr lang="de-DE"/>
           </a:p>
@@ -17366,7 +17277,7 @@
           <p:cNvPr id="3" name="Grafik 2">
             <a:extLst>
               <a:ext uri="{FF2B5EF4-FFF2-40B4-BE49-F238E27FC236}">
-                <a16:creationId xmlns:a16="http://schemas.microsoft.com/office/drawing/2014/main" xmlns="" id="{86FBEC41-37A1-4089-8129-60A3F4053EB0}"/>
+                <a16:creationId xmlns:a16="http://schemas.microsoft.com/office/drawing/2014/main" id="{86FBEC41-37A1-4089-8129-60A3F4053EB0}"/>
               </a:ext>
             </a:extLst>
           </p:cNvPr>
@@ -17401,7 +17312,7 @@
           <p:cNvPr id="6" name="Textfeld 5">
             <a:extLst>
               <a:ext uri="{FF2B5EF4-FFF2-40B4-BE49-F238E27FC236}">
-                <a16:creationId xmlns:a16="http://schemas.microsoft.com/office/drawing/2014/main" xmlns="" id="{3CD3E6B3-8050-4387-9964-57E263F2F3B4}"/>
+                <a16:creationId xmlns:a16="http://schemas.microsoft.com/office/drawing/2014/main" id="{3CD3E6B3-8050-4387-9964-57E263F2F3B4}"/>
               </a:ext>
             </a:extLst>
           </p:cNvPr>
@@ -17436,7 +17347,7 @@
           <p:cNvPr id="10" name="Textfeld 9">
             <a:extLst>
               <a:ext uri="{FF2B5EF4-FFF2-40B4-BE49-F238E27FC236}">
-                <a16:creationId xmlns:a16="http://schemas.microsoft.com/office/drawing/2014/main" xmlns="" id="{A12B12FE-B084-4F79-ACB5-6348E82CDDF3}"/>
+                <a16:creationId xmlns:a16="http://schemas.microsoft.com/office/drawing/2014/main" id="{A12B12FE-B084-4F79-ACB5-6348E82CDDF3}"/>
               </a:ext>
             </a:extLst>
           </p:cNvPr>
@@ -17471,7 +17382,7 @@
           <p:cNvPr id="11" name="Textfeld 10">
             <a:extLst>
               <a:ext uri="{FF2B5EF4-FFF2-40B4-BE49-F238E27FC236}">
-                <a16:creationId xmlns:a16="http://schemas.microsoft.com/office/drawing/2014/main" xmlns="" id="{55E7A4EF-BD24-4371-82AF-255A3CAE0FB4}"/>
+                <a16:creationId xmlns:a16="http://schemas.microsoft.com/office/drawing/2014/main" id="{55E7A4EF-BD24-4371-82AF-255A3CAE0FB4}"/>
               </a:ext>
             </a:extLst>
           </p:cNvPr>
@@ -17506,7 +17417,7 @@
           <p:cNvPr id="12" name="Textfeld 11">
             <a:extLst>
               <a:ext uri="{FF2B5EF4-FFF2-40B4-BE49-F238E27FC236}">
-                <a16:creationId xmlns:a16="http://schemas.microsoft.com/office/drawing/2014/main" xmlns="" id="{E4E87817-DDEB-4664-B0DF-DEA759380E1E}"/>
+                <a16:creationId xmlns:a16="http://schemas.microsoft.com/office/drawing/2014/main" id="{E4E87817-DDEB-4664-B0DF-DEA759380E1E}"/>
               </a:ext>
             </a:extLst>
           </p:cNvPr>
@@ -17541,7 +17452,7 @@
           <p:cNvPr id="13" name="Textfeld 12">
             <a:extLst>
               <a:ext uri="{FF2B5EF4-FFF2-40B4-BE49-F238E27FC236}">
-                <a16:creationId xmlns:a16="http://schemas.microsoft.com/office/drawing/2014/main" xmlns="" id="{0BE72CEB-1296-4DAC-B415-DCEF8C4A93F0}"/>
+                <a16:creationId xmlns:a16="http://schemas.microsoft.com/office/drawing/2014/main" id="{0BE72CEB-1296-4DAC-B415-DCEF8C4A93F0}"/>
               </a:ext>
             </a:extLst>
           </p:cNvPr>
@@ -17576,7 +17487,7 @@
           <p:cNvPr id="14" name="Textfeld 13">
             <a:extLst>
               <a:ext uri="{FF2B5EF4-FFF2-40B4-BE49-F238E27FC236}">
-                <a16:creationId xmlns:a16="http://schemas.microsoft.com/office/drawing/2014/main" xmlns="" id="{E6CE0659-DB27-4CCC-9DBF-CCD7EEE235B9}"/>
+                <a16:creationId xmlns:a16="http://schemas.microsoft.com/office/drawing/2014/main" id="{E6CE0659-DB27-4CCC-9DBF-CCD7EEE235B9}"/>
               </a:ext>
             </a:extLst>
           </p:cNvPr>
@@ -17625,13 +17536,6 @@
   <p:clrMapOvr>
     <a:masterClrMapping/>
   </p:clrMapOvr>
-  <p:timing>
-    <p:tnLst>
-      <p:par>
-        <p:cTn id="1" dur="indefinite" restart="never" nodeType="tmRoot"/>
-      </p:par>
-    </p:tnLst>
-  </p:timing>
 </p:sld>
 </file>
 
@@ -17657,7 +17561,7 @@
           <p:cNvPr id="2" name="Titel 1">
             <a:extLst>
               <a:ext uri="{FF2B5EF4-FFF2-40B4-BE49-F238E27FC236}">
-                <a16:creationId xmlns:a16="http://schemas.microsoft.com/office/drawing/2014/main" xmlns="" id="{FF42BAE0-45C1-44C2-A239-33EA0901AA61}"/>
+                <a16:creationId xmlns:a16="http://schemas.microsoft.com/office/drawing/2014/main" id="{FF42BAE0-45C1-44C2-A239-33EA0901AA61}"/>
               </a:ext>
             </a:extLst>
           </p:cNvPr>
@@ -17685,7 +17589,7 @@
           <p:cNvPr id="3" name="Inhaltsplatzhalter 2">
             <a:extLst>
               <a:ext uri="{FF2B5EF4-FFF2-40B4-BE49-F238E27FC236}">
-                <a16:creationId xmlns:a16="http://schemas.microsoft.com/office/drawing/2014/main" xmlns="" id="{494D6467-A2E3-442F-A44E-F6D399AA5FF8}"/>
+                <a16:creationId xmlns:a16="http://schemas.microsoft.com/office/drawing/2014/main" id="{494D6467-A2E3-442F-A44E-F6D399AA5FF8}"/>
               </a:ext>
             </a:extLst>
           </p:cNvPr>
@@ -17713,7 +17617,7 @@
           <p:cNvPr id="4" name="Datumsplatzhalter 3">
             <a:extLst>
               <a:ext uri="{FF2B5EF4-FFF2-40B4-BE49-F238E27FC236}">
-                <a16:creationId xmlns:a16="http://schemas.microsoft.com/office/drawing/2014/main" xmlns="" id="{30FAF8C3-2F4B-4EF7-8353-40DFA0E6A115}"/>
+                <a16:creationId xmlns:a16="http://schemas.microsoft.com/office/drawing/2014/main" id="{30FAF8C3-2F4B-4EF7-8353-40DFA0E6A115}"/>
               </a:ext>
             </a:extLst>
           </p:cNvPr>
@@ -17731,7 +17635,7 @@
           <a:p>
             <a:fld id="{DAFA5E08-56C4-4D00-93E8-8E8047A8DE89}" type="datetime1">
               <a:rPr lang="de-DE" smtClean="0"/>
-              <a:t>29.09.2022</a:t>
+              <a:t>05.10.2022</a:t>
             </a:fld>
             <a:endParaRPr lang="de-DE"/>
           </a:p>
@@ -17742,7 +17646,7 @@
           <p:cNvPr id="5" name="Fußzeilenplatzhalter 4">
             <a:extLst>
               <a:ext uri="{FF2B5EF4-FFF2-40B4-BE49-F238E27FC236}">
-                <a16:creationId xmlns:a16="http://schemas.microsoft.com/office/drawing/2014/main" xmlns="" id="{4540F2C8-4CB7-44C4-97EB-AB137F741496}"/>
+                <a16:creationId xmlns:a16="http://schemas.microsoft.com/office/drawing/2014/main" id="{4540F2C8-4CB7-44C4-97EB-AB137F741496}"/>
               </a:ext>
             </a:extLst>
           </p:cNvPr>
@@ -17770,7 +17674,7 @@
           <p:cNvPr id="6" name="Foliennummernplatzhalter 5">
             <a:extLst>
               <a:ext uri="{FF2B5EF4-FFF2-40B4-BE49-F238E27FC236}">
-                <a16:creationId xmlns:a16="http://schemas.microsoft.com/office/drawing/2014/main" xmlns="" id="{E32B2891-69AA-4D94-8CE7-8F34AF5F8119}"/>
+                <a16:creationId xmlns:a16="http://schemas.microsoft.com/office/drawing/2014/main" id="{E32B2891-69AA-4D94-8CE7-8F34AF5F8119}"/>
               </a:ext>
             </a:extLst>
           </p:cNvPr>
@@ -17799,7 +17703,7 @@
           <p:cNvPr id="9" name="Grafik 8">
             <a:extLst>
               <a:ext uri="{FF2B5EF4-FFF2-40B4-BE49-F238E27FC236}">
-                <a16:creationId xmlns:a16="http://schemas.microsoft.com/office/drawing/2014/main" xmlns="" id="{6759845D-3EAF-449C-BDFE-98B491E6DF76}"/>
+                <a16:creationId xmlns:a16="http://schemas.microsoft.com/office/drawing/2014/main" id="{6759845D-3EAF-449C-BDFE-98B491E6DF76}"/>
               </a:ext>
             </a:extLst>
           </p:cNvPr>
@@ -17829,7 +17733,7 @@
           <p:cNvPr id="13" name="Rechteck 12">
             <a:extLst>
               <a:ext uri="{FF2B5EF4-FFF2-40B4-BE49-F238E27FC236}">
-                <a16:creationId xmlns:a16="http://schemas.microsoft.com/office/drawing/2014/main" xmlns="" id="{A3147154-E7CA-492E-896A-72964F85C065}"/>
+                <a16:creationId xmlns:a16="http://schemas.microsoft.com/office/drawing/2014/main" id="{A3147154-E7CA-492E-896A-72964F85C065}"/>
               </a:ext>
             </a:extLst>
           </p:cNvPr>
@@ -17881,7 +17785,7 @@
           <p:cNvPr id="14" name="Rechteck 13">
             <a:extLst>
               <a:ext uri="{FF2B5EF4-FFF2-40B4-BE49-F238E27FC236}">
-                <a16:creationId xmlns:a16="http://schemas.microsoft.com/office/drawing/2014/main" xmlns="" id="{349683F2-9D2D-4D4B-8684-EF599EC32FAD}"/>
+                <a16:creationId xmlns:a16="http://schemas.microsoft.com/office/drawing/2014/main" id="{349683F2-9D2D-4D4B-8684-EF599EC32FAD}"/>
               </a:ext>
             </a:extLst>
           </p:cNvPr>
@@ -17938,14 +17842,6 @@
   <p:clrMapOvr>
     <a:masterClrMapping/>
   </p:clrMapOvr>
-  <mc:AlternateContent xmlns:mc="http://schemas.openxmlformats.org/markup-compatibility/2006" xmlns:p14="http://schemas.microsoft.com/office/powerpoint/2010/main">
-    <mc:Choice Requires="p14">
-      <p:transition spd="slow" p14:dur="2000"/>
-    </mc:Choice>
-    <mc:Fallback xmlns="">
-      <p:transition spd="slow"/>
-    </mc:Fallback>
-  </mc:AlternateContent>
 </p:sld>
 </file>
 
@@ -17971,7 +17867,7 @@
           <p:cNvPr id="2" name="Titel 1">
             <a:extLst>
               <a:ext uri="{FF2B5EF4-FFF2-40B4-BE49-F238E27FC236}">
-                <a16:creationId xmlns:a16="http://schemas.microsoft.com/office/drawing/2014/main" xmlns="" id="{8DF454F3-4497-451A-AC54-789CCA2590C9}"/>
+                <a16:creationId xmlns:a16="http://schemas.microsoft.com/office/drawing/2014/main" id="{8DF454F3-4497-451A-AC54-789CCA2590C9}"/>
               </a:ext>
             </a:extLst>
           </p:cNvPr>
@@ -17999,7 +17895,7 @@
           <p:cNvPr id="3" name="Inhaltsplatzhalter 2">
             <a:extLst>
               <a:ext uri="{FF2B5EF4-FFF2-40B4-BE49-F238E27FC236}">
-                <a16:creationId xmlns:a16="http://schemas.microsoft.com/office/drawing/2014/main" xmlns="" id="{86853F22-14DF-4817-8443-4B52B8CC22AF}"/>
+                <a16:creationId xmlns:a16="http://schemas.microsoft.com/office/drawing/2014/main" id="{86853F22-14DF-4817-8443-4B52B8CC22AF}"/>
               </a:ext>
             </a:extLst>
           </p:cNvPr>
@@ -18032,7 +17928,7 @@
           <p:cNvPr id="4" name="Datumsplatzhalter 3">
             <a:extLst>
               <a:ext uri="{FF2B5EF4-FFF2-40B4-BE49-F238E27FC236}">
-                <a16:creationId xmlns:a16="http://schemas.microsoft.com/office/drawing/2014/main" xmlns="" id="{80EDBEE7-F95A-4152-9979-6A8847127CE3}"/>
+                <a16:creationId xmlns:a16="http://schemas.microsoft.com/office/drawing/2014/main" id="{80EDBEE7-F95A-4152-9979-6A8847127CE3}"/>
               </a:ext>
             </a:extLst>
           </p:cNvPr>
@@ -18050,7 +17946,7 @@
           <a:p>
             <a:fld id="{DAFA5E08-56C4-4D00-93E8-8E8047A8DE89}" type="datetime1">
               <a:rPr lang="de-DE" smtClean="0"/>
-              <a:t>29.09.2022</a:t>
+              <a:t>05.10.2022</a:t>
             </a:fld>
             <a:endParaRPr lang="de-DE"/>
           </a:p>
@@ -18061,7 +17957,7 @@
           <p:cNvPr id="5" name="Fußzeilenplatzhalter 4">
             <a:extLst>
               <a:ext uri="{FF2B5EF4-FFF2-40B4-BE49-F238E27FC236}">
-                <a16:creationId xmlns:a16="http://schemas.microsoft.com/office/drawing/2014/main" xmlns="" id="{B9438231-66E5-4D5F-BE6F-9468D9CB05DF}"/>
+                <a16:creationId xmlns:a16="http://schemas.microsoft.com/office/drawing/2014/main" id="{B9438231-66E5-4D5F-BE6F-9468D9CB05DF}"/>
               </a:ext>
             </a:extLst>
           </p:cNvPr>
@@ -18089,7 +17985,7 @@
           <p:cNvPr id="6" name="Foliennummernplatzhalter 5">
             <a:extLst>
               <a:ext uri="{FF2B5EF4-FFF2-40B4-BE49-F238E27FC236}">
-                <a16:creationId xmlns:a16="http://schemas.microsoft.com/office/drawing/2014/main" xmlns="" id="{C3BEA64F-3A50-4353-B3BD-9C9392B1AF78}"/>
+                <a16:creationId xmlns:a16="http://schemas.microsoft.com/office/drawing/2014/main" id="{C3BEA64F-3A50-4353-B3BD-9C9392B1AF78}"/>
               </a:ext>
             </a:extLst>
           </p:cNvPr>
@@ -18118,7 +18014,7 @@
           <p:cNvPr id="8" name="Grafik 7">
             <a:extLst>
               <a:ext uri="{FF2B5EF4-FFF2-40B4-BE49-F238E27FC236}">
-                <a16:creationId xmlns:a16="http://schemas.microsoft.com/office/drawing/2014/main" xmlns="" id="{813CDD06-B5BD-49BD-AB1B-0033BEEF5DD0}"/>
+                <a16:creationId xmlns:a16="http://schemas.microsoft.com/office/drawing/2014/main" id="{813CDD06-B5BD-49BD-AB1B-0033BEEF5DD0}"/>
               </a:ext>
             </a:extLst>
           </p:cNvPr>
@@ -18148,7 +18044,7 @@
           <p:cNvPr id="9" name="Rechteck 8">
             <a:extLst>
               <a:ext uri="{FF2B5EF4-FFF2-40B4-BE49-F238E27FC236}">
-                <a16:creationId xmlns:a16="http://schemas.microsoft.com/office/drawing/2014/main" xmlns="" id="{79276152-E2E5-4A9A-A037-92B89AD3EC4E}"/>
+                <a16:creationId xmlns:a16="http://schemas.microsoft.com/office/drawing/2014/main" id="{79276152-E2E5-4A9A-A037-92B89AD3EC4E}"/>
               </a:ext>
             </a:extLst>
           </p:cNvPr>
@@ -18205,14 +18101,6 @@
   <p:clrMapOvr>
     <a:masterClrMapping/>
   </p:clrMapOvr>
-  <mc:AlternateContent xmlns:mc="http://schemas.openxmlformats.org/markup-compatibility/2006" xmlns:p14="http://schemas.microsoft.com/office/powerpoint/2010/main">
-    <mc:Choice Requires="p14">
-      <p:transition spd="slow" p14:dur="2000"/>
-    </mc:Choice>
-    <mc:Fallback xmlns="">
-      <p:transition spd="slow"/>
-    </mc:Fallback>
-  </mc:AlternateContent>
 </p:sld>
 </file>
 
@@ -18238,7 +18126,7 @@
           <p:cNvPr id="2" name="Titel 1">
             <a:extLst>
               <a:ext uri="{FF2B5EF4-FFF2-40B4-BE49-F238E27FC236}">
-                <a16:creationId xmlns:a16="http://schemas.microsoft.com/office/drawing/2014/main" xmlns="" id="{0CB06ECF-1513-49AA-9F88-B06B02271295}"/>
+                <a16:creationId xmlns:a16="http://schemas.microsoft.com/office/drawing/2014/main" id="{0CB06ECF-1513-49AA-9F88-B06B02271295}"/>
               </a:ext>
             </a:extLst>
           </p:cNvPr>
@@ -18266,7 +18154,7 @@
           <p:cNvPr id="3" name="Inhaltsplatzhalter 2">
             <a:extLst>
               <a:ext uri="{FF2B5EF4-FFF2-40B4-BE49-F238E27FC236}">
-                <a16:creationId xmlns:a16="http://schemas.microsoft.com/office/drawing/2014/main" xmlns="" id="{78FDEB00-1B53-4BDA-8482-84D18CD32E31}"/>
+                <a16:creationId xmlns:a16="http://schemas.microsoft.com/office/drawing/2014/main" id="{78FDEB00-1B53-4BDA-8482-84D18CD32E31}"/>
               </a:ext>
             </a:extLst>
           </p:cNvPr>
@@ -18294,7 +18182,7 @@
           <p:cNvPr id="4" name="Datumsplatzhalter 3">
             <a:extLst>
               <a:ext uri="{FF2B5EF4-FFF2-40B4-BE49-F238E27FC236}">
-                <a16:creationId xmlns:a16="http://schemas.microsoft.com/office/drawing/2014/main" xmlns="" id="{749C8C97-BA0C-4DA9-88AC-BE1722F3E071}"/>
+                <a16:creationId xmlns:a16="http://schemas.microsoft.com/office/drawing/2014/main" id="{749C8C97-BA0C-4DA9-88AC-BE1722F3E071}"/>
               </a:ext>
             </a:extLst>
           </p:cNvPr>
@@ -18312,7 +18200,7 @@
           <a:p>
             <a:fld id="{DAFA5E08-56C4-4D00-93E8-8E8047A8DE89}" type="datetime1">
               <a:rPr lang="de-DE" smtClean="0"/>
-              <a:t>29.09.2022</a:t>
+              <a:t>05.10.2022</a:t>
             </a:fld>
             <a:endParaRPr lang="de-DE"/>
           </a:p>
@@ -18323,7 +18211,7 @@
           <p:cNvPr id="5" name="Fußzeilenplatzhalter 4">
             <a:extLst>
               <a:ext uri="{FF2B5EF4-FFF2-40B4-BE49-F238E27FC236}">
-                <a16:creationId xmlns:a16="http://schemas.microsoft.com/office/drawing/2014/main" xmlns="" id="{C8A8652E-68DB-4BE0-91A9-FCF6EA95856D}"/>
+                <a16:creationId xmlns:a16="http://schemas.microsoft.com/office/drawing/2014/main" id="{C8A8652E-68DB-4BE0-91A9-FCF6EA95856D}"/>
               </a:ext>
             </a:extLst>
           </p:cNvPr>
@@ -18351,7 +18239,7 @@
           <p:cNvPr id="6" name="Foliennummernplatzhalter 5">
             <a:extLst>
               <a:ext uri="{FF2B5EF4-FFF2-40B4-BE49-F238E27FC236}">
-                <a16:creationId xmlns:a16="http://schemas.microsoft.com/office/drawing/2014/main" xmlns="" id="{F99D947A-0299-46F6-B833-DAB23DA60E8F}"/>
+                <a16:creationId xmlns:a16="http://schemas.microsoft.com/office/drawing/2014/main" id="{F99D947A-0299-46F6-B833-DAB23DA60E8F}"/>
               </a:ext>
             </a:extLst>
           </p:cNvPr>
@@ -18380,7 +18268,7 @@
           <p:cNvPr id="8" name="Grafik 7">
             <a:extLst>
               <a:ext uri="{FF2B5EF4-FFF2-40B4-BE49-F238E27FC236}">
-                <a16:creationId xmlns:a16="http://schemas.microsoft.com/office/drawing/2014/main" xmlns="" id="{0E385604-59D7-4DEB-9C60-32646B4B499F}"/>
+                <a16:creationId xmlns:a16="http://schemas.microsoft.com/office/drawing/2014/main" id="{0E385604-59D7-4DEB-9C60-32646B4B499F}"/>
               </a:ext>
             </a:extLst>
           </p:cNvPr>
@@ -18410,7 +18298,7 @@
           <p:cNvPr id="9" name="Rechteck 8">
             <a:extLst>
               <a:ext uri="{FF2B5EF4-FFF2-40B4-BE49-F238E27FC236}">
-                <a16:creationId xmlns:a16="http://schemas.microsoft.com/office/drawing/2014/main" xmlns="" id="{EEE995E0-A763-49AE-8B68-65D7FFE0DBC4}"/>
+                <a16:creationId xmlns:a16="http://schemas.microsoft.com/office/drawing/2014/main" id="{EEE995E0-A763-49AE-8B68-65D7FFE0DBC4}"/>
               </a:ext>
             </a:extLst>
           </p:cNvPr>
@@ -18467,14 +18355,6 @@
   <p:clrMapOvr>
     <a:masterClrMapping/>
   </p:clrMapOvr>
-  <mc:AlternateContent xmlns:mc="http://schemas.openxmlformats.org/markup-compatibility/2006" xmlns:p14="http://schemas.microsoft.com/office/powerpoint/2010/main">
-    <mc:Choice Requires="p14">
-      <p:transition spd="slow" p14:dur="2000"/>
-    </mc:Choice>
-    <mc:Fallback xmlns="">
-      <p:transition spd="slow"/>
-    </mc:Fallback>
-  </mc:AlternateContent>
 </p:sld>
 </file>
 
@@ -18500,7 +18380,7 @@
           <p:cNvPr id="2" name="Titel 1">
             <a:extLst>
               <a:ext uri="{FF2B5EF4-FFF2-40B4-BE49-F238E27FC236}">
-                <a16:creationId xmlns:a16="http://schemas.microsoft.com/office/drawing/2014/main" xmlns="" id="{17BEC33B-94E9-44FF-8274-4B9A33CB9BE7}"/>
+                <a16:creationId xmlns:a16="http://schemas.microsoft.com/office/drawing/2014/main" id="{17BEC33B-94E9-44FF-8274-4B9A33CB9BE7}"/>
               </a:ext>
             </a:extLst>
           </p:cNvPr>
@@ -18528,7 +18408,7 @@
           <p:cNvPr id="3" name="Inhaltsplatzhalter 2">
             <a:extLst>
               <a:ext uri="{FF2B5EF4-FFF2-40B4-BE49-F238E27FC236}">
-                <a16:creationId xmlns:a16="http://schemas.microsoft.com/office/drawing/2014/main" xmlns="" id="{41BA17CF-99F6-4CED-9A83-2D038437896F}"/>
+                <a16:creationId xmlns:a16="http://schemas.microsoft.com/office/drawing/2014/main" id="{41BA17CF-99F6-4CED-9A83-2D038437896F}"/>
               </a:ext>
             </a:extLst>
           </p:cNvPr>
@@ -18556,7 +18436,7 @@
           <p:cNvPr id="4" name="Datumsplatzhalter 3">
             <a:extLst>
               <a:ext uri="{FF2B5EF4-FFF2-40B4-BE49-F238E27FC236}">
-                <a16:creationId xmlns:a16="http://schemas.microsoft.com/office/drawing/2014/main" xmlns="" id="{2EADB003-E907-497A-A332-D95676EDE97B}"/>
+                <a16:creationId xmlns:a16="http://schemas.microsoft.com/office/drawing/2014/main" id="{2EADB003-E907-497A-A332-D95676EDE97B}"/>
               </a:ext>
             </a:extLst>
           </p:cNvPr>
@@ -18574,7 +18454,7 @@
           <a:p>
             <a:fld id="{DAFA5E08-56C4-4D00-93E8-8E8047A8DE89}" type="datetime1">
               <a:rPr lang="de-DE" smtClean="0"/>
-              <a:t>29.09.2022</a:t>
+              <a:t>05.10.2022</a:t>
             </a:fld>
             <a:endParaRPr lang="de-DE"/>
           </a:p>
@@ -18585,7 +18465,7 @@
           <p:cNvPr id="5" name="Fußzeilenplatzhalter 4">
             <a:extLst>
               <a:ext uri="{FF2B5EF4-FFF2-40B4-BE49-F238E27FC236}">
-                <a16:creationId xmlns:a16="http://schemas.microsoft.com/office/drawing/2014/main" xmlns="" id="{4ADFBC2A-2B94-41EF-A7E5-67798723C6D0}"/>
+                <a16:creationId xmlns:a16="http://schemas.microsoft.com/office/drawing/2014/main" id="{4ADFBC2A-2B94-41EF-A7E5-67798723C6D0}"/>
               </a:ext>
             </a:extLst>
           </p:cNvPr>
@@ -18613,7 +18493,7 @@
           <p:cNvPr id="6" name="Foliennummernplatzhalter 5">
             <a:extLst>
               <a:ext uri="{FF2B5EF4-FFF2-40B4-BE49-F238E27FC236}">
-                <a16:creationId xmlns:a16="http://schemas.microsoft.com/office/drawing/2014/main" xmlns="" id="{B694AD4A-76F5-4E5E-99D9-BB1DB239D465}"/>
+                <a16:creationId xmlns:a16="http://schemas.microsoft.com/office/drawing/2014/main" id="{B694AD4A-76F5-4E5E-99D9-BB1DB239D465}"/>
               </a:ext>
             </a:extLst>
           </p:cNvPr>
@@ -18642,7 +18522,7 @@
           <p:cNvPr id="8" name="Grafik 7">
             <a:extLst>
               <a:ext uri="{FF2B5EF4-FFF2-40B4-BE49-F238E27FC236}">
-                <a16:creationId xmlns:a16="http://schemas.microsoft.com/office/drawing/2014/main" xmlns="" id="{41F1FEFA-CF75-4BC4-AF35-1F18060CCB9C}"/>
+                <a16:creationId xmlns:a16="http://schemas.microsoft.com/office/drawing/2014/main" id="{41F1FEFA-CF75-4BC4-AF35-1F18060CCB9C}"/>
               </a:ext>
             </a:extLst>
           </p:cNvPr>
@@ -18672,7 +18552,7 @@
           <p:cNvPr id="9" name="Rechteck 8">
             <a:extLst>
               <a:ext uri="{FF2B5EF4-FFF2-40B4-BE49-F238E27FC236}">
-                <a16:creationId xmlns:a16="http://schemas.microsoft.com/office/drawing/2014/main" xmlns="" id="{D0472EDB-F30E-4DA4-B0F4-FC9CAB6EF889}"/>
+                <a16:creationId xmlns:a16="http://schemas.microsoft.com/office/drawing/2014/main" id="{D0472EDB-F30E-4DA4-B0F4-FC9CAB6EF889}"/>
               </a:ext>
             </a:extLst>
           </p:cNvPr>
@@ -18729,14 +18609,6 @@
   <p:clrMapOvr>
     <a:masterClrMapping/>
   </p:clrMapOvr>
-  <mc:AlternateContent xmlns:mc="http://schemas.openxmlformats.org/markup-compatibility/2006" xmlns:p14="http://schemas.microsoft.com/office/powerpoint/2010/main">
-    <mc:Choice Requires="p14">
-      <p:transition spd="slow" p14:dur="2000"/>
-    </mc:Choice>
-    <mc:Fallback xmlns="">
-      <p:transition spd="slow"/>
-    </mc:Fallback>
-  </mc:AlternateContent>
 </p:sld>
 </file>
 
@@ -18762,7 +18634,7 @@
           <p:cNvPr id="2" name="Titel 1">
             <a:extLst>
               <a:ext uri="{FF2B5EF4-FFF2-40B4-BE49-F238E27FC236}">
-                <a16:creationId xmlns:a16="http://schemas.microsoft.com/office/drawing/2014/main" xmlns="" id="{9622A451-64BF-476F-B587-9257A8C1FD0A}"/>
+                <a16:creationId xmlns:a16="http://schemas.microsoft.com/office/drawing/2014/main" id="{9622A451-64BF-476F-B587-9257A8C1FD0A}"/>
               </a:ext>
             </a:extLst>
           </p:cNvPr>
@@ -18790,7 +18662,7 @@
           <p:cNvPr id="3" name="Inhaltsplatzhalter 2">
             <a:extLst>
               <a:ext uri="{FF2B5EF4-FFF2-40B4-BE49-F238E27FC236}">
-                <a16:creationId xmlns:a16="http://schemas.microsoft.com/office/drawing/2014/main" xmlns="" id="{63CCB5D6-5F74-4559-83B8-730EC00B7EAB}"/>
+                <a16:creationId xmlns:a16="http://schemas.microsoft.com/office/drawing/2014/main" id="{63CCB5D6-5F74-4559-83B8-730EC00B7EAB}"/>
               </a:ext>
             </a:extLst>
           </p:cNvPr>
@@ -18818,7 +18690,7 @@
           <p:cNvPr id="4" name="Datumsplatzhalter 3">
             <a:extLst>
               <a:ext uri="{FF2B5EF4-FFF2-40B4-BE49-F238E27FC236}">
-                <a16:creationId xmlns:a16="http://schemas.microsoft.com/office/drawing/2014/main" xmlns="" id="{8525DD59-D41F-4AA6-B700-5B33F5E5E268}"/>
+                <a16:creationId xmlns:a16="http://schemas.microsoft.com/office/drawing/2014/main" id="{8525DD59-D41F-4AA6-B700-5B33F5E5E268}"/>
               </a:ext>
             </a:extLst>
           </p:cNvPr>
@@ -18836,7 +18708,7 @@
           <a:p>
             <a:fld id="{DAFA5E08-56C4-4D00-93E8-8E8047A8DE89}" type="datetime1">
               <a:rPr lang="de-DE" smtClean="0"/>
-              <a:t>29.09.2022</a:t>
+              <a:t>05.10.2022</a:t>
             </a:fld>
             <a:endParaRPr lang="de-DE"/>
           </a:p>
@@ -18847,7 +18719,7 @@
           <p:cNvPr id="5" name="Fußzeilenplatzhalter 4">
             <a:extLst>
               <a:ext uri="{FF2B5EF4-FFF2-40B4-BE49-F238E27FC236}">
-                <a16:creationId xmlns:a16="http://schemas.microsoft.com/office/drawing/2014/main" xmlns="" id="{D5D2FE9C-F4D0-4E00-A71B-F5879C369226}"/>
+                <a16:creationId xmlns:a16="http://schemas.microsoft.com/office/drawing/2014/main" id="{D5D2FE9C-F4D0-4E00-A71B-F5879C369226}"/>
               </a:ext>
             </a:extLst>
           </p:cNvPr>
@@ -18875,7 +18747,7 @@
           <p:cNvPr id="6" name="Foliennummernplatzhalter 5">
             <a:extLst>
               <a:ext uri="{FF2B5EF4-FFF2-40B4-BE49-F238E27FC236}">
-                <a16:creationId xmlns:a16="http://schemas.microsoft.com/office/drawing/2014/main" xmlns="" id="{E3B2A07C-28E6-4363-88DB-51E2410D266C}"/>
+                <a16:creationId xmlns:a16="http://schemas.microsoft.com/office/drawing/2014/main" id="{E3B2A07C-28E6-4363-88DB-51E2410D266C}"/>
               </a:ext>
             </a:extLst>
           </p:cNvPr>
@@ -18904,7 +18776,7 @@
           <p:cNvPr id="8" name="Grafik 7">
             <a:extLst>
               <a:ext uri="{FF2B5EF4-FFF2-40B4-BE49-F238E27FC236}">
-                <a16:creationId xmlns:a16="http://schemas.microsoft.com/office/drawing/2014/main" xmlns="" id="{8BA1EAD2-0B65-492B-9263-E4417983ABB9}"/>
+                <a16:creationId xmlns:a16="http://schemas.microsoft.com/office/drawing/2014/main" id="{8BA1EAD2-0B65-492B-9263-E4417983ABB9}"/>
               </a:ext>
             </a:extLst>
           </p:cNvPr>
@@ -18934,7 +18806,7 @@
           <p:cNvPr id="9" name="Rechteck 8">
             <a:extLst>
               <a:ext uri="{FF2B5EF4-FFF2-40B4-BE49-F238E27FC236}">
-                <a16:creationId xmlns:a16="http://schemas.microsoft.com/office/drawing/2014/main" xmlns="" id="{88C76C34-CAC4-4BD8-B936-D173168B5BFC}"/>
+                <a16:creationId xmlns:a16="http://schemas.microsoft.com/office/drawing/2014/main" id="{88C76C34-CAC4-4BD8-B936-D173168B5BFC}"/>
               </a:ext>
             </a:extLst>
           </p:cNvPr>
@@ -18991,14 +18863,6 @@
   <p:clrMapOvr>
     <a:masterClrMapping/>
   </p:clrMapOvr>
-  <mc:AlternateContent xmlns:mc="http://schemas.openxmlformats.org/markup-compatibility/2006" xmlns:p14="http://schemas.microsoft.com/office/powerpoint/2010/main">
-    <mc:Choice Requires="p14">
-      <p:transition spd="slow" p14:dur="2000"/>
-    </mc:Choice>
-    <mc:Fallback xmlns="">
-      <p:transition spd="slow"/>
-    </mc:Fallback>
-  </mc:AlternateContent>
 </p:sld>
 </file>
 
@@ -19024,7 +18888,7 @@
           <p:cNvPr id="2" name="Titel 1">
             <a:extLst>
               <a:ext uri="{FF2B5EF4-FFF2-40B4-BE49-F238E27FC236}">
-                <a16:creationId xmlns:a16="http://schemas.microsoft.com/office/drawing/2014/main" xmlns="" id="{AF572405-AA93-48E2-9758-0D6D454B650C}"/>
+                <a16:creationId xmlns:a16="http://schemas.microsoft.com/office/drawing/2014/main" id="{AF572405-AA93-48E2-9758-0D6D454B650C}"/>
               </a:ext>
             </a:extLst>
           </p:cNvPr>
@@ -19052,7 +18916,7 @@
           <p:cNvPr id="3" name="Inhaltsplatzhalter 2">
             <a:extLst>
               <a:ext uri="{FF2B5EF4-FFF2-40B4-BE49-F238E27FC236}">
-                <a16:creationId xmlns:a16="http://schemas.microsoft.com/office/drawing/2014/main" xmlns="" id="{2913F135-B601-4351-9038-4D1EABF29085}"/>
+                <a16:creationId xmlns:a16="http://schemas.microsoft.com/office/drawing/2014/main" id="{2913F135-B601-4351-9038-4D1EABF29085}"/>
               </a:ext>
             </a:extLst>
           </p:cNvPr>
@@ -19080,7 +18944,7 @@
           <p:cNvPr id="4" name="Datumsplatzhalter 3">
             <a:extLst>
               <a:ext uri="{FF2B5EF4-FFF2-40B4-BE49-F238E27FC236}">
-                <a16:creationId xmlns:a16="http://schemas.microsoft.com/office/drawing/2014/main" xmlns="" id="{32193F0A-F504-41E3-BBBF-FAF230DD5913}"/>
+                <a16:creationId xmlns:a16="http://schemas.microsoft.com/office/drawing/2014/main" id="{32193F0A-F504-41E3-BBBF-FAF230DD5913}"/>
               </a:ext>
             </a:extLst>
           </p:cNvPr>
@@ -19098,7 +18962,7 @@
           <a:p>
             <a:fld id="{DAFA5E08-56C4-4D00-93E8-8E8047A8DE89}" type="datetime1">
               <a:rPr lang="de-DE" smtClean="0"/>
-              <a:t>29.09.2022</a:t>
+              <a:t>05.10.2022</a:t>
             </a:fld>
             <a:endParaRPr lang="de-DE"/>
           </a:p>
@@ -19109,7 +18973,7 @@
           <p:cNvPr id="5" name="Fußzeilenplatzhalter 4">
             <a:extLst>
               <a:ext uri="{FF2B5EF4-FFF2-40B4-BE49-F238E27FC236}">
-                <a16:creationId xmlns:a16="http://schemas.microsoft.com/office/drawing/2014/main" xmlns="" id="{AD59E32A-93AB-450A-9118-23BB44B6536B}"/>
+                <a16:creationId xmlns:a16="http://schemas.microsoft.com/office/drawing/2014/main" id="{AD59E32A-93AB-450A-9118-23BB44B6536B}"/>
               </a:ext>
             </a:extLst>
           </p:cNvPr>
@@ -19137,7 +19001,7 @@
           <p:cNvPr id="6" name="Foliennummernplatzhalter 5">
             <a:extLst>
               <a:ext uri="{FF2B5EF4-FFF2-40B4-BE49-F238E27FC236}">
-                <a16:creationId xmlns:a16="http://schemas.microsoft.com/office/drawing/2014/main" xmlns="" id="{AE6910A8-6E1B-40DC-9A8B-FF74D1FD6C3C}"/>
+                <a16:creationId xmlns:a16="http://schemas.microsoft.com/office/drawing/2014/main" id="{AE6910A8-6E1B-40DC-9A8B-FF74D1FD6C3C}"/>
               </a:ext>
             </a:extLst>
           </p:cNvPr>
@@ -19166,7 +19030,7 @@
           <p:cNvPr id="8" name="Grafik 7">
             <a:extLst>
               <a:ext uri="{FF2B5EF4-FFF2-40B4-BE49-F238E27FC236}">
-                <a16:creationId xmlns:a16="http://schemas.microsoft.com/office/drawing/2014/main" xmlns="" id="{55C25C56-E080-4F82-AEB0-C8E02E52C5D5}"/>
+                <a16:creationId xmlns:a16="http://schemas.microsoft.com/office/drawing/2014/main" id="{55C25C56-E080-4F82-AEB0-C8E02E52C5D5}"/>
               </a:ext>
             </a:extLst>
           </p:cNvPr>
@@ -19196,7 +19060,7 @@
           <p:cNvPr id="9" name="Rechteck 8">
             <a:extLst>
               <a:ext uri="{FF2B5EF4-FFF2-40B4-BE49-F238E27FC236}">
-                <a16:creationId xmlns:a16="http://schemas.microsoft.com/office/drawing/2014/main" xmlns="" id="{3299AFB2-B8B8-4C19-B0C0-50E338859774}"/>
+                <a16:creationId xmlns:a16="http://schemas.microsoft.com/office/drawing/2014/main" id="{3299AFB2-B8B8-4C19-B0C0-50E338859774}"/>
               </a:ext>
             </a:extLst>
           </p:cNvPr>
@@ -19253,14 +19117,6 @@
   <p:clrMapOvr>
     <a:masterClrMapping/>
   </p:clrMapOvr>
-  <mc:AlternateContent xmlns:mc="http://schemas.openxmlformats.org/markup-compatibility/2006" xmlns:p14="http://schemas.microsoft.com/office/powerpoint/2010/main">
-    <mc:Choice Requires="p14">
-      <p:transition spd="slow" p14:dur="2000"/>
-    </mc:Choice>
-    <mc:Fallback xmlns="">
-      <p:transition spd="slow"/>
-    </mc:Fallback>
-  </mc:AlternateContent>
 </p:sld>
 </file>
 
@@ -19286,7 +19142,7 @@
           <p:cNvPr id="2" name="Titel 1">
             <a:extLst>
               <a:ext uri="{FF2B5EF4-FFF2-40B4-BE49-F238E27FC236}">
-                <a16:creationId xmlns:a16="http://schemas.microsoft.com/office/drawing/2014/main" xmlns="" id="{AF572405-AA93-48E2-9758-0D6D454B650C}"/>
+                <a16:creationId xmlns:a16="http://schemas.microsoft.com/office/drawing/2014/main" id="{AF572405-AA93-48E2-9758-0D6D454B650C}"/>
               </a:ext>
             </a:extLst>
           </p:cNvPr>
@@ -19314,7 +19170,7 @@
           <p:cNvPr id="3" name="Inhaltsplatzhalter 2">
             <a:extLst>
               <a:ext uri="{FF2B5EF4-FFF2-40B4-BE49-F238E27FC236}">
-                <a16:creationId xmlns:a16="http://schemas.microsoft.com/office/drawing/2014/main" xmlns="" id="{2913F135-B601-4351-9038-4D1EABF29085}"/>
+                <a16:creationId xmlns:a16="http://schemas.microsoft.com/office/drawing/2014/main" id="{2913F135-B601-4351-9038-4D1EABF29085}"/>
               </a:ext>
             </a:extLst>
           </p:cNvPr>
@@ -19359,7 +19215,7 @@
           <p:cNvPr id="4" name="Datumsplatzhalter 3">
             <a:extLst>
               <a:ext uri="{FF2B5EF4-FFF2-40B4-BE49-F238E27FC236}">
-                <a16:creationId xmlns:a16="http://schemas.microsoft.com/office/drawing/2014/main" xmlns="" id="{32193F0A-F504-41E3-BBBF-FAF230DD5913}"/>
+                <a16:creationId xmlns:a16="http://schemas.microsoft.com/office/drawing/2014/main" id="{32193F0A-F504-41E3-BBBF-FAF230DD5913}"/>
               </a:ext>
             </a:extLst>
           </p:cNvPr>
@@ -19377,7 +19233,7 @@
           <a:p>
             <a:fld id="{DAFA5E08-56C4-4D00-93E8-8E8047A8DE89}" type="datetime1">
               <a:rPr lang="de-DE" smtClean="0"/>
-              <a:t>29.09.2022</a:t>
+              <a:t>05.10.2022</a:t>
             </a:fld>
             <a:endParaRPr lang="de-DE"/>
           </a:p>
@@ -19388,7 +19244,7 @@
           <p:cNvPr id="5" name="Fußzeilenplatzhalter 4">
             <a:extLst>
               <a:ext uri="{FF2B5EF4-FFF2-40B4-BE49-F238E27FC236}">
-                <a16:creationId xmlns:a16="http://schemas.microsoft.com/office/drawing/2014/main" xmlns="" id="{AD59E32A-93AB-450A-9118-23BB44B6536B}"/>
+                <a16:creationId xmlns:a16="http://schemas.microsoft.com/office/drawing/2014/main" id="{AD59E32A-93AB-450A-9118-23BB44B6536B}"/>
               </a:ext>
             </a:extLst>
           </p:cNvPr>
@@ -19416,7 +19272,7 @@
           <p:cNvPr id="6" name="Foliennummernplatzhalter 5">
             <a:extLst>
               <a:ext uri="{FF2B5EF4-FFF2-40B4-BE49-F238E27FC236}">
-                <a16:creationId xmlns:a16="http://schemas.microsoft.com/office/drawing/2014/main" xmlns="" id="{AE6910A8-6E1B-40DC-9A8B-FF74D1FD6C3C}"/>
+                <a16:creationId xmlns:a16="http://schemas.microsoft.com/office/drawing/2014/main" id="{AE6910A8-6E1B-40DC-9A8B-FF74D1FD6C3C}"/>
               </a:ext>
             </a:extLst>
           </p:cNvPr>
@@ -19445,7 +19301,7 @@
           <p:cNvPr id="10" name="Grafik 9">
             <a:extLst>
               <a:ext uri="{FF2B5EF4-FFF2-40B4-BE49-F238E27FC236}">
-                <a16:creationId xmlns:a16="http://schemas.microsoft.com/office/drawing/2014/main" xmlns="" id="{5E0F97A0-73E6-4660-9F17-4876A90E3B8D}"/>
+                <a16:creationId xmlns:a16="http://schemas.microsoft.com/office/drawing/2014/main" id="{5E0F97A0-73E6-4660-9F17-4876A90E3B8D}"/>
               </a:ext>
             </a:extLst>
           </p:cNvPr>
@@ -19475,7 +19331,7 @@
           <p:cNvPr id="9" name="Rechteck 8">
             <a:extLst>
               <a:ext uri="{FF2B5EF4-FFF2-40B4-BE49-F238E27FC236}">
-                <a16:creationId xmlns:a16="http://schemas.microsoft.com/office/drawing/2014/main" xmlns="" id="{3299AFB2-B8B8-4C19-B0C0-50E338859774}"/>
+                <a16:creationId xmlns:a16="http://schemas.microsoft.com/office/drawing/2014/main" id="{3299AFB2-B8B8-4C19-B0C0-50E338859774}"/>
               </a:ext>
             </a:extLst>
           </p:cNvPr>
@@ -19527,7 +19383,7 @@
           <p:cNvPr id="11" name="Rechteck 10">
             <a:extLst>
               <a:ext uri="{FF2B5EF4-FFF2-40B4-BE49-F238E27FC236}">
-                <a16:creationId xmlns:a16="http://schemas.microsoft.com/office/drawing/2014/main" xmlns="" id="{75005434-A059-4AEA-B2EC-7B2735A94F9C}"/>
+                <a16:creationId xmlns:a16="http://schemas.microsoft.com/office/drawing/2014/main" id="{75005434-A059-4AEA-B2EC-7B2735A94F9C}"/>
               </a:ext>
             </a:extLst>
           </p:cNvPr>
@@ -19579,7 +19435,7 @@
           <p:cNvPr id="12" name="Rechteck 11">
             <a:extLst>
               <a:ext uri="{FF2B5EF4-FFF2-40B4-BE49-F238E27FC236}">
-                <a16:creationId xmlns:a16="http://schemas.microsoft.com/office/drawing/2014/main" xmlns="" id="{B71BBD8E-75A4-4870-9D92-91EF1167BB28}"/>
+                <a16:creationId xmlns:a16="http://schemas.microsoft.com/office/drawing/2014/main" id="{B71BBD8E-75A4-4870-9D92-91EF1167BB28}"/>
               </a:ext>
             </a:extLst>
           </p:cNvPr>
@@ -19631,7 +19487,7 @@
           <p:cNvPr id="14" name="Grafik 13">
             <a:extLst>
               <a:ext uri="{FF2B5EF4-FFF2-40B4-BE49-F238E27FC236}">
-                <a16:creationId xmlns:a16="http://schemas.microsoft.com/office/drawing/2014/main" xmlns="" id="{72C6601B-51C8-436C-88C9-B067BD5D3005}"/>
+                <a16:creationId xmlns:a16="http://schemas.microsoft.com/office/drawing/2014/main" id="{72C6601B-51C8-436C-88C9-B067BD5D3005}"/>
               </a:ext>
             </a:extLst>
           </p:cNvPr>
@@ -19661,7 +19517,7 @@
           <p:cNvPr id="15" name="Textfeld 14">
             <a:extLst>
               <a:ext uri="{FF2B5EF4-FFF2-40B4-BE49-F238E27FC236}">
-                <a16:creationId xmlns:a16="http://schemas.microsoft.com/office/drawing/2014/main" xmlns="" id="{5941C7F5-7A09-48BB-87E6-A9F6EB96DBE3}"/>
+                <a16:creationId xmlns:a16="http://schemas.microsoft.com/office/drawing/2014/main" id="{5941C7F5-7A09-48BB-87E6-A9F6EB96DBE3}"/>
               </a:ext>
             </a:extLst>
           </p:cNvPr>
@@ -19700,7 +19556,7 @@
           <p:cNvPr id="16" name="Textfeld 15">
             <a:extLst>
               <a:ext uri="{FF2B5EF4-FFF2-40B4-BE49-F238E27FC236}">
-                <a16:creationId xmlns:a16="http://schemas.microsoft.com/office/drawing/2014/main" xmlns="" id="{C03CDD47-E9C8-4E06-B500-FBC2A56EA321}"/>
+                <a16:creationId xmlns:a16="http://schemas.microsoft.com/office/drawing/2014/main" id="{C03CDD47-E9C8-4E06-B500-FBC2A56EA321}"/>
               </a:ext>
             </a:extLst>
           </p:cNvPr>
@@ -19739,7 +19595,7 @@
           <p:cNvPr id="17" name="Textfeld 16">
             <a:extLst>
               <a:ext uri="{FF2B5EF4-FFF2-40B4-BE49-F238E27FC236}">
-                <a16:creationId xmlns:a16="http://schemas.microsoft.com/office/drawing/2014/main" xmlns="" id="{204C307E-416F-498B-AE6E-D28662960977}"/>
+                <a16:creationId xmlns:a16="http://schemas.microsoft.com/office/drawing/2014/main" id="{204C307E-416F-498B-AE6E-D28662960977}"/>
               </a:ext>
             </a:extLst>
           </p:cNvPr>
@@ -19778,7 +19634,7 @@
           <p:cNvPr id="18" name="Rechteck 17">
             <a:extLst>
               <a:ext uri="{FF2B5EF4-FFF2-40B4-BE49-F238E27FC236}">
-                <a16:creationId xmlns:a16="http://schemas.microsoft.com/office/drawing/2014/main" xmlns="" id="{90DC0F51-266D-42A5-9CCD-54BF331636BF}"/>
+                <a16:creationId xmlns:a16="http://schemas.microsoft.com/office/drawing/2014/main" id="{90DC0F51-266D-42A5-9CCD-54BF331636BF}"/>
               </a:ext>
             </a:extLst>
           </p:cNvPr>
@@ -19830,7 +19686,7 @@
           <p:cNvPr id="19" name="Textfeld 18">
             <a:extLst>
               <a:ext uri="{FF2B5EF4-FFF2-40B4-BE49-F238E27FC236}">
-                <a16:creationId xmlns:a16="http://schemas.microsoft.com/office/drawing/2014/main" xmlns="" id="{DF6EA910-19EA-49FA-AAB9-3B5B3BC1CAD5}"/>
+                <a16:creationId xmlns:a16="http://schemas.microsoft.com/office/drawing/2014/main" id="{DF6EA910-19EA-49FA-AAB9-3B5B3BC1CAD5}"/>
               </a:ext>
             </a:extLst>
           </p:cNvPr>
@@ -19869,7 +19725,7 @@
           <p:cNvPr id="20" name="Textfeld 19">
             <a:extLst>
               <a:ext uri="{FF2B5EF4-FFF2-40B4-BE49-F238E27FC236}">
-                <a16:creationId xmlns:a16="http://schemas.microsoft.com/office/drawing/2014/main" xmlns="" id="{0A6EF321-A884-4ADA-91F7-BC1F6EC855AA}"/>
+                <a16:creationId xmlns:a16="http://schemas.microsoft.com/office/drawing/2014/main" id="{0A6EF321-A884-4ADA-91F7-BC1F6EC855AA}"/>
               </a:ext>
             </a:extLst>
           </p:cNvPr>
@@ -19915,14 +19771,6 @@
   <p:clrMapOvr>
     <a:masterClrMapping/>
   </p:clrMapOvr>
-  <mc:AlternateContent xmlns:mc="http://schemas.openxmlformats.org/markup-compatibility/2006" xmlns:p14="http://schemas.microsoft.com/office/powerpoint/2010/main">
-    <mc:Choice Requires="p14">
-      <p:transition spd="slow" p14:dur="2000"/>
-    </mc:Choice>
-    <mc:Fallback xmlns="">
-      <p:transition spd="slow"/>
-    </mc:Fallback>
-  </mc:AlternateContent>
 </p:sld>
 </file>
 
@@ -19948,7 +19796,7 @@
           <p:cNvPr id="2" name="Titel 1">
             <a:extLst>
               <a:ext uri="{FF2B5EF4-FFF2-40B4-BE49-F238E27FC236}">
-                <a16:creationId xmlns:a16="http://schemas.microsoft.com/office/drawing/2014/main" xmlns="" id="{CC75B289-7CB6-4F77-A9BE-2DD7573CA67A}"/>
+                <a16:creationId xmlns:a16="http://schemas.microsoft.com/office/drawing/2014/main" id="{CC75B289-7CB6-4F77-A9BE-2DD7573CA67A}"/>
               </a:ext>
             </a:extLst>
           </p:cNvPr>
@@ -19976,7 +19824,7 @@
           <p:cNvPr id="3" name="Inhaltsplatzhalter 2">
             <a:extLst>
               <a:ext uri="{FF2B5EF4-FFF2-40B4-BE49-F238E27FC236}">
-                <a16:creationId xmlns:a16="http://schemas.microsoft.com/office/drawing/2014/main" xmlns="" id="{561B6C4E-B3BA-4ACF-9628-23EA18DDE36D}"/>
+                <a16:creationId xmlns:a16="http://schemas.microsoft.com/office/drawing/2014/main" id="{561B6C4E-B3BA-4ACF-9628-23EA18DDE36D}"/>
               </a:ext>
             </a:extLst>
           </p:cNvPr>
@@ -20001,7 +19849,7 @@
           <p:cNvPr id="4" name="Datumsplatzhalter 3">
             <a:extLst>
               <a:ext uri="{FF2B5EF4-FFF2-40B4-BE49-F238E27FC236}">
-                <a16:creationId xmlns:a16="http://schemas.microsoft.com/office/drawing/2014/main" xmlns="" id="{426139B0-D4F3-4F19-AA56-9FA59B918BE4}"/>
+                <a16:creationId xmlns:a16="http://schemas.microsoft.com/office/drawing/2014/main" id="{426139B0-D4F3-4F19-AA56-9FA59B918BE4}"/>
               </a:ext>
             </a:extLst>
           </p:cNvPr>
@@ -20019,7 +19867,7 @@
           <a:p>
             <a:fld id="{DAFA5E08-56C4-4D00-93E8-8E8047A8DE89}" type="datetime1">
               <a:rPr lang="de-DE" smtClean="0"/>
-              <a:t>29.09.2022</a:t>
+              <a:t>05.10.2022</a:t>
             </a:fld>
             <a:endParaRPr lang="de-DE"/>
           </a:p>
@@ -20030,7 +19878,7 @@
           <p:cNvPr id="5" name="Fußzeilenplatzhalter 4">
             <a:extLst>
               <a:ext uri="{FF2B5EF4-FFF2-40B4-BE49-F238E27FC236}">
-                <a16:creationId xmlns:a16="http://schemas.microsoft.com/office/drawing/2014/main" xmlns="" id="{365CD957-E03C-4D38-AFFB-323A1554F4D9}"/>
+                <a16:creationId xmlns:a16="http://schemas.microsoft.com/office/drawing/2014/main" id="{365CD957-E03C-4D38-AFFB-323A1554F4D9}"/>
               </a:ext>
             </a:extLst>
           </p:cNvPr>
@@ -20058,7 +19906,7 @@
           <p:cNvPr id="6" name="Foliennummernplatzhalter 5">
             <a:extLst>
               <a:ext uri="{FF2B5EF4-FFF2-40B4-BE49-F238E27FC236}">
-                <a16:creationId xmlns:a16="http://schemas.microsoft.com/office/drawing/2014/main" xmlns="" id="{2FA0442F-79CD-403C-8A0E-F33F7ABFE99B}"/>
+                <a16:creationId xmlns:a16="http://schemas.microsoft.com/office/drawing/2014/main" id="{2FA0442F-79CD-403C-8A0E-F33F7ABFE99B}"/>
               </a:ext>
             </a:extLst>
           </p:cNvPr>
@@ -20092,14 +19940,6 @@
   <p:clrMapOvr>
     <a:masterClrMapping/>
   </p:clrMapOvr>
-  <mc:AlternateContent xmlns:mc="http://schemas.openxmlformats.org/markup-compatibility/2006" xmlns:p14="http://schemas.microsoft.com/office/powerpoint/2010/main">
-    <mc:Choice Requires="p14">
-      <p:transition spd="slow" p14:dur="2000"/>
-    </mc:Choice>
-    <mc:Fallback xmlns="">
-      <p:transition spd="slow"/>
-    </mc:Fallback>
-  </mc:AlternateContent>
 </p:sld>
 </file>
 
@@ -20148,7 +19988,7 @@
           <p:cNvPr id="2" name="Titel 1">
             <a:extLst>
               <a:ext uri="{FF2B5EF4-FFF2-40B4-BE49-F238E27FC236}">
-                <a16:creationId xmlns:a16="http://schemas.microsoft.com/office/drawing/2014/main" xmlns="" id="{A00C8FA2-3D0F-4462-B489-9D479E59C16D}"/>
+                <a16:creationId xmlns:a16="http://schemas.microsoft.com/office/drawing/2014/main" id="{A00C8FA2-3D0F-4462-B489-9D479E59C16D}"/>
               </a:ext>
             </a:extLst>
           </p:cNvPr>
@@ -20165,10 +20005,9 @@
           <a:lstStyle/>
           <a:p>
             <a:r>
-              <a:rPr lang="de-DE" dirty="0" smtClean="0"/>
+              <a:rPr lang="de-DE" dirty="0"/>
               <a:t>Virtuelles Gerät Speicher erweitern</a:t>
             </a:r>
-            <a:endParaRPr lang="de-DE" dirty="0"/>
           </a:p>
         </p:txBody>
       </p:sp>
@@ -20177,7 +20016,7 @@
           <p:cNvPr id="3" name="Inhaltsplatzhalter 2">
             <a:extLst>
               <a:ext uri="{FF2B5EF4-FFF2-40B4-BE49-F238E27FC236}">
-                <a16:creationId xmlns:a16="http://schemas.microsoft.com/office/drawing/2014/main" xmlns="" id="{EF420444-B9D9-449D-9F83-EDAC6443C9E0}"/>
+                <a16:creationId xmlns:a16="http://schemas.microsoft.com/office/drawing/2014/main" id="{EF420444-B9D9-449D-9F83-EDAC6443C9E0}"/>
               </a:ext>
             </a:extLst>
           </p:cNvPr>
@@ -20194,7 +20033,7 @@
           <a:lstStyle/>
           <a:p>
             <a:r>
-              <a:rPr lang="de-DE" dirty="0" smtClean="0"/>
+              <a:rPr lang="de-DE" dirty="0"/>
               <a:t>Gerät editieren</a:t>
             </a:r>
           </a:p>
@@ -20202,7 +20041,7 @@
             <a:pPr marL="0" indent="0">
               <a:buNone/>
             </a:pPr>
-            <a:endParaRPr lang="de-DE" dirty="0" smtClean="0"/>
+            <a:endParaRPr lang="de-DE" dirty="0"/>
           </a:p>
         </p:txBody>
       </p:sp>
@@ -20211,7 +20050,7 @@
           <p:cNvPr id="4" name="Datumsplatzhalter 3">
             <a:extLst>
               <a:ext uri="{FF2B5EF4-FFF2-40B4-BE49-F238E27FC236}">
-                <a16:creationId xmlns:a16="http://schemas.microsoft.com/office/drawing/2014/main" xmlns="" id="{B9F44BAF-14C3-4189-B74D-915E8CF56F5B}"/>
+                <a16:creationId xmlns:a16="http://schemas.microsoft.com/office/drawing/2014/main" id="{B9F44BAF-14C3-4189-B74D-915E8CF56F5B}"/>
               </a:ext>
             </a:extLst>
           </p:cNvPr>
@@ -20229,7 +20068,7 @@
           <a:p>
             <a:fld id="{DAFA5E08-56C4-4D00-93E8-8E8047A8DE89}" type="datetime1">
               <a:rPr lang="de-DE" smtClean="0"/>
-              <a:t>29.09.2022</a:t>
+              <a:t>05.10.2022</a:t>
             </a:fld>
             <a:endParaRPr lang="de-DE"/>
           </a:p>
@@ -20240,7 +20079,7 @@
           <p:cNvPr id="5" name="Fußzeilenplatzhalter 4">
             <a:extLst>
               <a:ext uri="{FF2B5EF4-FFF2-40B4-BE49-F238E27FC236}">
-                <a16:creationId xmlns:a16="http://schemas.microsoft.com/office/drawing/2014/main" xmlns="" id="{2C6060AF-582E-4CB3-BA70-301162BF6574}"/>
+                <a16:creationId xmlns:a16="http://schemas.microsoft.com/office/drawing/2014/main" id="{2C6060AF-582E-4CB3-BA70-301162BF6574}"/>
               </a:ext>
             </a:extLst>
           </p:cNvPr>
@@ -20268,7 +20107,7 @@
           <p:cNvPr id="6" name="Foliennummernplatzhalter 5">
             <a:extLst>
               <a:ext uri="{FF2B5EF4-FFF2-40B4-BE49-F238E27FC236}">
-                <a16:creationId xmlns:a16="http://schemas.microsoft.com/office/drawing/2014/main" xmlns="" id="{BB168572-FF3C-485B-934A-3CBFA358045B}"/>
+                <a16:creationId xmlns:a16="http://schemas.microsoft.com/office/drawing/2014/main" id="{BB168572-FF3C-485B-934A-3CBFA358045B}"/>
               </a:ext>
             </a:extLst>
           </p:cNvPr>
@@ -20297,7 +20136,7 @@
           <p:cNvPr id="14" name="Rechteck 13">
             <a:extLst>
               <a:ext uri="{FF2B5EF4-FFF2-40B4-BE49-F238E27FC236}">
-                <a16:creationId xmlns:a16="http://schemas.microsoft.com/office/drawing/2014/main" xmlns="" id="{85560B81-A6BE-4DC9-B69C-4241C54B1911}"/>
+                <a16:creationId xmlns:a16="http://schemas.microsoft.com/office/drawing/2014/main" id="{85560B81-A6BE-4DC9-B69C-4241C54B1911}"/>
               </a:ext>
             </a:extLst>
           </p:cNvPr>
@@ -20379,7 +20218,7 @@
           <p:cNvPr id="2" name="Titel 1">
             <a:extLst>
               <a:ext uri="{FF2B5EF4-FFF2-40B4-BE49-F238E27FC236}">
-                <a16:creationId xmlns:a16="http://schemas.microsoft.com/office/drawing/2014/main" xmlns="" id="{A00C8FA2-3D0F-4462-B489-9D479E59C16D}"/>
+                <a16:creationId xmlns:a16="http://schemas.microsoft.com/office/drawing/2014/main" id="{A00C8FA2-3D0F-4462-B489-9D479E59C16D}"/>
               </a:ext>
             </a:extLst>
           </p:cNvPr>
@@ -20396,10 +20235,9 @@
           <a:lstStyle/>
           <a:p>
             <a:r>
-              <a:rPr lang="de-DE" dirty="0" smtClean="0"/>
+              <a:rPr lang="de-DE" dirty="0"/>
               <a:t>Virtuelles Gerät Speicher erweitern</a:t>
             </a:r>
-            <a:endParaRPr lang="de-DE" dirty="0"/>
           </a:p>
         </p:txBody>
       </p:sp>
@@ -20408,7 +20246,7 @@
           <p:cNvPr id="4" name="Datumsplatzhalter 3">
             <a:extLst>
               <a:ext uri="{FF2B5EF4-FFF2-40B4-BE49-F238E27FC236}">
-                <a16:creationId xmlns:a16="http://schemas.microsoft.com/office/drawing/2014/main" xmlns="" id="{B9F44BAF-14C3-4189-B74D-915E8CF56F5B}"/>
+                <a16:creationId xmlns:a16="http://schemas.microsoft.com/office/drawing/2014/main" id="{B9F44BAF-14C3-4189-B74D-915E8CF56F5B}"/>
               </a:ext>
             </a:extLst>
           </p:cNvPr>
@@ -20426,7 +20264,7 @@
           <a:p>
             <a:fld id="{DAFA5E08-56C4-4D00-93E8-8E8047A8DE89}" type="datetime1">
               <a:rPr lang="de-DE" smtClean="0"/>
-              <a:t>29.09.2022</a:t>
+              <a:t>05.10.2022</a:t>
             </a:fld>
             <a:endParaRPr lang="de-DE"/>
           </a:p>
@@ -20437,7 +20275,7 @@
           <p:cNvPr id="5" name="Fußzeilenplatzhalter 4">
             <a:extLst>
               <a:ext uri="{FF2B5EF4-FFF2-40B4-BE49-F238E27FC236}">
-                <a16:creationId xmlns:a16="http://schemas.microsoft.com/office/drawing/2014/main" xmlns="" id="{2C6060AF-582E-4CB3-BA70-301162BF6574}"/>
+                <a16:creationId xmlns:a16="http://schemas.microsoft.com/office/drawing/2014/main" id="{2C6060AF-582E-4CB3-BA70-301162BF6574}"/>
               </a:ext>
             </a:extLst>
           </p:cNvPr>
@@ -20465,7 +20303,7 @@
           <p:cNvPr id="6" name="Foliennummernplatzhalter 5">
             <a:extLst>
               <a:ext uri="{FF2B5EF4-FFF2-40B4-BE49-F238E27FC236}">
-                <a16:creationId xmlns:a16="http://schemas.microsoft.com/office/drawing/2014/main" xmlns="" id="{BB168572-FF3C-485B-934A-3CBFA358045B}"/>
+                <a16:creationId xmlns:a16="http://schemas.microsoft.com/office/drawing/2014/main" id="{BB168572-FF3C-485B-934A-3CBFA358045B}"/>
               </a:ext>
             </a:extLst>
           </p:cNvPr>
@@ -20518,7 +20356,7 @@
           <p:cNvPr id="10" name="Rechteck 9">
             <a:extLst>
               <a:ext uri="{FF2B5EF4-FFF2-40B4-BE49-F238E27FC236}">
-                <a16:creationId xmlns:a16="http://schemas.microsoft.com/office/drawing/2014/main" xmlns="" id="{85560B81-A6BE-4DC9-B69C-4241C54B1911}"/>
+                <a16:creationId xmlns:a16="http://schemas.microsoft.com/office/drawing/2014/main" id="{85560B81-A6BE-4DC9-B69C-4241C54B1911}"/>
               </a:ext>
             </a:extLst>
           </p:cNvPr>
@@ -20600,7 +20438,7 @@
           <p:cNvPr id="21" name="Grafik 20">
             <a:extLst>
               <a:ext uri="{FF2B5EF4-FFF2-40B4-BE49-F238E27FC236}">
-                <a16:creationId xmlns:a16="http://schemas.microsoft.com/office/drawing/2014/main" xmlns="" id="{2B46A86D-EEA7-41F7-944E-90169476D210}"/>
+                <a16:creationId xmlns:a16="http://schemas.microsoft.com/office/drawing/2014/main" id="{2B46A86D-EEA7-41F7-944E-90169476D210}"/>
               </a:ext>
             </a:extLst>
           </p:cNvPr>
@@ -20630,7 +20468,7 @@
           <p:cNvPr id="2" name="Titel 1">
             <a:extLst>
               <a:ext uri="{FF2B5EF4-FFF2-40B4-BE49-F238E27FC236}">
-                <a16:creationId xmlns:a16="http://schemas.microsoft.com/office/drawing/2014/main" xmlns="" id="{3D06AC85-31DB-46E1-85F8-8923FA1CEB1B}"/>
+                <a16:creationId xmlns:a16="http://schemas.microsoft.com/office/drawing/2014/main" id="{3D06AC85-31DB-46E1-85F8-8923FA1CEB1B}"/>
               </a:ext>
             </a:extLst>
           </p:cNvPr>
@@ -20663,7 +20501,7 @@
           <p:cNvPr id="3" name="Inhaltsplatzhalter 2">
             <a:extLst>
               <a:ext uri="{FF2B5EF4-FFF2-40B4-BE49-F238E27FC236}">
-                <a16:creationId xmlns:a16="http://schemas.microsoft.com/office/drawing/2014/main" xmlns="" id="{1BB1FAFF-BD9C-4662-B9FB-A392A294B4B2}"/>
+                <a16:creationId xmlns:a16="http://schemas.microsoft.com/office/drawing/2014/main" id="{1BB1FAFF-BD9C-4662-B9FB-A392A294B4B2}"/>
               </a:ext>
             </a:extLst>
           </p:cNvPr>
@@ -20736,7 +20574,7 @@
           <p:cNvPr id="4" name="Datumsplatzhalter 3">
             <a:extLst>
               <a:ext uri="{FF2B5EF4-FFF2-40B4-BE49-F238E27FC236}">
-                <a16:creationId xmlns:a16="http://schemas.microsoft.com/office/drawing/2014/main" xmlns="" id="{C37515A2-6923-4204-96D7-4F86D5B29C4A}"/>
+                <a16:creationId xmlns:a16="http://schemas.microsoft.com/office/drawing/2014/main" id="{C37515A2-6923-4204-96D7-4F86D5B29C4A}"/>
               </a:ext>
             </a:extLst>
           </p:cNvPr>
@@ -20754,7 +20592,7 @@
           <a:p>
             <a:fld id="{DAFA5E08-56C4-4D00-93E8-8E8047A8DE89}" type="datetime1">
               <a:rPr lang="de-DE" smtClean="0"/>
-              <a:t>29.09.2022</a:t>
+              <a:t>05.10.2022</a:t>
             </a:fld>
             <a:endParaRPr lang="de-DE"/>
           </a:p>
@@ -20765,7 +20603,7 @@
           <p:cNvPr id="5" name="Fußzeilenplatzhalter 4">
             <a:extLst>
               <a:ext uri="{FF2B5EF4-FFF2-40B4-BE49-F238E27FC236}">
-                <a16:creationId xmlns:a16="http://schemas.microsoft.com/office/drawing/2014/main" xmlns="" id="{A727A03D-FEEC-4A08-8782-CD5AB534433E}"/>
+                <a16:creationId xmlns:a16="http://schemas.microsoft.com/office/drawing/2014/main" id="{A727A03D-FEEC-4A08-8782-CD5AB534433E}"/>
               </a:ext>
             </a:extLst>
           </p:cNvPr>
@@ -20793,7 +20631,7 @@
           <p:cNvPr id="6" name="Foliennummernplatzhalter 5">
             <a:extLst>
               <a:ext uri="{FF2B5EF4-FFF2-40B4-BE49-F238E27FC236}">
-                <a16:creationId xmlns:a16="http://schemas.microsoft.com/office/drawing/2014/main" xmlns="" id="{5135177D-A485-4CA0-837E-DEF719D98F6F}"/>
+                <a16:creationId xmlns:a16="http://schemas.microsoft.com/office/drawing/2014/main" id="{5135177D-A485-4CA0-837E-DEF719D98F6F}"/>
               </a:ext>
             </a:extLst>
           </p:cNvPr>
@@ -20822,7 +20660,7 @@
           <p:cNvPr id="9" name="Rechteck 8">
             <a:extLst>
               <a:ext uri="{FF2B5EF4-FFF2-40B4-BE49-F238E27FC236}">
-                <a16:creationId xmlns:a16="http://schemas.microsoft.com/office/drawing/2014/main" xmlns="" id="{DAB80900-F1F5-469B-BE24-B625BB3CA31F}"/>
+                <a16:creationId xmlns:a16="http://schemas.microsoft.com/office/drawing/2014/main" id="{DAB80900-F1F5-469B-BE24-B625BB3CA31F}"/>
               </a:ext>
             </a:extLst>
           </p:cNvPr>
@@ -20874,7 +20712,7 @@
           <p:cNvPr id="10" name="Rechteck 9">
             <a:extLst>
               <a:ext uri="{FF2B5EF4-FFF2-40B4-BE49-F238E27FC236}">
-                <a16:creationId xmlns:a16="http://schemas.microsoft.com/office/drawing/2014/main" xmlns="" id="{F394505C-D33A-4D34-A580-6FB766C94B6B}"/>
+                <a16:creationId xmlns:a16="http://schemas.microsoft.com/office/drawing/2014/main" id="{F394505C-D33A-4D34-A580-6FB766C94B6B}"/>
               </a:ext>
             </a:extLst>
           </p:cNvPr>
@@ -20926,7 +20764,7 @@
           <p:cNvPr id="11" name="Textfeld 10">
             <a:extLst>
               <a:ext uri="{FF2B5EF4-FFF2-40B4-BE49-F238E27FC236}">
-                <a16:creationId xmlns:a16="http://schemas.microsoft.com/office/drawing/2014/main" xmlns="" id="{0819711E-1774-4D86-B4E4-490B5E53FB22}"/>
+                <a16:creationId xmlns:a16="http://schemas.microsoft.com/office/drawing/2014/main" id="{0819711E-1774-4D86-B4E4-490B5E53FB22}"/>
               </a:ext>
             </a:extLst>
           </p:cNvPr>
@@ -20975,7 +20813,7 @@
           <p:cNvPr id="13" name="Gerade Verbindung mit Pfeil 12">
             <a:extLst>
               <a:ext uri="{FF2B5EF4-FFF2-40B4-BE49-F238E27FC236}">
-                <a16:creationId xmlns:a16="http://schemas.microsoft.com/office/drawing/2014/main" xmlns="" id="{D825E028-E7EA-41D4-8B7E-D6C1C96426A7}"/>
+                <a16:creationId xmlns:a16="http://schemas.microsoft.com/office/drawing/2014/main" id="{D825E028-E7EA-41D4-8B7E-D6C1C96426A7}"/>
               </a:ext>
             </a:extLst>
           </p:cNvPr>
@@ -21016,7 +20854,7 @@
           <p:cNvPr id="14" name="Textfeld 13">
             <a:extLst>
               <a:ext uri="{FF2B5EF4-FFF2-40B4-BE49-F238E27FC236}">
-                <a16:creationId xmlns:a16="http://schemas.microsoft.com/office/drawing/2014/main" xmlns="" id="{80E27F0A-E3B4-4B37-B859-078BC36041AE}"/>
+                <a16:creationId xmlns:a16="http://schemas.microsoft.com/office/drawing/2014/main" id="{80E27F0A-E3B4-4B37-B859-078BC36041AE}"/>
               </a:ext>
             </a:extLst>
           </p:cNvPr>
@@ -21051,7 +20889,7 @@
           <p:cNvPr id="15" name="Gerade Verbindung mit Pfeil 14">
             <a:extLst>
               <a:ext uri="{FF2B5EF4-FFF2-40B4-BE49-F238E27FC236}">
-                <a16:creationId xmlns:a16="http://schemas.microsoft.com/office/drawing/2014/main" xmlns="" id="{1DBD54D6-D34F-45E3-85C4-6D580B9A0753}"/>
+                <a16:creationId xmlns:a16="http://schemas.microsoft.com/office/drawing/2014/main" id="{1DBD54D6-D34F-45E3-85C4-6D580B9A0753}"/>
               </a:ext>
             </a:extLst>
           </p:cNvPr>
@@ -21092,7 +20930,7 @@
           <p:cNvPr id="24" name="Gerade Verbindung mit Pfeil 23">
             <a:extLst>
               <a:ext uri="{FF2B5EF4-FFF2-40B4-BE49-F238E27FC236}">
-                <a16:creationId xmlns:a16="http://schemas.microsoft.com/office/drawing/2014/main" xmlns="" id="{177D5350-8D1C-428D-84C3-0DBA64B1CE4A}"/>
+                <a16:creationId xmlns:a16="http://schemas.microsoft.com/office/drawing/2014/main" id="{177D5350-8D1C-428D-84C3-0DBA64B1CE4A}"/>
               </a:ext>
             </a:extLst>
           </p:cNvPr>
@@ -21133,7 +20971,7 @@
           <p:cNvPr id="25" name="Gerade Verbindung mit Pfeil 24">
             <a:extLst>
               <a:ext uri="{FF2B5EF4-FFF2-40B4-BE49-F238E27FC236}">
-                <a16:creationId xmlns:a16="http://schemas.microsoft.com/office/drawing/2014/main" xmlns="" id="{3C19137C-B336-4B6F-97E7-44B3CC0505B9}"/>
+                <a16:creationId xmlns:a16="http://schemas.microsoft.com/office/drawing/2014/main" id="{3C19137C-B336-4B6F-97E7-44B3CC0505B9}"/>
               </a:ext>
             </a:extLst>
           </p:cNvPr>
@@ -21174,7 +21012,7 @@
           <p:cNvPr id="29" name="Textfeld 28">
             <a:extLst>
               <a:ext uri="{FF2B5EF4-FFF2-40B4-BE49-F238E27FC236}">
-                <a16:creationId xmlns:a16="http://schemas.microsoft.com/office/drawing/2014/main" xmlns="" id="{5E1B3BB4-1407-48C1-98E3-27FA191AF0D9}"/>
+                <a16:creationId xmlns:a16="http://schemas.microsoft.com/office/drawing/2014/main" id="{5E1B3BB4-1407-48C1-98E3-27FA191AF0D9}"/>
               </a:ext>
             </a:extLst>
           </p:cNvPr>
@@ -21209,7 +21047,7 @@
           <p:cNvPr id="30" name="Textfeld 29">
             <a:extLst>
               <a:ext uri="{FF2B5EF4-FFF2-40B4-BE49-F238E27FC236}">
-                <a16:creationId xmlns:a16="http://schemas.microsoft.com/office/drawing/2014/main" xmlns="" id="{F7919C57-3380-4BBB-A895-4481B9BDBA93}"/>
+                <a16:creationId xmlns:a16="http://schemas.microsoft.com/office/drawing/2014/main" id="{F7919C57-3380-4BBB-A895-4481B9BDBA93}"/>
               </a:ext>
             </a:extLst>
           </p:cNvPr>
@@ -21249,13 +21087,6 @@
   <p:clrMapOvr>
     <a:masterClrMapping/>
   </p:clrMapOvr>
-  <p:timing>
-    <p:tnLst>
-      <p:par>
-        <p:cTn id="1" dur="indefinite" restart="never" nodeType="tmRoot"/>
-      </p:par>
-    </p:tnLst>
-  </p:timing>
 </p:sld>
 </file>
 
@@ -21304,7 +21135,7 @@
           <p:cNvPr id="2" name="Titel 1">
             <a:extLst>
               <a:ext uri="{FF2B5EF4-FFF2-40B4-BE49-F238E27FC236}">
-                <a16:creationId xmlns:a16="http://schemas.microsoft.com/office/drawing/2014/main" xmlns="" id="{A00C8FA2-3D0F-4462-B489-9D479E59C16D}"/>
+                <a16:creationId xmlns:a16="http://schemas.microsoft.com/office/drawing/2014/main" id="{A00C8FA2-3D0F-4462-B489-9D479E59C16D}"/>
               </a:ext>
             </a:extLst>
           </p:cNvPr>
@@ -21321,10 +21152,9 @@
           <a:lstStyle/>
           <a:p>
             <a:r>
-              <a:rPr lang="de-DE" dirty="0" smtClean="0"/>
+              <a:rPr lang="de-DE" dirty="0"/>
               <a:t>Virtuelles Gerät Speicher erweitern</a:t>
             </a:r>
-            <a:endParaRPr lang="de-DE" dirty="0"/>
           </a:p>
         </p:txBody>
       </p:sp>
@@ -21333,7 +21163,7 @@
           <p:cNvPr id="4" name="Datumsplatzhalter 3">
             <a:extLst>
               <a:ext uri="{FF2B5EF4-FFF2-40B4-BE49-F238E27FC236}">
-                <a16:creationId xmlns:a16="http://schemas.microsoft.com/office/drawing/2014/main" xmlns="" id="{B9F44BAF-14C3-4189-B74D-915E8CF56F5B}"/>
+                <a16:creationId xmlns:a16="http://schemas.microsoft.com/office/drawing/2014/main" id="{B9F44BAF-14C3-4189-B74D-915E8CF56F5B}"/>
               </a:ext>
             </a:extLst>
           </p:cNvPr>
@@ -21351,7 +21181,7 @@
           <a:p>
             <a:fld id="{DAFA5E08-56C4-4D00-93E8-8E8047A8DE89}" type="datetime1">
               <a:rPr lang="de-DE" smtClean="0"/>
-              <a:t>29.09.2022</a:t>
+              <a:t>05.10.2022</a:t>
             </a:fld>
             <a:endParaRPr lang="de-DE"/>
           </a:p>
@@ -21362,7 +21192,7 @@
           <p:cNvPr id="5" name="Fußzeilenplatzhalter 4">
             <a:extLst>
               <a:ext uri="{FF2B5EF4-FFF2-40B4-BE49-F238E27FC236}">
-                <a16:creationId xmlns:a16="http://schemas.microsoft.com/office/drawing/2014/main" xmlns="" id="{2C6060AF-582E-4CB3-BA70-301162BF6574}"/>
+                <a16:creationId xmlns:a16="http://schemas.microsoft.com/office/drawing/2014/main" id="{2C6060AF-582E-4CB3-BA70-301162BF6574}"/>
               </a:ext>
             </a:extLst>
           </p:cNvPr>
@@ -21390,7 +21220,7 @@
           <p:cNvPr id="6" name="Foliennummernplatzhalter 5">
             <a:extLst>
               <a:ext uri="{FF2B5EF4-FFF2-40B4-BE49-F238E27FC236}">
-                <a16:creationId xmlns:a16="http://schemas.microsoft.com/office/drawing/2014/main" xmlns="" id="{BB168572-FF3C-485B-934A-3CBFA358045B}"/>
+                <a16:creationId xmlns:a16="http://schemas.microsoft.com/office/drawing/2014/main" id="{BB168572-FF3C-485B-934A-3CBFA358045B}"/>
               </a:ext>
             </a:extLst>
           </p:cNvPr>
@@ -21419,7 +21249,7 @@
           <p:cNvPr id="10" name="Rechteck 9">
             <a:extLst>
               <a:ext uri="{FF2B5EF4-FFF2-40B4-BE49-F238E27FC236}">
-                <a16:creationId xmlns:a16="http://schemas.microsoft.com/office/drawing/2014/main" xmlns="" id="{85560B81-A6BE-4DC9-B69C-4241C54B1911}"/>
+                <a16:creationId xmlns:a16="http://schemas.microsoft.com/office/drawing/2014/main" id="{85560B81-A6BE-4DC9-B69C-4241C54B1911}"/>
               </a:ext>
             </a:extLst>
           </p:cNvPr>
@@ -21471,7 +21301,7 @@
           <p:cNvPr id="9" name="Inhaltsplatzhalter 2">
             <a:extLst>
               <a:ext uri="{FF2B5EF4-FFF2-40B4-BE49-F238E27FC236}">
-                <a16:creationId xmlns:a16="http://schemas.microsoft.com/office/drawing/2014/main" xmlns="" id="{EF420444-B9D9-449D-9F83-EDAC6443C9E0}"/>
+                <a16:creationId xmlns:a16="http://schemas.microsoft.com/office/drawing/2014/main" id="{EF420444-B9D9-449D-9F83-EDAC6443C9E0}"/>
               </a:ext>
             </a:extLst>
           </p:cNvPr>
@@ -21493,14 +21323,14 @@
           <a:lstStyle/>
           <a:p>
             <a:r>
-              <a:rPr lang="de-DE" dirty="0" smtClean="0"/>
+              <a:rPr lang="de-DE" dirty="0"/>
               <a:t>Internal Storage:</a:t>
             </a:r>
           </a:p>
           <a:p>
             <a:pPr lvl="1"/>
             <a:r>
-              <a:rPr lang="de-DE" dirty="0" smtClean="0"/>
+              <a:rPr lang="de-DE" dirty="0"/>
               <a:t>Auf 2000 MB setzen</a:t>
             </a:r>
           </a:p>
@@ -21508,7 +21338,7 @@
             <a:pPr marL="0" indent="0">
               <a:buNone/>
             </a:pPr>
-            <a:endParaRPr lang="de-DE" dirty="0" smtClean="0"/>
+            <a:endParaRPr lang="de-DE" dirty="0"/>
           </a:p>
         </p:txBody>
       </p:sp>
@@ -21547,7 +21377,7 @@
           <p:cNvPr id="2" name="Titel 1">
             <a:extLst>
               <a:ext uri="{FF2B5EF4-FFF2-40B4-BE49-F238E27FC236}">
-                <a16:creationId xmlns:a16="http://schemas.microsoft.com/office/drawing/2014/main" xmlns="" id="{A00C8FA2-3D0F-4462-B489-9D479E59C16D}"/>
+                <a16:creationId xmlns:a16="http://schemas.microsoft.com/office/drawing/2014/main" id="{A00C8FA2-3D0F-4462-B489-9D479E59C16D}"/>
               </a:ext>
             </a:extLst>
           </p:cNvPr>
@@ -21564,10 +21394,9 @@
           <a:lstStyle/>
           <a:p>
             <a:r>
-              <a:rPr lang="de-DE" dirty="0" smtClean="0"/>
+              <a:rPr lang="de-DE" dirty="0"/>
               <a:t>Virtuelles Gerät Speicher erweitern</a:t>
             </a:r>
-            <a:endParaRPr lang="de-DE" dirty="0"/>
           </a:p>
         </p:txBody>
       </p:sp>
@@ -21576,7 +21405,7 @@
           <p:cNvPr id="4" name="Datumsplatzhalter 3">
             <a:extLst>
               <a:ext uri="{FF2B5EF4-FFF2-40B4-BE49-F238E27FC236}">
-                <a16:creationId xmlns:a16="http://schemas.microsoft.com/office/drawing/2014/main" xmlns="" id="{B9F44BAF-14C3-4189-B74D-915E8CF56F5B}"/>
+                <a16:creationId xmlns:a16="http://schemas.microsoft.com/office/drawing/2014/main" id="{B9F44BAF-14C3-4189-B74D-915E8CF56F5B}"/>
               </a:ext>
             </a:extLst>
           </p:cNvPr>
@@ -21594,7 +21423,7 @@
           <a:p>
             <a:fld id="{DAFA5E08-56C4-4D00-93E8-8E8047A8DE89}" type="datetime1">
               <a:rPr lang="de-DE" smtClean="0"/>
-              <a:t>29.09.2022</a:t>
+              <a:t>05.10.2022</a:t>
             </a:fld>
             <a:endParaRPr lang="de-DE"/>
           </a:p>
@@ -21605,7 +21434,7 @@
           <p:cNvPr id="5" name="Fußzeilenplatzhalter 4">
             <a:extLst>
               <a:ext uri="{FF2B5EF4-FFF2-40B4-BE49-F238E27FC236}">
-                <a16:creationId xmlns:a16="http://schemas.microsoft.com/office/drawing/2014/main" xmlns="" id="{2C6060AF-582E-4CB3-BA70-301162BF6574}"/>
+                <a16:creationId xmlns:a16="http://schemas.microsoft.com/office/drawing/2014/main" id="{2C6060AF-582E-4CB3-BA70-301162BF6574}"/>
               </a:ext>
             </a:extLst>
           </p:cNvPr>
@@ -21633,7 +21462,7 @@
           <p:cNvPr id="6" name="Foliennummernplatzhalter 5">
             <a:extLst>
               <a:ext uri="{FF2B5EF4-FFF2-40B4-BE49-F238E27FC236}">
-                <a16:creationId xmlns:a16="http://schemas.microsoft.com/office/drawing/2014/main" xmlns="" id="{BB168572-FF3C-485B-934A-3CBFA358045B}"/>
+                <a16:creationId xmlns:a16="http://schemas.microsoft.com/office/drawing/2014/main" id="{BB168572-FF3C-485B-934A-3CBFA358045B}"/>
               </a:ext>
             </a:extLst>
           </p:cNvPr>
@@ -21662,7 +21491,7 @@
           <p:cNvPr id="10" name="Rechteck 9">
             <a:extLst>
               <a:ext uri="{FF2B5EF4-FFF2-40B4-BE49-F238E27FC236}">
-                <a16:creationId xmlns:a16="http://schemas.microsoft.com/office/drawing/2014/main" xmlns="" id="{85560B81-A6BE-4DC9-B69C-4241C54B1911}"/>
+                <a16:creationId xmlns:a16="http://schemas.microsoft.com/office/drawing/2014/main" id="{85560B81-A6BE-4DC9-B69C-4241C54B1911}"/>
               </a:ext>
             </a:extLst>
           </p:cNvPr>
@@ -21714,7 +21543,7 @@
           <p:cNvPr id="9" name="Inhaltsplatzhalter 2">
             <a:extLst>
               <a:ext uri="{FF2B5EF4-FFF2-40B4-BE49-F238E27FC236}">
-                <a16:creationId xmlns:a16="http://schemas.microsoft.com/office/drawing/2014/main" xmlns="" id="{EF420444-B9D9-449D-9F83-EDAC6443C9E0}"/>
+                <a16:creationId xmlns:a16="http://schemas.microsoft.com/office/drawing/2014/main" id="{EF420444-B9D9-449D-9F83-EDAC6443C9E0}"/>
               </a:ext>
             </a:extLst>
           </p:cNvPr>
@@ -21736,7 +21565,7 @@
           <a:lstStyle/>
           <a:p>
             <a:r>
-              <a:rPr lang="de-DE" dirty="0" smtClean="0"/>
+              <a:rPr lang="de-DE" dirty="0"/>
               <a:t>Virtual Device Starten</a:t>
             </a:r>
           </a:p>
@@ -21744,7 +21573,7 @@
             <a:pPr marL="0" indent="0">
               <a:buNone/>
             </a:pPr>
-            <a:endParaRPr lang="de-DE" dirty="0" smtClean="0"/>
+            <a:endParaRPr lang="de-DE" dirty="0"/>
           </a:p>
         </p:txBody>
       </p:sp>
@@ -21777,7 +21606,7 @@
           <p:cNvPr id="11" name="Rechteck 10">
             <a:extLst>
               <a:ext uri="{FF2B5EF4-FFF2-40B4-BE49-F238E27FC236}">
-                <a16:creationId xmlns:a16="http://schemas.microsoft.com/office/drawing/2014/main" xmlns="" id="{85560B81-A6BE-4DC9-B69C-4241C54B1911}"/>
+                <a16:creationId xmlns:a16="http://schemas.microsoft.com/office/drawing/2014/main" id="{85560B81-A6BE-4DC9-B69C-4241C54B1911}"/>
               </a:ext>
             </a:extLst>
           </p:cNvPr>
@@ -21859,7 +21688,7 @@
           <p:cNvPr id="2" name="Titel 1">
             <a:extLst>
               <a:ext uri="{FF2B5EF4-FFF2-40B4-BE49-F238E27FC236}">
-                <a16:creationId xmlns:a16="http://schemas.microsoft.com/office/drawing/2014/main" xmlns="" id="{A00C8FA2-3D0F-4462-B489-9D479E59C16D}"/>
+                <a16:creationId xmlns:a16="http://schemas.microsoft.com/office/drawing/2014/main" id="{A00C8FA2-3D0F-4462-B489-9D479E59C16D}"/>
               </a:ext>
             </a:extLst>
           </p:cNvPr>
@@ -21876,10 +21705,9 @@
           <a:lstStyle/>
           <a:p>
             <a:r>
-              <a:rPr lang="de-DE" dirty="0" smtClean="0"/>
+              <a:rPr lang="de-DE" dirty="0"/>
               <a:t>Virtuelles Gerät Speicher erweitern</a:t>
             </a:r>
-            <a:endParaRPr lang="de-DE" dirty="0"/>
           </a:p>
         </p:txBody>
       </p:sp>
@@ -21888,7 +21716,7 @@
           <p:cNvPr id="4" name="Datumsplatzhalter 3">
             <a:extLst>
               <a:ext uri="{FF2B5EF4-FFF2-40B4-BE49-F238E27FC236}">
-                <a16:creationId xmlns:a16="http://schemas.microsoft.com/office/drawing/2014/main" xmlns="" id="{B9F44BAF-14C3-4189-B74D-915E8CF56F5B}"/>
+                <a16:creationId xmlns:a16="http://schemas.microsoft.com/office/drawing/2014/main" id="{B9F44BAF-14C3-4189-B74D-915E8CF56F5B}"/>
               </a:ext>
             </a:extLst>
           </p:cNvPr>
@@ -21906,7 +21734,7 @@
           <a:p>
             <a:fld id="{DAFA5E08-56C4-4D00-93E8-8E8047A8DE89}" type="datetime1">
               <a:rPr lang="de-DE" smtClean="0"/>
-              <a:t>29.09.2022</a:t>
+              <a:t>05.10.2022</a:t>
             </a:fld>
             <a:endParaRPr lang="de-DE"/>
           </a:p>
@@ -21917,7 +21745,7 @@
           <p:cNvPr id="5" name="Fußzeilenplatzhalter 4">
             <a:extLst>
               <a:ext uri="{FF2B5EF4-FFF2-40B4-BE49-F238E27FC236}">
-                <a16:creationId xmlns:a16="http://schemas.microsoft.com/office/drawing/2014/main" xmlns="" id="{2C6060AF-582E-4CB3-BA70-301162BF6574}"/>
+                <a16:creationId xmlns:a16="http://schemas.microsoft.com/office/drawing/2014/main" id="{2C6060AF-582E-4CB3-BA70-301162BF6574}"/>
               </a:ext>
             </a:extLst>
           </p:cNvPr>
@@ -21945,7 +21773,7 @@
           <p:cNvPr id="6" name="Foliennummernplatzhalter 5">
             <a:extLst>
               <a:ext uri="{FF2B5EF4-FFF2-40B4-BE49-F238E27FC236}">
-                <a16:creationId xmlns:a16="http://schemas.microsoft.com/office/drawing/2014/main" xmlns="" id="{BB168572-FF3C-485B-934A-3CBFA358045B}"/>
+                <a16:creationId xmlns:a16="http://schemas.microsoft.com/office/drawing/2014/main" id="{BB168572-FF3C-485B-934A-3CBFA358045B}"/>
               </a:ext>
             </a:extLst>
           </p:cNvPr>
@@ -21974,7 +21802,7 @@
           <p:cNvPr id="9" name="Inhaltsplatzhalter 2">
             <a:extLst>
               <a:ext uri="{FF2B5EF4-FFF2-40B4-BE49-F238E27FC236}">
-                <a16:creationId xmlns:a16="http://schemas.microsoft.com/office/drawing/2014/main" xmlns="" id="{EF420444-B9D9-449D-9F83-EDAC6443C9E0}"/>
+                <a16:creationId xmlns:a16="http://schemas.microsoft.com/office/drawing/2014/main" id="{EF420444-B9D9-449D-9F83-EDAC6443C9E0}"/>
               </a:ext>
             </a:extLst>
           </p:cNvPr>
@@ -21996,7 +21824,7 @@
           <a:lstStyle/>
           <a:p>
             <a:r>
-              <a:rPr lang="de-DE" dirty="0" smtClean="0"/>
+              <a:rPr lang="de-DE" dirty="0"/>
               <a:t>Gerät auswählen und App starten</a:t>
             </a:r>
           </a:p>
@@ -22004,7 +21832,7 @@
             <a:pPr marL="0" indent="0">
               <a:buNone/>
             </a:pPr>
-            <a:endParaRPr lang="de-DE" dirty="0" smtClean="0"/>
+            <a:endParaRPr lang="de-DE" dirty="0"/>
           </a:p>
         </p:txBody>
       </p:sp>
@@ -22037,7 +21865,7 @@
           <p:cNvPr id="13" name="Rechteck 12">
             <a:extLst>
               <a:ext uri="{FF2B5EF4-FFF2-40B4-BE49-F238E27FC236}">
-                <a16:creationId xmlns:a16="http://schemas.microsoft.com/office/drawing/2014/main" xmlns="" id="{85560B81-A6BE-4DC9-B69C-4241C54B1911}"/>
+                <a16:creationId xmlns:a16="http://schemas.microsoft.com/office/drawing/2014/main" id="{85560B81-A6BE-4DC9-B69C-4241C54B1911}"/>
               </a:ext>
             </a:extLst>
           </p:cNvPr>
@@ -22089,7 +21917,7 @@
           <p:cNvPr id="14" name="Rechteck 13">
             <a:extLst>
               <a:ext uri="{FF2B5EF4-FFF2-40B4-BE49-F238E27FC236}">
-                <a16:creationId xmlns:a16="http://schemas.microsoft.com/office/drawing/2014/main" xmlns="" id="{85560B81-A6BE-4DC9-B69C-4241C54B1911}"/>
+                <a16:creationId xmlns:a16="http://schemas.microsoft.com/office/drawing/2014/main" id="{85560B81-A6BE-4DC9-B69C-4241C54B1911}"/>
               </a:ext>
             </a:extLst>
           </p:cNvPr>
@@ -22171,7 +21999,7 @@
           <p:cNvPr id="2" name="Titel 1">
             <a:extLst>
               <a:ext uri="{FF2B5EF4-FFF2-40B4-BE49-F238E27FC236}">
-                <a16:creationId xmlns:a16="http://schemas.microsoft.com/office/drawing/2014/main" xmlns="" id="{A00C8FA2-3D0F-4462-B489-9D479E59C16D}"/>
+                <a16:creationId xmlns:a16="http://schemas.microsoft.com/office/drawing/2014/main" id="{A00C8FA2-3D0F-4462-B489-9D479E59C16D}"/>
               </a:ext>
             </a:extLst>
           </p:cNvPr>
@@ -22188,10 +22016,9 @@
           <a:lstStyle/>
           <a:p>
             <a:r>
-              <a:rPr lang="de-DE" dirty="0" smtClean="0"/>
+              <a:rPr lang="de-DE" dirty="0"/>
               <a:t>Virtuelles Gerät Speicher erweitern</a:t>
             </a:r>
-            <a:endParaRPr lang="de-DE" dirty="0"/>
           </a:p>
         </p:txBody>
       </p:sp>
@@ -22200,7 +22027,7 @@
           <p:cNvPr id="4" name="Datumsplatzhalter 3">
             <a:extLst>
               <a:ext uri="{FF2B5EF4-FFF2-40B4-BE49-F238E27FC236}">
-                <a16:creationId xmlns:a16="http://schemas.microsoft.com/office/drawing/2014/main" xmlns="" id="{B9F44BAF-14C3-4189-B74D-915E8CF56F5B}"/>
+                <a16:creationId xmlns:a16="http://schemas.microsoft.com/office/drawing/2014/main" id="{B9F44BAF-14C3-4189-B74D-915E8CF56F5B}"/>
               </a:ext>
             </a:extLst>
           </p:cNvPr>
@@ -22218,7 +22045,7 @@
           <a:p>
             <a:fld id="{DAFA5E08-56C4-4D00-93E8-8E8047A8DE89}" type="datetime1">
               <a:rPr lang="de-DE" smtClean="0"/>
-              <a:t>29.09.2022</a:t>
+              <a:t>05.10.2022</a:t>
             </a:fld>
             <a:endParaRPr lang="de-DE"/>
           </a:p>
@@ -22229,7 +22056,7 @@
           <p:cNvPr id="5" name="Fußzeilenplatzhalter 4">
             <a:extLst>
               <a:ext uri="{FF2B5EF4-FFF2-40B4-BE49-F238E27FC236}">
-                <a16:creationId xmlns:a16="http://schemas.microsoft.com/office/drawing/2014/main" xmlns="" id="{2C6060AF-582E-4CB3-BA70-301162BF6574}"/>
+                <a16:creationId xmlns:a16="http://schemas.microsoft.com/office/drawing/2014/main" id="{2C6060AF-582E-4CB3-BA70-301162BF6574}"/>
               </a:ext>
             </a:extLst>
           </p:cNvPr>
@@ -22257,7 +22084,7 @@
           <p:cNvPr id="6" name="Foliennummernplatzhalter 5">
             <a:extLst>
               <a:ext uri="{FF2B5EF4-FFF2-40B4-BE49-F238E27FC236}">
-                <a16:creationId xmlns:a16="http://schemas.microsoft.com/office/drawing/2014/main" xmlns="" id="{BB168572-FF3C-485B-934A-3CBFA358045B}"/>
+                <a16:creationId xmlns:a16="http://schemas.microsoft.com/office/drawing/2014/main" id="{BB168572-FF3C-485B-934A-3CBFA358045B}"/>
               </a:ext>
             </a:extLst>
           </p:cNvPr>
@@ -22310,7 +22137,7 @@
           <p:cNvPr id="12" name="Grafik 11">
             <a:extLst>
               <a:ext uri="{FF2B5EF4-FFF2-40B4-BE49-F238E27FC236}">
-                <a16:creationId xmlns:a16="http://schemas.microsoft.com/office/drawing/2014/main" xmlns="" id="{A5F50C68-E92F-4D6E-A707-71EBD7DA5472}"/>
+                <a16:creationId xmlns:a16="http://schemas.microsoft.com/office/drawing/2014/main" id="{A5F50C68-E92F-4D6E-A707-71EBD7DA5472}"/>
               </a:ext>
             </a:extLst>
           </p:cNvPr>
@@ -22465,7 +22292,7 @@
           <a:p>
             <a:fld id="{89ACDE42-010D-4487-A37F-627E4B397EF3}" type="datetime1">
               <a:rPr lang="de-DE" smtClean="0"/>
-              <a:t>29.09.2022</a:t>
+              <a:t>05.10.2022</a:t>
             </a:fld>
             <a:endParaRPr lang="de-DE"/>
           </a:p>
@@ -22585,7 +22412,7 @@
           <a:p>
             <a:fld id="{29F03F87-5FC1-454A-B924-57348B963929}" type="datetime1">
               <a:rPr lang="de-DE" smtClean="0"/>
-              <a:t>29.09.2022</a:t>
+              <a:t>05.10.2022</a:t>
             </a:fld>
             <a:endParaRPr lang="de-DE"/>
           </a:p>
@@ -22825,7 +22652,7 @@
           <a:p>
             <a:fld id="{83468713-7584-40CF-B812-011DDBE4027E}" type="datetime1">
               <a:rPr lang="de-DE" smtClean="0"/>
-              <a:t>29.09.2022</a:t>
+              <a:t>05.10.2022</a:t>
             </a:fld>
             <a:endParaRPr lang="de-DE"/>
           </a:p>
@@ -22887,13 +22714,6 @@
   <p:clrMapOvr>
     <a:masterClrMapping/>
   </p:clrMapOvr>
-  <p:timing>
-    <p:tnLst>
-      <p:par>
-        <p:cTn id="1" dur="indefinite" restart="never" nodeType="tmRoot"/>
-      </p:par>
-    </p:tnLst>
-  </p:timing>
 </p:sld>
 </file>
 
@@ -22919,7 +22739,7 @@
           <p:cNvPr id="2" name="Titel 1">
             <a:extLst>
               <a:ext uri="{FF2B5EF4-FFF2-40B4-BE49-F238E27FC236}">
-                <a16:creationId xmlns:a16="http://schemas.microsoft.com/office/drawing/2014/main" xmlns="" id="{8B277F54-A15D-4D49-99D2-2AFBBB4A4B1C}"/>
+                <a16:creationId xmlns:a16="http://schemas.microsoft.com/office/drawing/2014/main" id="{8B277F54-A15D-4D49-99D2-2AFBBB4A4B1C}"/>
               </a:ext>
             </a:extLst>
           </p:cNvPr>
@@ -22947,7 +22767,7 @@
           <p:cNvPr id="3" name="Inhaltsplatzhalter 2">
             <a:extLst>
               <a:ext uri="{FF2B5EF4-FFF2-40B4-BE49-F238E27FC236}">
-                <a16:creationId xmlns:a16="http://schemas.microsoft.com/office/drawing/2014/main" xmlns="" id="{CDA2709E-C78F-4900-A00A-10C3ED2F1445}"/>
+                <a16:creationId xmlns:a16="http://schemas.microsoft.com/office/drawing/2014/main" id="{CDA2709E-C78F-4900-A00A-10C3ED2F1445}"/>
               </a:ext>
             </a:extLst>
           </p:cNvPr>
@@ -23000,7 +22820,7 @@
           <p:cNvPr id="4" name="Datumsplatzhalter 3">
             <a:extLst>
               <a:ext uri="{FF2B5EF4-FFF2-40B4-BE49-F238E27FC236}">
-                <a16:creationId xmlns:a16="http://schemas.microsoft.com/office/drawing/2014/main" xmlns="" id="{8D6E21C6-1DA7-4D5C-B6A4-D980BE9EE166}"/>
+                <a16:creationId xmlns:a16="http://schemas.microsoft.com/office/drawing/2014/main" id="{8D6E21C6-1DA7-4D5C-B6A4-D980BE9EE166}"/>
               </a:ext>
             </a:extLst>
           </p:cNvPr>
@@ -23018,7 +22838,7 @@
           <a:p>
             <a:fld id="{DAFA5E08-56C4-4D00-93E8-8E8047A8DE89}" type="datetime1">
               <a:rPr lang="de-DE" smtClean="0"/>
-              <a:t>29.09.2022</a:t>
+              <a:t>05.10.2022</a:t>
             </a:fld>
             <a:endParaRPr lang="de-DE"/>
           </a:p>
@@ -23029,7 +22849,7 @@
           <p:cNvPr id="5" name="Fußzeilenplatzhalter 4">
             <a:extLst>
               <a:ext uri="{FF2B5EF4-FFF2-40B4-BE49-F238E27FC236}">
-                <a16:creationId xmlns:a16="http://schemas.microsoft.com/office/drawing/2014/main" xmlns="" id="{0CB95E1F-43AC-4F09-AB0C-462123C12AAB}"/>
+                <a16:creationId xmlns:a16="http://schemas.microsoft.com/office/drawing/2014/main" id="{0CB95E1F-43AC-4F09-AB0C-462123C12AAB}"/>
               </a:ext>
             </a:extLst>
           </p:cNvPr>
@@ -23057,7 +22877,7 @@
           <p:cNvPr id="6" name="Foliennummernplatzhalter 5">
             <a:extLst>
               <a:ext uri="{FF2B5EF4-FFF2-40B4-BE49-F238E27FC236}">
-                <a16:creationId xmlns:a16="http://schemas.microsoft.com/office/drawing/2014/main" xmlns="" id="{95FE5647-CCB4-4657-86BD-109B8BBE038A}"/>
+                <a16:creationId xmlns:a16="http://schemas.microsoft.com/office/drawing/2014/main" id="{95FE5647-CCB4-4657-86BD-109B8BBE038A}"/>
               </a:ext>
             </a:extLst>
           </p:cNvPr>
@@ -23086,7 +22906,7 @@
           <p:cNvPr id="8" name="Grafik 7">
             <a:extLst>
               <a:ext uri="{FF2B5EF4-FFF2-40B4-BE49-F238E27FC236}">
-                <a16:creationId xmlns:a16="http://schemas.microsoft.com/office/drawing/2014/main" xmlns="" id="{E33148F4-C6A0-4900-A3C4-DEF5A7AF8B36}"/>
+                <a16:creationId xmlns:a16="http://schemas.microsoft.com/office/drawing/2014/main" id="{E33148F4-C6A0-4900-A3C4-DEF5A7AF8B36}"/>
               </a:ext>
             </a:extLst>
           </p:cNvPr>
@@ -23121,13 +22941,6 @@
   <p:clrMapOvr>
     <a:masterClrMapping/>
   </p:clrMapOvr>
-  <p:timing>
-    <p:tnLst>
-      <p:par>
-        <p:cTn id="1" dur="indefinite" restart="never" nodeType="tmRoot"/>
-      </p:par>
-    </p:tnLst>
-  </p:timing>
 </p:sld>
 </file>
 
@@ -23303,7 +23116,7 @@
           <a:p>
             <a:fld id="{0989FCA3-C01A-4FEF-9059-6150E2C6978D}" type="datetime1">
               <a:rPr lang="de-DE" smtClean="0"/>
-              <a:t>29.09.2022</a:t>
+              <a:t>05.10.2022</a:t>
             </a:fld>
             <a:endParaRPr lang="de-DE"/>
           </a:p>
@@ -23359,7 +23172,7 @@
           <p:cNvPr id="3" name="Grafik 2">
             <a:extLst>
               <a:ext uri="{FF2B5EF4-FFF2-40B4-BE49-F238E27FC236}">
-                <a16:creationId xmlns:a16="http://schemas.microsoft.com/office/drawing/2014/main" xmlns="" id="{CBA3456D-5B5D-4C32-93E1-55B0F0E4940F}"/>
+                <a16:creationId xmlns:a16="http://schemas.microsoft.com/office/drawing/2014/main" id="{CBA3456D-5B5D-4C32-93E1-55B0F0E4940F}"/>
               </a:ext>
             </a:extLst>
           </p:cNvPr>
@@ -23389,7 +23202,7 @@
           <p:cNvPr id="10" name="Grafik 9">
             <a:extLst>
               <a:ext uri="{FF2B5EF4-FFF2-40B4-BE49-F238E27FC236}">
-                <a16:creationId xmlns:a16="http://schemas.microsoft.com/office/drawing/2014/main" xmlns="" id="{14E8D3ED-5FA6-4B04-A5F6-1AE4B834214A}"/>
+                <a16:creationId xmlns:a16="http://schemas.microsoft.com/office/drawing/2014/main" id="{14E8D3ED-5FA6-4B04-A5F6-1AE4B834214A}"/>
               </a:ext>
             </a:extLst>
           </p:cNvPr>
@@ -23430,13 +23243,6 @@
   <p:clrMapOvr>
     <a:masterClrMapping/>
   </p:clrMapOvr>
-  <p:timing>
-    <p:tnLst>
-      <p:par>
-        <p:cTn id="1" dur="indefinite" restart="never" nodeType="tmRoot"/>
-      </p:par>
-    </p:tnLst>
-  </p:timing>
 </p:sld>
 </file>
 
@@ -23462,7 +23268,7 @@
           <p:cNvPr id="2" name="Titel 1">
             <a:extLst>
               <a:ext uri="{FF2B5EF4-FFF2-40B4-BE49-F238E27FC236}">
-                <a16:creationId xmlns:a16="http://schemas.microsoft.com/office/drawing/2014/main" xmlns="" id="{5A010D8D-89C8-4ABC-986F-874A74340C7C}"/>
+                <a16:creationId xmlns:a16="http://schemas.microsoft.com/office/drawing/2014/main" id="{5A010D8D-89C8-4ABC-986F-874A74340C7C}"/>
               </a:ext>
             </a:extLst>
           </p:cNvPr>
@@ -23490,7 +23296,7 @@
           <p:cNvPr id="3" name="Inhaltsplatzhalter 2">
             <a:extLst>
               <a:ext uri="{FF2B5EF4-FFF2-40B4-BE49-F238E27FC236}">
-                <a16:creationId xmlns:a16="http://schemas.microsoft.com/office/drawing/2014/main" xmlns="" id="{F9BB43DC-282D-4E27-8BF1-4C3C10E36909}"/>
+                <a16:creationId xmlns:a16="http://schemas.microsoft.com/office/drawing/2014/main" id="{F9BB43DC-282D-4E27-8BF1-4C3C10E36909}"/>
               </a:ext>
             </a:extLst>
           </p:cNvPr>
@@ -23552,7 +23358,7 @@
           <p:cNvPr id="4" name="Datumsplatzhalter 3">
             <a:extLst>
               <a:ext uri="{FF2B5EF4-FFF2-40B4-BE49-F238E27FC236}">
-                <a16:creationId xmlns:a16="http://schemas.microsoft.com/office/drawing/2014/main" xmlns="" id="{848A1A9E-248E-4E1E-AEA6-E3EAB45FE11F}"/>
+                <a16:creationId xmlns:a16="http://schemas.microsoft.com/office/drawing/2014/main" id="{848A1A9E-248E-4E1E-AEA6-E3EAB45FE11F}"/>
               </a:ext>
             </a:extLst>
           </p:cNvPr>
@@ -23570,7 +23376,7 @@
           <a:p>
             <a:fld id="{DAFA5E08-56C4-4D00-93E8-8E8047A8DE89}" type="datetime1">
               <a:rPr lang="de-DE" smtClean="0"/>
-              <a:t>29.09.2022</a:t>
+              <a:t>05.10.2022</a:t>
             </a:fld>
             <a:endParaRPr lang="de-DE"/>
           </a:p>
@@ -23581,7 +23387,7 @@
           <p:cNvPr id="5" name="Fußzeilenplatzhalter 4">
             <a:extLst>
               <a:ext uri="{FF2B5EF4-FFF2-40B4-BE49-F238E27FC236}">
-                <a16:creationId xmlns:a16="http://schemas.microsoft.com/office/drawing/2014/main" xmlns="" id="{48499E36-0E7A-47EF-BB8C-2886CED1A8D0}"/>
+                <a16:creationId xmlns:a16="http://schemas.microsoft.com/office/drawing/2014/main" id="{48499E36-0E7A-47EF-BB8C-2886CED1A8D0}"/>
               </a:ext>
             </a:extLst>
           </p:cNvPr>
@@ -23609,7 +23415,7 @@
           <p:cNvPr id="6" name="Foliennummernplatzhalter 5">
             <a:extLst>
               <a:ext uri="{FF2B5EF4-FFF2-40B4-BE49-F238E27FC236}">
-                <a16:creationId xmlns:a16="http://schemas.microsoft.com/office/drawing/2014/main" xmlns="" id="{A8777733-978E-49A7-9F79-1C8AF1BB3846}"/>
+                <a16:creationId xmlns:a16="http://schemas.microsoft.com/office/drawing/2014/main" id="{A8777733-978E-49A7-9F79-1C8AF1BB3846}"/>
               </a:ext>
             </a:extLst>
           </p:cNvPr>
@@ -23638,7 +23444,7 @@
           <p:cNvPr id="7" name="Textfeld 6">
             <a:extLst>
               <a:ext uri="{FF2B5EF4-FFF2-40B4-BE49-F238E27FC236}">
-                <a16:creationId xmlns:a16="http://schemas.microsoft.com/office/drawing/2014/main" xmlns="" id="{2DD32699-6BDF-4158-8D25-687621C41E3D}"/>
+                <a16:creationId xmlns:a16="http://schemas.microsoft.com/office/drawing/2014/main" id="{2DD32699-6BDF-4158-8D25-687621C41E3D}"/>
               </a:ext>
             </a:extLst>
           </p:cNvPr>
@@ -23669,10 +23475,6 @@
           <a:lstStyle/>
           <a:p>
             <a:pPr algn="ctr"/>
-            <a:r>
-              <a:rPr lang="de-DE" dirty="0"/>
-              <a:t/>
-            </a:r>
             <a:br>
               <a:rPr lang="de-DE" dirty="0"/>
             </a:br>
@@ -23719,7 +23521,7 @@
           <p:cNvPr id="9" name="Grafik 8">
             <a:extLst>
               <a:ext uri="{FF2B5EF4-FFF2-40B4-BE49-F238E27FC236}">
-                <a16:creationId xmlns:a16="http://schemas.microsoft.com/office/drawing/2014/main" xmlns="" id="{AEC4CA29-FFCB-4EB8-9306-D1F74E39BB7F}"/>
+                <a16:creationId xmlns:a16="http://schemas.microsoft.com/office/drawing/2014/main" id="{AEC4CA29-FFCB-4EB8-9306-D1F74E39BB7F}"/>
               </a:ext>
             </a:extLst>
           </p:cNvPr>
@@ -23760,13 +23562,6 @@
   <p:clrMapOvr>
     <a:masterClrMapping/>
   </p:clrMapOvr>
-  <p:timing>
-    <p:tnLst>
-      <p:par>
-        <p:cTn id="1" dur="indefinite" restart="never" nodeType="tmRoot"/>
-      </p:par>
-    </p:tnLst>
-  </p:timing>
 </p:sld>
 </file>
 

</xml_diff>